<commit_message>
Vortrag - Ich habe die erste Folie grundlegend fertig. Außerdem habe ich mit dem Konzept der zweiten angefangen.
</commit_message>
<xml_diff>
--- a/Präsentation/Vortrag - Pflichtenheft.pptx
+++ b/Präsentation/Vortrag - Pflichtenheft.pptx
@@ -6,6 +6,7 @@
   </p:sldMasterIdLst>
   <p:sldIdLst>
     <p:sldId id="256" r:id="rId2"/>
+    <p:sldId id="257" r:id="rId3"/>
   </p:sldIdLst>
   <p:sldSz cx="12192000" cy="6858000"/>
   <p:notesSz cx="6858000" cy="9144000"/>
@@ -104,6 +105,11 @@
       </a:defRPr>
     </a:lvl9pPr>
   </p:defaultTextStyle>
+  <p:extLst>
+    <p:ext uri="{EFAFB233-063F-42B5-8137-9DF3F51BA10A}">
+      <p15:sldGuideLst xmlns:p15="http://schemas.microsoft.com/office/powerpoint/2012/main"/>
+    </p:ext>
+  </p:extLst>
 </p:presentation>
 </file>
 
@@ -3323,10 +3329,10 @@
       </p:grpSpPr>
       <p:pic>
         <p:nvPicPr>
-          <p:cNvPr id="6" name="Grafik 5">
-            <a:extLst>
-              <a:ext uri="{FF2B5EF4-FFF2-40B4-BE49-F238E27FC236}">
-                <a16:creationId xmlns:a16="http://schemas.microsoft.com/office/drawing/2014/main" id="{51CC790F-62C6-4A7D-BBC8-A3AE5E93094C}"/>
+          <p:cNvPr id="8" name="Grafik 7">
+            <a:extLst>
+              <a:ext uri="{FF2B5EF4-FFF2-40B4-BE49-F238E27FC236}">
+                <a16:creationId xmlns:a16="http://schemas.microsoft.com/office/drawing/2014/main" id="{5635985F-22C2-4D7A-B8FE-40062A4A8F5D}"/>
               </a:ext>
             </a:extLst>
           </p:cNvPr>
@@ -3349,8 +3355,80 @@
         </p:blipFill>
         <p:spPr>
           <a:xfrm>
-            <a:off x="-176464" y="0"/>
-            <a:ext cx="12368464" cy="6858000"/>
+            <a:off x="0" y="0"/>
+            <a:ext cx="12192000" cy="6858000"/>
+          </a:xfrm>
+          <a:prstGeom prst="rect">
+            <a:avLst/>
+          </a:prstGeom>
+        </p:spPr>
+      </p:pic>
+      <p:pic>
+        <p:nvPicPr>
+          <p:cNvPr id="10" name="Grafik 9">
+            <a:extLst>
+              <a:ext uri="{FF2B5EF4-FFF2-40B4-BE49-F238E27FC236}">
+                <a16:creationId xmlns:a16="http://schemas.microsoft.com/office/drawing/2014/main" id="{5C76EDF3-A989-4E43-96F6-AF2AFECA0733}"/>
+              </a:ext>
+            </a:extLst>
+          </p:cNvPr>
+          <p:cNvPicPr>
+            <a:picLocks noChangeAspect="1"/>
+          </p:cNvPicPr>
+          <p:nvPr/>
+        </p:nvPicPr>
+        <p:blipFill>
+          <a:blip r:embed="rId3">
+            <a:extLst>
+              <a:ext uri="{28A0092B-C50C-407E-A947-70E740481C1C}">
+                <a14:useLocalDpi xmlns:a14="http://schemas.microsoft.com/office/drawing/2010/main" val="0"/>
+              </a:ext>
+            </a:extLst>
+          </a:blip>
+          <a:stretch>
+            <a:fillRect/>
+          </a:stretch>
+        </p:blipFill>
+        <p:spPr>
+          <a:xfrm>
+            <a:off x="0" y="0"/>
+            <a:ext cx="12192000" cy="6858000"/>
+          </a:xfrm>
+          <a:prstGeom prst="rect">
+            <a:avLst/>
+          </a:prstGeom>
+        </p:spPr>
+      </p:pic>
+      <p:pic>
+        <p:nvPicPr>
+          <p:cNvPr id="12" name="Grafik 11">
+            <a:extLst>
+              <a:ext uri="{FF2B5EF4-FFF2-40B4-BE49-F238E27FC236}">
+                <a16:creationId xmlns:a16="http://schemas.microsoft.com/office/drawing/2014/main" id="{0E258C4C-867B-4702-95E5-AA375ECD3CEB}"/>
+              </a:ext>
+            </a:extLst>
+          </p:cNvPr>
+          <p:cNvPicPr>
+            <a:picLocks noChangeAspect="1"/>
+          </p:cNvPicPr>
+          <p:nvPr/>
+        </p:nvPicPr>
+        <p:blipFill>
+          <a:blip r:embed="rId4">
+            <a:extLst>
+              <a:ext uri="{28A0092B-C50C-407E-A947-70E740481C1C}">
+                <a14:useLocalDpi xmlns:a14="http://schemas.microsoft.com/office/drawing/2010/main" val="0"/>
+              </a:ext>
+            </a:extLst>
+          </a:blip>
+          <a:stretch>
+            <a:fillRect/>
+          </a:stretch>
+        </p:blipFill>
+        <p:spPr>
+          <a:xfrm>
+            <a:off x="0" y="0"/>
+            <a:ext cx="12192000" cy="6858000"/>
           </a:xfrm>
           <a:prstGeom prst="rect">
             <a:avLst/>
@@ -3361,6 +3439,210 @@
     <p:extLst>
       <p:ext uri="{BB962C8B-B14F-4D97-AF65-F5344CB8AC3E}">
         <p14:creationId xmlns:p14="http://schemas.microsoft.com/office/powerpoint/2010/main" val="2794324116"/>
+      </p:ext>
+    </p:extLst>
+  </p:cSld>
+  <p:clrMapOvr>
+    <a:masterClrMapping/>
+  </p:clrMapOvr>
+  <p:timing>
+    <p:tnLst>
+      <p:par>
+        <p:cTn id="1" dur="indefinite" restart="never" nodeType="tmRoot">
+          <p:childTnLst>
+            <p:seq concurrent="1" nextAc="seek">
+              <p:cTn id="2" dur="indefinite" nodeType="mainSeq">
+                <p:childTnLst>
+                  <p:par>
+                    <p:cTn id="3" fill="hold">
+                      <p:stCondLst>
+                        <p:cond delay="indefinite"/>
+                      </p:stCondLst>
+                      <p:childTnLst>
+                        <p:par>
+                          <p:cTn id="4" fill="hold">
+                            <p:stCondLst>
+                              <p:cond delay="0"/>
+                            </p:stCondLst>
+                            <p:childTnLst>
+                              <p:par>
+                                <p:cTn id="5" presetID="2" presetClass="exit" presetSubtype="1" fill="hold" nodeType="clickEffect">
+                                  <p:stCondLst>
+                                    <p:cond delay="0"/>
+                                  </p:stCondLst>
+                                  <p:childTnLst>
+                                    <p:anim calcmode="lin" valueType="num">
+                                      <p:cBhvr additive="base">
+                                        <p:cTn id="6" dur="500"/>
+                                        <p:tgtEl>
+                                          <p:spTgt spid="12"/>
+                                        </p:tgtEl>
+                                        <p:attrNameLst>
+                                          <p:attrName>ppt_x</p:attrName>
+                                        </p:attrNameLst>
+                                      </p:cBhvr>
+                                      <p:tavLst>
+                                        <p:tav tm="0">
+                                          <p:val>
+                                            <p:strVal val="ppt_x"/>
+                                          </p:val>
+                                        </p:tav>
+                                        <p:tav tm="100000">
+                                          <p:val>
+                                            <p:strVal val="ppt_x"/>
+                                          </p:val>
+                                        </p:tav>
+                                      </p:tavLst>
+                                    </p:anim>
+                                    <p:anim calcmode="lin" valueType="num">
+                                      <p:cBhvr additive="base">
+                                        <p:cTn id="7" dur="500"/>
+                                        <p:tgtEl>
+                                          <p:spTgt spid="12"/>
+                                        </p:tgtEl>
+                                        <p:attrNameLst>
+                                          <p:attrName>ppt_y</p:attrName>
+                                        </p:attrNameLst>
+                                      </p:cBhvr>
+                                      <p:tavLst>
+                                        <p:tav tm="0">
+                                          <p:val>
+                                            <p:strVal val="ppt_y"/>
+                                          </p:val>
+                                        </p:tav>
+                                        <p:tav tm="100000">
+                                          <p:val>
+                                            <p:strVal val="0-ppt_h/2"/>
+                                          </p:val>
+                                        </p:tav>
+                                      </p:tavLst>
+                                    </p:anim>
+                                    <p:set>
+                                      <p:cBhvr>
+                                        <p:cTn id="8" dur="1" fill="hold">
+                                          <p:stCondLst>
+                                            <p:cond delay="499"/>
+                                          </p:stCondLst>
+                                        </p:cTn>
+                                        <p:tgtEl>
+                                          <p:spTgt spid="12"/>
+                                        </p:tgtEl>
+                                        <p:attrNameLst>
+                                          <p:attrName>style.visibility</p:attrName>
+                                        </p:attrNameLst>
+                                      </p:cBhvr>
+                                      <p:to>
+                                        <p:strVal val="hidden"/>
+                                      </p:to>
+                                    </p:set>
+                                  </p:childTnLst>
+                                </p:cTn>
+                              </p:par>
+                            </p:childTnLst>
+                          </p:cTn>
+                        </p:par>
+                      </p:childTnLst>
+                    </p:cTn>
+                  </p:par>
+                  <p:par>
+                    <p:cTn id="9" fill="hold">
+                      <p:stCondLst>
+                        <p:cond delay="indefinite"/>
+                      </p:stCondLst>
+                      <p:childTnLst>
+                        <p:par>
+                          <p:cTn id="10" fill="hold">
+                            <p:stCondLst>
+                              <p:cond delay="0"/>
+                            </p:stCondLst>
+                            <p:childTnLst>
+                              <p:par>
+                                <p:cTn id="11" presetID="10" presetClass="entr" presetSubtype="0" fill="hold" nodeType="clickEffect">
+                                  <p:stCondLst>
+                                    <p:cond delay="0"/>
+                                  </p:stCondLst>
+                                  <p:childTnLst>
+                                    <p:set>
+                                      <p:cBhvr>
+                                        <p:cTn id="12" dur="1" fill="hold">
+                                          <p:stCondLst>
+                                            <p:cond delay="0"/>
+                                          </p:stCondLst>
+                                        </p:cTn>
+                                        <p:tgtEl>
+                                          <p:spTgt spid="10"/>
+                                        </p:tgtEl>
+                                        <p:attrNameLst>
+                                          <p:attrName>style.visibility</p:attrName>
+                                        </p:attrNameLst>
+                                      </p:cBhvr>
+                                      <p:to>
+                                        <p:strVal val="visible"/>
+                                      </p:to>
+                                    </p:set>
+                                    <p:animEffect transition="in" filter="fade">
+                                      <p:cBhvr>
+                                        <p:cTn id="13" dur="1000"/>
+                                        <p:tgtEl>
+                                          <p:spTgt spid="10"/>
+                                        </p:tgtEl>
+                                      </p:cBhvr>
+                                    </p:animEffect>
+                                  </p:childTnLst>
+                                </p:cTn>
+                              </p:par>
+                            </p:childTnLst>
+                          </p:cTn>
+                        </p:par>
+                      </p:childTnLst>
+                    </p:cTn>
+                  </p:par>
+                </p:childTnLst>
+              </p:cTn>
+              <p:prevCondLst>
+                <p:cond evt="onPrev" delay="0">
+                  <p:tgtEl>
+                    <p:sldTgt/>
+                  </p:tgtEl>
+                </p:cond>
+              </p:prevCondLst>
+              <p:nextCondLst>
+                <p:cond evt="onNext" delay="0">
+                  <p:tgtEl>
+                    <p:sldTgt/>
+                  </p:tgtEl>
+                </p:cond>
+              </p:nextCondLst>
+            </p:seq>
+          </p:childTnLst>
+        </p:cTn>
+      </p:par>
+    </p:tnLst>
+  </p:timing>
+</p:sld>
+</file>
+
+<file path=ppt/slides/slide2.xml><?xml version="1.0" encoding="utf-8"?>
+<p:sld xmlns:a="http://schemas.openxmlformats.org/drawingml/2006/main" xmlns:r="http://schemas.openxmlformats.org/officeDocument/2006/relationships" xmlns:p="http://schemas.openxmlformats.org/presentationml/2006/main">
+  <p:cSld>
+    <p:spTree>
+      <p:nvGrpSpPr>
+        <p:cNvPr id="1" name=""/>
+        <p:cNvGrpSpPr/>
+        <p:nvPr/>
+      </p:nvGrpSpPr>
+      <p:grpSpPr>
+        <a:xfrm>
+          <a:off x="0" y="0"/>
+          <a:ext cx="0" cy="0"/>
+          <a:chOff x="0" y="0"/>
+          <a:chExt cx="0" cy="0"/>
+        </a:xfrm>
+      </p:grpSpPr>
+    </p:spTree>
+    <p:extLst>
+      <p:ext uri="{BB962C8B-B14F-4D97-AF65-F5344CB8AC3E}">
+        <p14:creationId xmlns:p14="http://schemas.microsoft.com/office/powerpoint/2010/main" val="382033256"/>
       </p:ext>
     </p:extLst>
   </p:cSld>

</xml_diff>

<commit_message>
Vortrag - Ich habe das Konzept aller Folien erstellt und die Titelbilder erstellt.
</commit_message>
<xml_diff>
--- a/Präsentation/Vortrag - Pflichtenheft.pptx
+++ b/Präsentation/Vortrag - Pflichtenheft.pptx
@@ -7,6 +7,8 @@
   <p:sldIdLst>
     <p:sldId id="256" r:id="rId2"/>
     <p:sldId id="257" r:id="rId3"/>
+    <p:sldId id="258" r:id="rId4"/>
+    <p:sldId id="259" r:id="rId5"/>
   </p:sldIdLst>
   <p:sldSz cx="12192000" cy="6858000"/>
   <p:notesSz cx="6858000" cy="9144000"/>
@@ -3639,10 +3641,178 @@
           <a:chExt cx="0" cy="0"/>
         </a:xfrm>
       </p:grpSpPr>
+      <p:pic>
+        <p:nvPicPr>
+          <p:cNvPr id="3" name="Grafik 2">
+            <a:extLst>
+              <a:ext uri="{FF2B5EF4-FFF2-40B4-BE49-F238E27FC236}">
+                <a16:creationId xmlns:a16="http://schemas.microsoft.com/office/drawing/2014/main" id="{A8EA60E4-7B28-4D1F-B8F8-4686362229C9}"/>
+              </a:ext>
+            </a:extLst>
+          </p:cNvPr>
+          <p:cNvPicPr>
+            <a:picLocks noChangeAspect="1"/>
+          </p:cNvPicPr>
+          <p:nvPr/>
+        </p:nvPicPr>
+        <p:blipFill>
+          <a:blip r:embed="rId2">
+            <a:extLst>
+              <a:ext uri="{28A0092B-C50C-407E-A947-70E740481C1C}">
+                <a14:useLocalDpi xmlns:a14="http://schemas.microsoft.com/office/drawing/2010/main" val="0"/>
+              </a:ext>
+            </a:extLst>
+          </a:blip>
+          <a:stretch>
+            <a:fillRect/>
+          </a:stretch>
+        </p:blipFill>
+        <p:spPr>
+          <a:xfrm>
+            <a:off x="0" y="0"/>
+            <a:ext cx="12192000" cy="6858000"/>
+          </a:xfrm>
+          <a:prstGeom prst="rect">
+            <a:avLst/>
+          </a:prstGeom>
+        </p:spPr>
+      </p:pic>
     </p:spTree>
     <p:extLst>
       <p:ext uri="{BB962C8B-B14F-4D97-AF65-F5344CB8AC3E}">
         <p14:creationId xmlns:p14="http://schemas.microsoft.com/office/powerpoint/2010/main" val="382033256"/>
+      </p:ext>
+    </p:extLst>
+  </p:cSld>
+  <p:clrMapOvr>
+    <a:masterClrMapping/>
+  </p:clrMapOvr>
+</p:sld>
+</file>
+
+<file path=ppt/slides/slide3.xml><?xml version="1.0" encoding="utf-8"?>
+<p:sld xmlns:a="http://schemas.openxmlformats.org/drawingml/2006/main" xmlns:r="http://schemas.openxmlformats.org/officeDocument/2006/relationships" xmlns:p="http://schemas.openxmlformats.org/presentationml/2006/main">
+  <p:cSld>
+    <p:spTree>
+      <p:nvGrpSpPr>
+        <p:cNvPr id="1" name=""/>
+        <p:cNvGrpSpPr/>
+        <p:nvPr/>
+      </p:nvGrpSpPr>
+      <p:grpSpPr>
+        <a:xfrm>
+          <a:off x="0" y="0"/>
+          <a:ext cx="0" cy="0"/>
+          <a:chOff x="0" y="0"/>
+          <a:chExt cx="0" cy="0"/>
+        </a:xfrm>
+      </p:grpSpPr>
+      <p:pic>
+        <p:nvPicPr>
+          <p:cNvPr id="11" name="Grafik 10">
+            <a:extLst>
+              <a:ext uri="{FF2B5EF4-FFF2-40B4-BE49-F238E27FC236}">
+                <a16:creationId xmlns:a16="http://schemas.microsoft.com/office/drawing/2014/main" id="{4B374485-A546-4868-A561-A69F83178BD4}"/>
+              </a:ext>
+            </a:extLst>
+          </p:cNvPr>
+          <p:cNvPicPr>
+            <a:picLocks noChangeAspect="1"/>
+          </p:cNvPicPr>
+          <p:nvPr/>
+        </p:nvPicPr>
+        <p:blipFill>
+          <a:blip r:embed="rId2">
+            <a:extLst>
+              <a:ext uri="{28A0092B-C50C-407E-A947-70E740481C1C}">
+                <a14:useLocalDpi xmlns:a14="http://schemas.microsoft.com/office/drawing/2010/main" val="0"/>
+              </a:ext>
+            </a:extLst>
+          </a:blip>
+          <a:stretch>
+            <a:fillRect/>
+          </a:stretch>
+        </p:blipFill>
+        <p:spPr>
+          <a:xfrm>
+            <a:off x="0" y="0"/>
+            <a:ext cx="12192000" cy="6858000"/>
+          </a:xfrm>
+          <a:prstGeom prst="rect">
+            <a:avLst/>
+          </a:prstGeom>
+        </p:spPr>
+      </p:pic>
+    </p:spTree>
+    <p:extLst>
+      <p:ext uri="{BB962C8B-B14F-4D97-AF65-F5344CB8AC3E}">
+        <p14:creationId xmlns:p14="http://schemas.microsoft.com/office/powerpoint/2010/main" val="3309358318"/>
+      </p:ext>
+    </p:extLst>
+  </p:cSld>
+  <p:clrMapOvr>
+    <a:masterClrMapping/>
+  </p:clrMapOvr>
+</p:sld>
+</file>
+
+<file path=ppt/slides/slide4.xml><?xml version="1.0" encoding="utf-8"?>
+<p:sld xmlns:a="http://schemas.openxmlformats.org/drawingml/2006/main" xmlns:r="http://schemas.openxmlformats.org/officeDocument/2006/relationships" xmlns:p="http://schemas.openxmlformats.org/presentationml/2006/main">
+  <p:cSld>
+    <p:spTree>
+      <p:nvGrpSpPr>
+        <p:cNvPr id="1" name=""/>
+        <p:cNvGrpSpPr/>
+        <p:nvPr/>
+      </p:nvGrpSpPr>
+      <p:grpSpPr>
+        <a:xfrm>
+          <a:off x="0" y="0"/>
+          <a:ext cx="0" cy="0"/>
+          <a:chOff x="0" y="0"/>
+          <a:chExt cx="0" cy="0"/>
+        </a:xfrm>
+      </p:grpSpPr>
+      <p:pic>
+        <p:nvPicPr>
+          <p:cNvPr id="9" name="Grafik 8">
+            <a:extLst>
+              <a:ext uri="{FF2B5EF4-FFF2-40B4-BE49-F238E27FC236}">
+                <a16:creationId xmlns:a16="http://schemas.microsoft.com/office/drawing/2014/main" id="{921726C0-8AF6-44EA-B24C-06A6D52E303B}"/>
+              </a:ext>
+            </a:extLst>
+          </p:cNvPr>
+          <p:cNvPicPr>
+            <a:picLocks noChangeAspect="1"/>
+          </p:cNvPicPr>
+          <p:nvPr/>
+        </p:nvPicPr>
+        <p:blipFill>
+          <a:blip r:embed="rId2">
+            <a:extLst>
+              <a:ext uri="{28A0092B-C50C-407E-A947-70E740481C1C}">
+                <a14:useLocalDpi xmlns:a14="http://schemas.microsoft.com/office/drawing/2010/main" val="0"/>
+              </a:ext>
+            </a:extLst>
+          </a:blip>
+          <a:stretch>
+            <a:fillRect/>
+          </a:stretch>
+        </p:blipFill>
+        <p:spPr>
+          <a:xfrm>
+            <a:off x="0" y="0"/>
+            <a:ext cx="12192000" cy="6858000"/>
+          </a:xfrm>
+          <a:prstGeom prst="rect">
+            <a:avLst/>
+          </a:prstGeom>
+        </p:spPr>
+      </p:pic>
+    </p:spTree>
+    <p:extLst>
+      <p:ext uri="{BB962C8B-B14F-4D97-AF65-F5344CB8AC3E}">
+        <p14:creationId xmlns:p14="http://schemas.microsoft.com/office/powerpoint/2010/main" val="3915399367"/>
       </p:ext>
     </p:extLst>
   </p:cSld>

</xml_diff>

<commit_message>
Vortrag - Ich habe die Qualitätsanforderungen in die Präsentation eingearbeitet.
</commit_message>
<xml_diff>
--- a/Präsentation/Vortrag - Pflichtenheft.pptx
+++ b/Präsentation/Vortrag - Pflichtenheft.pptx
@@ -8,7 +8,8 @@
     <p:sldId id="256" r:id="rId2"/>
     <p:sldId id="257" r:id="rId3"/>
     <p:sldId id="258" r:id="rId4"/>
-    <p:sldId id="259" r:id="rId5"/>
+    <p:sldId id="260" r:id="rId5"/>
+    <p:sldId id="259" r:id="rId6"/>
   </p:sldIdLst>
   <p:sldSz cx="12192000" cy="6858000"/>
   <p:notesSz cx="6858000" cy="9144000"/>
@@ -262,7 +263,7 @@
           <a:p>
             <a:fld id="{83E01541-7F0C-40FA-847C-30086A64F924}" type="datetimeFigureOut">
               <a:rPr lang="de-DE" smtClean="0"/>
-              <a:t>09.06.2019</a:t>
+              <a:t>10.06.2019</a:t>
             </a:fld>
             <a:endParaRPr lang="de-DE"/>
           </a:p>
@@ -460,7 +461,7 @@
           <a:p>
             <a:fld id="{83E01541-7F0C-40FA-847C-30086A64F924}" type="datetimeFigureOut">
               <a:rPr lang="de-DE" smtClean="0"/>
-              <a:t>09.06.2019</a:t>
+              <a:t>10.06.2019</a:t>
             </a:fld>
             <a:endParaRPr lang="de-DE"/>
           </a:p>
@@ -668,7 +669,7 @@
           <a:p>
             <a:fld id="{83E01541-7F0C-40FA-847C-30086A64F924}" type="datetimeFigureOut">
               <a:rPr lang="de-DE" smtClean="0"/>
-              <a:t>09.06.2019</a:t>
+              <a:t>10.06.2019</a:t>
             </a:fld>
             <a:endParaRPr lang="de-DE"/>
           </a:p>
@@ -866,7 +867,7 @@
           <a:p>
             <a:fld id="{83E01541-7F0C-40FA-847C-30086A64F924}" type="datetimeFigureOut">
               <a:rPr lang="de-DE" smtClean="0"/>
-              <a:t>09.06.2019</a:t>
+              <a:t>10.06.2019</a:t>
             </a:fld>
             <a:endParaRPr lang="de-DE"/>
           </a:p>
@@ -1141,7 +1142,7 @@
           <a:p>
             <a:fld id="{83E01541-7F0C-40FA-847C-30086A64F924}" type="datetimeFigureOut">
               <a:rPr lang="de-DE" smtClean="0"/>
-              <a:t>09.06.2019</a:t>
+              <a:t>10.06.2019</a:t>
             </a:fld>
             <a:endParaRPr lang="de-DE"/>
           </a:p>
@@ -1406,7 +1407,7 @@
           <a:p>
             <a:fld id="{83E01541-7F0C-40FA-847C-30086A64F924}" type="datetimeFigureOut">
               <a:rPr lang="de-DE" smtClean="0"/>
-              <a:t>09.06.2019</a:t>
+              <a:t>10.06.2019</a:t>
             </a:fld>
             <a:endParaRPr lang="de-DE"/>
           </a:p>
@@ -1818,7 +1819,7 @@
           <a:p>
             <a:fld id="{83E01541-7F0C-40FA-847C-30086A64F924}" type="datetimeFigureOut">
               <a:rPr lang="de-DE" smtClean="0"/>
-              <a:t>09.06.2019</a:t>
+              <a:t>10.06.2019</a:t>
             </a:fld>
             <a:endParaRPr lang="de-DE"/>
           </a:p>
@@ -1959,7 +1960,7 @@
           <a:p>
             <a:fld id="{83E01541-7F0C-40FA-847C-30086A64F924}" type="datetimeFigureOut">
               <a:rPr lang="de-DE" smtClean="0"/>
-              <a:t>09.06.2019</a:t>
+              <a:t>10.06.2019</a:t>
             </a:fld>
             <a:endParaRPr lang="de-DE"/>
           </a:p>
@@ -2072,7 +2073,7 @@
           <a:p>
             <a:fld id="{83E01541-7F0C-40FA-847C-30086A64F924}" type="datetimeFigureOut">
               <a:rPr lang="de-DE" smtClean="0"/>
-              <a:t>09.06.2019</a:t>
+              <a:t>10.06.2019</a:t>
             </a:fld>
             <a:endParaRPr lang="de-DE"/>
           </a:p>
@@ -2383,7 +2384,7 @@
           <a:p>
             <a:fld id="{83E01541-7F0C-40FA-847C-30086A64F924}" type="datetimeFigureOut">
               <a:rPr lang="de-DE" smtClean="0"/>
-              <a:t>09.06.2019</a:t>
+              <a:t>10.06.2019</a:t>
             </a:fld>
             <a:endParaRPr lang="de-DE"/>
           </a:p>
@@ -2671,7 +2672,7 @@
           <a:p>
             <a:fld id="{83E01541-7F0C-40FA-847C-30086A64F924}" type="datetimeFigureOut">
               <a:rPr lang="de-DE" smtClean="0"/>
-              <a:t>09.06.2019</a:t>
+              <a:t>10.06.2019</a:t>
             </a:fld>
             <a:endParaRPr lang="de-DE"/>
           </a:p>
@@ -2912,7 +2913,7 @@
           <a:p>
             <a:fld id="{83E01541-7F0C-40FA-847C-30086A64F924}" type="datetimeFigureOut">
               <a:rPr lang="de-DE" smtClean="0"/>
-              <a:t>09.06.2019</a:t>
+              <a:t>10.06.2019</a:t>
             </a:fld>
             <a:endParaRPr lang="de-DE"/>
           </a:p>
@@ -3775,10 +3776,10 @@
       </p:grpSpPr>
       <p:pic>
         <p:nvPicPr>
-          <p:cNvPr id="9" name="Grafik 8">
-            <a:extLst>
-              <a:ext uri="{FF2B5EF4-FFF2-40B4-BE49-F238E27FC236}">
-                <a16:creationId xmlns:a16="http://schemas.microsoft.com/office/drawing/2014/main" id="{921726C0-8AF6-44EA-B24C-06A6D52E303B}"/>
+          <p:cNvPr id="5" name="Grafik 4">
+            <a:extLst>
+              <a:ext uri="{FF2B5EF4-FFF2-40B4-BE49-F238E27FC236}">
+                <a16:creationId xmlns:a16="http://schemas.microsoft.com/office/drawing/2014/main" id="{052DEAC6-F335-41B8-865A-AA8D7B079AAF}"/>
               </a:ext>
             </a:extLst>
           </p:cNvPr>
@@ -3789,6 +3790,108 @@
         </p:nvPicPr>
         <p:blipFill>
           <a:blip r:embed="rId2">
+            <a:extLst>
+              <a:ext uri="{28A0092B-C50C-407E-A947-70E740481C1C}">
+                <a14:useLocalDpi xmlns:a14="http://schemas.microsoft.com/office/drawing/2010/main" val="0"/>
+              </a:ext>
+            </a:extLst>
+          </a:blip>
+          <a:stretch>
+            <a:fillRect/>
+          </a:stretch>
+        </p:blipFill>
+        <p:spPr>
+          <a:xfrm>
+            <a:off x="0" y="0"/>
+            <a:ext cx="12192000" cy="6858000"/>
+          </a:xfrm>
+          <a:prstGeom prst="rect">
+            <a:avLst/>
+          </a:prstGeom>
+        </p:spPr>
+      </p:pic>
+    </p:spTree>
+    <p:extLst>
+      <p:ext uri="{BB962C8B-B14F-4D97-AF65-F5344CB8AC3E}">
+        <p14:creationId xmlns:p14="http://schemas.microsoft.com/office/powerpoint/2010/main" val="1469266212"/>
+      </p:ext>
+    </p:extLst>
+  </p:cSld>
+  <p:clrMapOvr>
+    <a:masterClrMapping/>
+  </p:clrMapOvr>
+</p:sld>
+</file>
+
+<file path=ppt/slides/slide5.xml><?xml version="1.0" encoding="utf-8"?>
+<p:sld xmlns:a="http://schemas.openxmlformats.org/drawingml/2006/main" xmlns:r="http://schemas.openxmlformats.org/officeDocument/2006/relationships" xmlns:p="http://schemas.openxmlformats.org/presentationml/2006/main">
+  <p:cSld>
+    <p:spTree>
+      <p:nvGrpSpPr>
+        <p:cNvPr id="1" name=""/>
+        <p:cNvGrpSpPr/>
+        <p:nvPr/>
+      </p:nvGrpSpPr>
+      <p:grpSpPr>
+        <a:xfrm>
+          <a:off x="0" y="0"/>
+          <a:ext cx="0" cy="0"/>
+          <a:chOff x="0" y="0"/>
+          <a:chExt cx="0" cy="0"/>
+        </a:xfrm>
+      </p:grpSpPr>
+      <p:pic>
+        <p:nvPicPr>
+          <p:cNvPr id="5" name="Grafik 4">
+            <a:extLst>
+              <a:ext uri="{FF2B5EF4-FFF2-40B4-BE49-F238E27FC236}">
+                <a16:creationId xmlns:a16="http://schemas.microsoft.com/office/drawing/2014/main" id="{84D5364A-8DE9-4F4B-B2FA-DD929D3271E1}"/>
+              </a:ext>
+            </a:extLst>
+          </p:cNvPr>
+          <p:cNvPicPr>
+            <a:picLocks noChangeAspect="1"/>
+          </p:cNvPicPr>
+          <p:nvPr/>
+        </p:nvPicPr>
+        <p:blipFill>
+          <a:blip r:embed="rId2">
+            <a:extLst>
+              <a:ext uri="{28A0092B-C50C-407E-A947-70E740481C1C}">
+                <a14:useLocalDpi xmlns:a14="http://schemas.microsoft.com/office/drawing/2010/main" val="0"/>
+              </a:ext>
+            </a:extLst>
+          </a:blip>
+          <a:stretch>
+            <a:fillRect/>
+          </a:stretch>
+        </p:blipFill>
+        <p:spPr>
+          <a:xfrm>
+            <a:off x="0" y="0"/>
+            <a:ext cx="12192000" cy="6858000"/>
+          </a:xfrm>
+          <a:prstGeom prst="rect">
+            <a:avLst/>
+          </a:prstGeom>
+        </p:spPr>
+      </p:pic>
+      <p:pic>
+        <p:nvPicPr>
+          <p:cNvPr id="3" name="Grafik 2">
+            <a:extLst>
+              <a:ext uri="{FF2B5EF4-FFF2-40B4-BE49-F238E27FC236}">
+                <a16:creationId xmlns:a16="http://schemas.microsoft.com/office/drawing/2014/main" id="{B289DC74-FBA4-446F-BC6D-8601A089CB1D}"/>
+              </a:ext>
+            </a:extLst>
+          </p:cNvPr>
+          <p:cNvPicPr>
+            <a:picLocks noChangeAspect="1"/>
+          </p:cNvPicPr>
+          <p:nvPr/>
+        </p:nvPicPr>
+        <p:blipFill>
+          <a:blip r:embed="rId3">
             <a:extLst>
               <a:ext uri="{28A0092B-C50C-407E-A947-70E740481C1C}">
                 <a14:useLocalDpi xmlns:a14="http://schemas.microsoft.com/office/drawing/2010/main" val="0"/>
@@ -3819,6 +3922,127 @@
   <p:clrMapOvr>
     <a:masterClrMapping/>
   </p:clrMapOvr>
+  <p:timing>
+    <p:tnLst>
+      <p:par>
+        <p:cTn id="1" dur="indefinite" restart="never" nodeType="tmRoot">
+          <p:childTnLst>
+            <p:seq concurrent="1" nextAc="seek">
+              <p:cTn id="2" dur="indefinite" nodeType="mainSeq">
+                <p:childTnLst>
+                  <p:par>
+                    <p:cTn id="3" fill="hold">
+                      <p:stCondLst>
+                        <p:cond delay="indefinite"/>
+                      </p:stCondLst>
+                      <p:childTnLst>
+                        <p:par>
+                          <p:cTn id="4" fill="hold">
+                            <p:stCondLst>
+                              <p:cond delay="0"/>
+                            </p:stCondLst>
+                            <p:childTnLst>
+                              <p:par>
+                                <p:cTn id="5" presetID="2" presetClass="exit" presetSubtype="1" fill="hold" nodeType="clickEffect">
+                                  <p:stCondLst>
+                                    <p:cond delay="0"/>
+                                  </p:stCondLst>
+                                  <p:childTnLst>
+                                    <p:anim calcmode="lin" valueType="num">
+                                      <p:cBhvr additive="base">
+                                        <p:cTn id="6" dur="500"/>
+                                        <p:tgtEl>
+                                          <p:spTgt spid="3"/>
+                                        </p:tgtEl>
+                                        <p:attrNameLst>
+                                          <p:attrName>ppt_x</p:attrName>
+                                        </p:attrNameLst>
+                                      </p:cBhvr>
+                                      <p:tavLst>
+                                        <p:tav tm="0">
+                                          <p:val>
+                                            <p:strVal val="ppt_x"/>
+                                          </p:val>
+                                        </p:tav>
+                                        <p:tav tm="100000">
+                                          <p:val>
+                                            <p:strVal val="ppt_x"/>
+                                          </p:val>
+                                        </p:tav>
+                                      </p:tavLst>
+                                    </p:anim>
+                                    <p:anim calcmode="lin" valueType="num">
+                                      <p:cBhvr additive="base">
+                                        <p:cTn id="7" dur="500"/>
+                                        <p:tgtEl>
+                                          <p:spTgt spid="3"/>
+                                        </p:tgtEl>
+                                        <p:attrNameLst>
+                                          <p:attrName>ppt_y</p:attrName>
+                                        </p:attrNameLst>
+                                      </p:cBhvr>
+                                      <p:tavLst>
+                                        <p:tav tm="0">
+                                          <p:val>
+                                            <p:strVal val="ppt_y"/>
+                                          </p:val>
+                                        </p:tav>
+                                        <p:tav tm="100000">
+                                          <p:val>
+                                            <p:strVal val="0-ppt_h/2"/>
+                                          </p:val>
+                                        </p:tav>
+                                      </p:tavLst>
+                                    </p:anim>
+                                    <p:set>
+                                      <p:cBhvr>
+                                        <p:cTn id="8" dur="1" fill="hold">
+                                          <p:stCondLst>
+                                            <p:cond delay="499"/>
+                                          </p:stCondLst>
+                                        </p:cTn>
+                                        <p:tgtEl>
+                                          <p:spTgt spid="3"/>
+                                        </p:tgtEl>
+                                        <p:attrNameLst>
+                                          <p:attrName>style.visibility</p:attrName>
+                                        </p:attrNameLst>
+                                      </p:cBhvr>
+                                      <p:to>
+                                        <p:strVal val="hidden"/>
+                                      </p:to>
+                                    </p:set>
+                                  </p:childTnLst>
+                                </p:cTn>
+                              </p:par>
+                            </p:childTnLst>
+                          </p:cTn>
+                        </p:par>
+                      </p:childTnLst>
+                    </p:cTn>
+                  </p:par>
+                </p:childTnLst>
+              </p:cTn>
+              <p:prevCondLst>
+                <p:cond evt="onPrev" delay="0">
+                  <p:tgtEl>
+                    <p:sldTgt/>
+                  </p:tgtEl>
+                </p:cond>
+              </p:prevCondLst>
+              <p:nextCondLst>
+                <p:cond evt="onNext" delay="0">
+                  <p:tgtEl>
+                    <p:sldTgt/>
+                  </p:tgtEl>
+                </p:cond>
+              </p:nextCondLst>
+            </p:seq>
+          </p:childTnLst>
+        </p:cTn>
+      </p:par>
+    </p:tnLst>
+  </p:timing>
 </p:sld>
 </file>
 

</xml_diff>

<commit_message>
Vortrag - Ich habe einen beispielhaften Ablauf erstellt.
</commit_message>
<xml_diff>
--- a/Präsentation/Vortrag - Pflichtenheft.pptx
+++ b/Präsentation/Vortrag - Pflichtenheft.pptx
@@ -3776,10 +3776,10 @@
       </p:grpSpPr>
       <p:pic>
         <p:nvPicPr>
-          <p:cNvPr id="5" name="Grafik 4">
-            <a:extLst>
-              <a:ext uri="{FF2B5EF4-FFF2-40B4-BE49-F238E27FC236}">
-                <a16:creationId xmlns:a16="http://schemas.microsoft.com/office/drawing/2014/main" id="{052DEAC6-F335-41B8-865A-AA8D7B079AAF}"/>
+          <p:cNvPr id="3" name="GUI">
+            <a:extLst>
+              <a:ext uri="{FF2B5EF4-FFF2-40B4-BE49-F238E27FC236}">
+                <a16:creationId xmlns:a16="http://schemas.microsoft.com/office/drawing/2014/main" id="{1BED6E79-A39B-4C30-BD0C-87954429D381}"/>
               </a:ext>
             </a:extLst>
           </p:cNvPr>
@@ -3790,6 +3790,222 @@
         </p:nvPicPr>
         <p:blipFill>
           <a:blip r:embed="rId2">
+            <a:extLst>
+              <a:ext uri="{28A0092B-C50C-407E-A947-70E740481C1C}">
+                <a14:useLocalDpi xmlns:a14="http://schemas.microsoft.com/office/drawing/2010/main" val="0"/>
+              </a:ext>
+            </a:extLst>
+          </a:blip>
+          <a:stretch>
+            <a:fillRect/>
+          </a:stretch>
+        </p:blipFill>
+        <p:spPr>
+          <a:xfrm>
+            <a:off x="0" y="0"/>
+            <a:ext cx="12192000" cy="6858000"/>
+          </a:xfrm>
+          <a:prstGeom prst="rect">
+            <a:avLst/>
+          </a:prstGeom>
+        </p:spPr>
+      </p:pic>
+      <p:pic>
+        <p:nvPicPr>
+          <p:cNvPr id="16" name="Darstellungsverdeckung">
+            <a:extLst>
+              <a:ext uri="{FF2B5EF4-FFF2-40B4-BE49-F238E27FC236}">
+                <a16:creationId xmlns:a16="http://schemas.microsoft.com/office/drawing/2014/main" id="{A35DC517-7F1B-4FDD-B0C4-135A50AF9DE1}"/>
+              </a:ext>
+            </a:extLst>
+          </p:cNvPr>
+          <p:cNvPicPr>
+            <a:picLocks noChangeAspect="1"/>
+          </p:cNvPicPr>
+          <p:nvPr/>
+        </p:nvPicPr>
+        <p:blipFill>
+          <a:blip r:embed="rId3">
+            <a:extLst>
+              <a:ext uri="{28A0092B-C50C-407E-A947-70E740481C1C}">
+                <a14:useLocalDpi xmlns:a14="http://schemas.microsoft.com/office/drawing/2010/main" val="0"/>
+              </a:ext>
+            </a:extLst>
+          </a:blip>
+          <a:stretch>
+            <a:fillRect/>
+          </a:stretch>
+        </p:blipFill>
+        <p:spPr>
+          <a:xfrm>
+            <a:off x="7988300" y="1456839"/>
+            <a:ext cx="4203699" cy="5401160"/>
+          </a:xfrm>
+          <a:prstGeom prst="rect">
+            <a:avLst/>
+          </a:prstGeom>
+        </p:spPr>
+      </p:pic>
+      <p:pic>
+        <p:nvPicPr>
+          <p:cNvPr id="14" name="Transformationsverdeckung">
+            <a:extLst>
+              <a:ext uri="{FF2B5EF4-FFF2-40B4-BE49-F238E27FC236}">
+                <a16:creationId xmlns:a16="http://schemas.microsoft.com/office/drawing/2014/main" id="{6C7D77C6-5350-402F-9AF0-2F6B9F820BEF}"/>
+              </a:ext>
+            </a:extLst>
+          </p:cNvPr>
+          <p:cNvPicPr>
+            <a:picLocks noChangeAspect="1"/>
+          </p:cNvPicPr>
+          <p:nvPr/>
+        </p:nvPicPr>
+        <p:blipFill>
+          <a:blip r:embed="rId4">
+            <a:extLst>
+              <a:ext uri="{28A0092B-C50C-407E-A947-70E740481C1C}">
+                <a14:useLocalDpi xmlns:a14="http://schemas.microsoft.com/office/drawing/2010/main" val="0"/>
+              </a:ext>
+            </a:extLst>
+          </a:blip>
+          <a:stretch>
+            <a:fillRect/>
+          </a:stretch>
+        </p:blipFill>
+        <p:spPr>
+          <a:xfrm>
+            <a:off x="3171825" y="1456840"/>
+            <a:ext cx="4816475" cy="5401159"/>
+          </a:xfrm>
+          <a:prstGeom prst="rect">
+            <a:avLst/>
+          </a:prstGeom>
+        </p:spPr>
+      </p:pic>
+      <p:pic>
+        <p:nvPicPr>
+          <p:cNvPr id="10" name="Sensorenverdeckung">
+            <a:extLst>
+              <a:ext uri="{FF2B5EF4-FFF2-40B4-BE49-F238E27FC236}">
+                <a16:creationId xmlns:a16="http://schemas.microsoft.com/office/drawing/2014/main" id="{0C2D7DA5-186E-4209-AAF3-8B49340B1B47}"/>
+              </a:ext>
+            </a:extLst>
+          </p:cNvPr>
+          <p:cNvPicPr>
+            <a:picLocks noChangeAspect="1"/>
+          </p:cNvPicPr>
+          <p:nvPr/>
+        </p:nvPicPr>
+        <p:blipFill>
+          <a:blip r:embed="rId5">
+            <a:extLst>
+              <a:ext uri="{28A0092B-C50C-407E-A947-70E740481C1C}">
+                <a14:useLocalDpi xmlns:a14="http://schemas.microsoft.com/office/drawing/2010/main" val="0"/>
+              </a:ext>
+            </a:extLst>
+          </a:blip>
+          <a:stretch>
+            <a:fillRect/>
+          </a:stretch>
+        </p:blipFill>
+        <p:spPr>
+          <a:xfrm>
+            <a:off x="1" y="1456840"/>
+            <a:ext cx="3171824" cy="5401159"/>
+          </a:xfrm>
+          <a:prstGeom prst="rect">
+            <a:avLst/>
+          </a:prstGeom>
+        </p:spPr>
+      </p:pic>
+      <p:pic>
+        <p:nvPicPr>
+          <p:cNvPr id="8" name="Verdeckung Hauptteil">
+            <a:extLst>
+              <a:ext uri="{FF2B5EF4-FFF2-40B4-BE49-F238E27FC236}">
+                <a16:creationId xmlns:a16="http://schemas.microsoft.com/office/drawing/2014/main" id="{2FBB50D7-415D-4F45-848D-345D9CF23165}"/>
+              </a:ext>
+            </a:extLst>
+          </p:cNvPr>
+          <p:cNvPicPr>
+            <a:picLocks noChangeAspect="1"/>
+          </p:cNvPicPr>
+          <p:nvPr/>
+        </p:nvPicPr>
+        <p:blipFill>
+          <a:blip r:embed="rId6">
+            <a:extLst>
+              <a:ext uri="{28A0092B-C50C-407E-A947-70E740481C1C}">
+                <a14:useLocalDpi xmlns:a14="http://schemas.microsoft.com/office/drawing/2010/main" val="0"/>
+              </a:ext>
+            </a:extLst>
+          </a:blip>
+          <a:stretch>
+            <a:fillRect/>
+          </a:stretch>
+        </p:blipFill>
+        <p:spPr>
+          <a:xfrm>
+            <a:off x="0" y="5349"/>
+            <a:ext cx="12192000" cy="1451489"/>
+          </a:xfrm>
+          <a:prstGeom prst="rect">
+            <a:avLst/>
+          </a:prstGeom>
+        </p:spPr>
+      </p:pic>
+      <p:pic>
+        <p:nvPicPr>
+          <p:cNvPr id="6" name="Startbildschirm">
+            <a:extLst>
+              <a:ext uri="{FF2B5EF4-FFF2-40B4-BE49-F238E27FC236}">
+                <a16:creationId xmlns:a16="http://schemas.microsoft.com/office/drawing/2014/main" id="{B3663F3E-9964-4485-9FE1-CEA4D430564E}"/>
+              </a:ext>
+            </a:extLst>
+          </p:cNvPr>
+          <p:cNvPicPr>
+            <a:picLocks noChangeAspect="1"/>
+          </p:cNvPicPr>
+          <p:nvPr/>
+        </p:nvPicPr>
+        <p:blipFill>
+          <a:blip r:embed="rId7">
+            <a:extLst>
+              <a:ext uri="{28A0092B-C50C-407E-A947-70E740481C1C}">
+                <a14:useLocalDpi xmlns:a14="http://schemas.microsoft.com/office/drawing/2010/main" val="0"/>
+              </a:ext>
+            </a:extLst>
+          </a:blip>
+          <a:stretch>
+            <a:fillRect/>
+          </a:stretch>
+        </p:blipFill>
+        <p:spPr>
+          <a:xfrm>
+            <a:off x="0" y="0"/>
+            <a:ext cx="12192000" cy="6858000"/>
+          </a:xfrm>
+          <a:prstGeom prst="rect">
+            <a:avLst/>
+          </a:prstGeom>
+        </p:spPr>
+      </p:pic>
+      <p:pic>
+        <p:nvPicPr>
+          <p:cNvPr id="5" name="Frage">
+            <a:extLst>
+              <a:ext uri="{FF2B5EF4-FFF2-40B4-BE49-F238E27FC236}">
+                <a16:creationId xmlns:a16="http://schemas.microsoft.com/office/drawing/2014/main" id="{052DEAC6-F335-41B8-865A-AA8D7B079AAF}"/>
+              </a:ext>
+            </a:extLst>
+          </p:cNvPr>
+          <p:cNvPicPr>
+            <a:picLocks noChangeAspect="1"/>
+          </p:cNvPicPr>
+          <p:nvPr/>
+        </p:nvPicPr>
+        <p:blipFill>
+          <a:blip r:embed="rId8">
             <a:extLst>
               <a:ext uri="{28A0092B-C50C-407E-A947-70E740481C1C}">
                 <a14:useLocalDpi xmlns:a14="http://schemas.microsoft.com/office/drawing/2010/main" val="0"/>
@@ -3820,6 +4036,430 @@
   <p:clrMapOvr>
     <a:masterClrMapping/>
   </p:clrMapOvr>
+  <p:timing>
+    <p:tnLst>
+      <p:par>
+        <p:cTn id="1" dur="indefinite" restart="never" nodeType="tmRoot">
+          <p:childTnLst>
+            <p:seq concurrent="1" nextAc="seek">
+              <p:cTn id="2" dur="indefinite" nodeType="mainSeq">
+                <p:childTnLst>
+                  <p:par>
+                    <p:cTn id="3" fill="hold">
+                      <p:stCondLst>
+                        <p:cond delay="indefinite"/>
+                      </p:stCondLst>
+                      <p:childTnLst>
+                        <p:par>
+                          <p:cTn id="4" fill="hold">
+                            <p:stCondLst>
+                              <p:cond delay="0"/>
+                            </p:stCondLst>
+                            <p:childTnLst>
+                              <p:par>
+                                <p:cTn id="5" presetID="2" presetClass="exit" presetSubtype="1" fill="hold" nodeType="clickEffect">
+                                  <p:stCondLst>
+                                    <p:cond delay="0"/>
+                                  </p:stCondLst>
+                                  <p:childTnLst>
+                                    <p:anim calcmode="lin" valueType="num">
+                                      <p:cBhvr additive="base">
+                                        <p:cTn id="6" dur="500"/>
+                                        <p:tgtEl>
+                                          <p:spTgt spid="5"/>
+                                        </p:tgtEl>
+                                        <p:attrNameLst>
+                                          <p:attrName>ppt_x</p:attrName>
+                                        </p:attrNameLst>
+                                      </p:cBhvr>
+                                      <p:tavLst>
+                                        <p:tav tm="0">
+                                          <p:val>
+                                            <p:strVal val="ppt_x"/>
+                                          </p:val>
+                                        </p:tav>
+                                        <p:tav tm="100000">
+                                          <p:val>
+                                            <p:strVal val="ppt_x"/>
+                                          </p:val>
+                                        </p:tav>
+                                      </p:tavLst>
+                                    </p:anim>
+                                    <p:anim calcmode="lin" valueType="num">
+                                      <p:cBhvr additive="base">
+                                        <p:cTn id="7" dur="500"/>
+                                        <p:tgtEl>
+                                          <p:spTgt spid="5"/>
+                                        </p:tgtEl>
+                                        <p:attrNameLst>
+                                          <p:attrName>ppt_y</p:attrName>
+                                        </p:attrNameLst>
+                                      </p:cBhvr>
+                                      <p:tavLst>
+                                        <p:tav tm="0">
+                                          <p:val>
+                                            <p:strVal val="ppt_y"/>
+                                          </p:val>
+                                        </p:tav>
+                                        <p:tav tm="100000">
+                                          <p:val>
+                                            <p:strVal val="0-ppt_h/2"/>
+                                          </p:val>
+                                        </p:tav>
+                                      </p:tavLst>
+                                    </p:anim>
+                                    <p:set>
+                                      <p:cBhvr>
+                                        <p:cTn id="8" dur="1" fill="hold">
+                                          <p:stCondLst>
+                                            <p:cond delay="499"/>
+                                          </p:stCondLst>
+                                        </p:cTn>
+                                        <p:tgtEl>
+                                          <p:spTgt spid="5"/>
+                                        </p:tgtEl>
+                                        <p:attrNameLst>
+                                          <p:attrName>style.visibility</p:attrName>
+                                        </p:attrNameLst>
+                                      </p:cBhvr>
+                                      <p:to>
+                                        <p:strVal val="hidden"/>
+                                      </p:to>
+                                    </p:set>
+                                  </p:childTnLst>
+                                </p:cTn>
+                              </p:par>
+                            </p:childTnLst>
+                          </p:cTn>
+                        </p:par>
+                      </p:childTnLst>
+                    </p:cTn>
+                  </p:par>
+                  <p:par>
+                    <p:cTn id="9" fill="hold">
+                      <p:stCondLst>
+                        <p:cond delay="indefinite"/>
+                      </p:stCondLst>
+                      <p:childTnLst>
+                        <p:par>
+                          <p:cTn id="10" fill="hold">
+                            <p:stCondLst>
+                              <p:cond delay="0"/>
+                            </p:stCondLst>
+                            <p:childTnLst>
+                              <p:par>
+                                <p:cTn id="11" presetID="2" presetClass="exit" presetSubtype="1" fill="hold" nodeType="clickEffect">
+                                  <p:stCondLst>
+                                    <p:cond delay="0"/>
+                                  </p:stCondLst>
+                                  <p:childTnLst>
+                                    <p:anim calcmode="lin" valueType="num">
+                                      <p:cBhvr additive="base">
+                                        <p:cTn id="12" dur="500"/>
+                                        <p:tgtEl>
+                                          <p:spTgt spid="6"/>
+                                        </p:tgtEl>
+                                        <p:attrNameLst>
+                                          <p:attrName>ppt_x</p:attrName>
+                                        </p:attrNameLst>
+                                      </p:cBhvr>
+                                      <p:tavLst>
+                                        <p:tav tm="0">
+                                          <p:val>
+                                            <p:strVal val="ppt_x"/>
+                                          </p:val>
+                                        </p:tav>
+                                        <p:tav tm="100000">
+                                          <p:val>
+                                            <p:strVal val="ppt_x"/>
+                                          </p:val>
+                                        </p:tav>
+                                      </p:tavLst>
+                                    </p:anim>
+                                    <p:anim calcmode="lin" valueType="num">
+                                      <p:cBhvr additive="base">
+                                        <p:cTn id="13" dur="500"/>
+                                        <p:tgtEl>
+                                          <p:spTgt spid="6"/>
+                                        </p:tgtEl>
+                                        <p:attrNameLst>
+                                          <p:attrName>ppt_y</p:attrName>
+                                        </p:attrNameLst>
+                                      </p:cBhvr>
+                                      <p:tavLst>
+                                        <p:tav tm="0">
+                                          <p:val>
+                                            <p:strVal val="ppt_y"/>
+                                          </p:val>
+                                        </p:tav>
+                                        <p:tav tm="100000">
+                                          <p:val>
+                                            <p:strVal val="0-ppt_h/2"/>
+                                          </p:val>
+                                        </p:tav>
+                                      </p:tavLst>
+                                    </p:anim>
+                                    <p:set>
+                                      <p:cBhvr>
+                                        <p:cTn id="14" dur="1" fill="hold">
+                                          <p:stCondLst>
+                                            <p:cond delay="499"/>
+                                          </p:stCondLst>
+                                        </p:cTn>
+                                        <p:tgtEl>
+                                          <p:spTgt spid="6"/>
+                                        </p:tgtEl>
+                                        <p:attrNameLst>
+                                          <p:attrName>style.visibility</p:attrName>
+                                        </p:attrNameLst>
+                                      </p:cBhvr>
+                                      <p:to>
+                                        <p:strVal val="hidden"/>
+                                      </p:to>
+                                    </p:set>
+                                  </p:childTnLst>
+                                </p:cTn>
+                              </p:par>
+                            </p:childTnLst>
+                          </p:cTn>
+                        </p:par>
+                      </p:childTnLst>
+                    </p:cTn>
+                  </p:par>
+                  <p:par>
+                    <p:cTn id="15" fill="hold">
+                      <p:stCondLst>
+                        <p:cond delay="indefinite"/>
+                      </p:stCondLst>
+                      <p:childTnLst>
+                        <p:par>
+                          <p:cTn id="16" fill="hold">
+                            <p:stCondLst>
+                              <p:cond delay="0"/>
+                            </p:stCondLst>
+                            <p:childTnLst>
+                              <p:par>
+                                <p:cTn id="17" presetID="10" presetClass="exit" presetSubtype="0" fill="hold" nodeType="clickEffect">
+                                  <p:stCondLst>
+                                    <p:cond delay="0"/>
+                                  </p:stCondLst>
+                                  <p:childTnLst>
+                                    <p:animEffect transition="out" filter="fade">
+                                      <p:cBhvr>
+                                        <p:cTn id="18" dur="500"/>
+                                        <p:tgtEl>
+                                          <p:spTgt spid="8"/>
+                                        </p:tgtEl>
+                                      </p:cBhvr>
+                                    </p:animEffect>
+                                    <p:set>
+                                      <p:cBhvr>
+                                        <p:cTn id="19" dur="1" fill="hold">
+                                          <p:stCondLst>
+                                            <p:cond delay="499"/>
+                                          </p:stCondLst>
+                                        </p:cTn>
+                                        <p:tgtEl>
+                                          <p:spTgt spid="8"/>
+                                        </p:tgtEl>
+                                        <p:attrNameLst>
+                                          <p:attrName>style.visibility</p:attrName>
+                                        </p:attrNameLst>
+                                      </p:cBhvr>
+                                      <p:to>
+                                        <p:strVal val="hidden"/>
+                                      </p:to>
+                                    </p:set>
+                                  </p:childTnLst>
+                                </p:cTn>
+                              </p:par>
+                            </p:childTnLst>
+                          </p:cTn>
+                        </p:par>
+                      </p:childTnLst>
+                    </p:cTn>
+                  </p:par>
+                  <p:par>
+                    <p:cTn id="20" fill="hold">
+                      <p:stCondLst>
+                        <p:cond delay="indefinite"/>
+                      </p:stCondLst>
+                      <p:childTnLst>
+                        <p:par>
+                          <p:cTn id="21" fill="hold">
+                            <p:stCondLst>
+                              <p:cond delay="0"/>
+                            </p:stCondLst>
+                            <p:childTnLst>
+                              <p:par>
+                                <p:cTn id="22" presetID="10" presetClass="exit" presetSubtype="0" fill="hold" nodeType="clickEffect">
+                                  <p:stCondLst>
+                                    <p:cond delay="0"/>
+                                  </p:stCondLst>
+                                  <p:childTnLst>
+                                    <p:animEffect transition="out" filter="fade">
+                                      <p:cBhvr>
+                                        <p:cTn id="23" dur="500"/>
+                                        <p:tgtEl>
+                                          <p:spTgt spid="10"/>
+                                        </p:tgtEl>
+                                      </p:cBhvr>
+                                    </p:animEffect>
+                                    <p:set>
+                                      <p:cBhvr>
+                                        <p:cTn id="24" dur="1" fill="hold">
+                                          <p:stCondLst>
+                                            <p:cond delay="499"/>
+                                          </p:stCondLst>
+                                        </p:cTn>
+                                        <p:tgtEl>
+                                          <p:spTgt spid="10"/>
+                                        </p:tgtEl>
+                                        <p:attrNameLst>
+                                          <p:attrName>style.visibility</p:attrName>
+                                        </p:attrNameLst>
+                                      </p:cBhvr>
+                                      <p:to>
+                                        <p:strVal val="hidden"/>
+                                      </p:to>
+                                    </p:set>
+                                  </p:childTnLst>
+                                </p:cTn>
+                              </p:par>
+                            </p:childTnLst>
+                          </p:cTn>
+                        </p:par>
+                      </p:childTnLst>
+                    </p:cTn>
+                  </p:par>
+                  <p:par>
+                    <p:cTn id="25" fill="hold">
+                      <p:stCondLst>
+                        <p:cond delay="indefinite"/>
+                      </p:stCondLst>
+                      <p:childTnLst>
+                        <p:par>
+                          <p:cTn id="26" fill="hold">
+                            <p:stCondLst>
+                              <p:cond delay="0"/>
+                            </p:stCondLst>
+                            <p:childTnLst>
+                              <p:par>
+                                <p:cTn id="27" presetID="10" presetClass="exit" presetSubtype="0" fill="hold" nodeType="clickEffect">
+                                  <p:stCondLst>
+                                    <p:cond delay="0"/>
+                                  </p:stCondLst>
+                                  <p:childTnLst>
+                                    <p:animEffect transition="out" filter="fade">
+                                      <p:cBhvr>
+                                        <p:cTn id="28" dur="500"/>
+                                        <p:tgtEl>
+                                          <p:spTgt spid="14"/>
+                                        </p:tgtEl>
+                                      </p:cBhvr>
+                                    </p:animEffect>
+                                    <p:set>
+                                      <p:cBhvr>
+                                        <p:cTn id="29" dur="1" fill="hold">
+                                          <p:stCondLst>
+                                            <p:cond delay="499"/>
+                                          </p:stCondLst>
+                                        </p:cTn>
+                                        <p:tgtEl>
+                                          <p:spTgt spid="14"/>
+                                        </p:tgtEl>
+                                        <p:attrNameLst>
+                                          <p:attrName>style.visibility</p:attrName>
+                                        </p:attrNameLst>
+                                      </p:cBhvr>
+                                      <p:to>
+                                        <p:strVal val="hidden"/>
+                                      </p:to>
+                                    </p:set>
+                                  </p:childTnLst>
+                                </p:cTn>
+                              </p:par>
+                            </p:childTnLst>
+                          </p:cTn>
+                        </p:par>
+                      </p:childTnLst>
+                    </p:cTn>
+                  </p:par>
+                  <p:par>
+                    <p:cTn id="30" fill="hold">
+                      <p:stCondLst>
+                        <p:cond delay="indefinite"/>
+                      </p:stCondLst>
+                      <p:childTnLst>
+                        <p:par>
+                          <p:cTn id="31" fill="hold">
+                            <p:stCondLst>
+                              <p:cond delay="0"/>
+                            </p:stCondLst>
+                            <p:childTnLst>
+                              <p:par>
+                                <p:cTn id="32" presetID="10" presetClass="exit" presetSubtype="0" fill="hold" nodeType="clickEffect">
+                                  <p:stCondLst>
+                                    <p:cond delay="0"/>
+                                  </p:stCondLst>
+                                  <p:childTnLst>
+                                    <p:animEffect transition="out" filter="fade">
+                                      <p:cBhvr>
+                                        <p:cTn id="33" dur="500"/>
+                                        <p:tgtEl>
+                                          <p:spTgt spid="16"/>
+                                        </p:tgtEl>
+                                      </p:cBhvr>
+                                    </p:animEffect>
+                                    <p:set>
+                                      <p:cBhvr>
+                                        <p:cTn id="34" dur="1" fill="hold">
+                                          <p:stCondLst>
+                                            <p:cond delay="499"/>
+                                          </p:stCondLst>
+                                        </p:cTn>
+                                        <p:tgtEl>
+                                          <p:spTgt spid="16"/>
+                                        </p:tgtEl>
+                                        <p:attrNameLst>
+                                          <p:attrName>style.visibility</p:attrName>
+                                        </p:attrNameLst>
+                                      </p:cBhvr>
+                                      <p:to>
+                                        <p:strVal val="hidden"/>
+                                      </p:to>
+                                    </p:set>
+                                  </p:childTnLst>
+                                </p:cTn>
+                              </p:par>
+                            </p:childTnLst>
+                          </p:cTn>
+                        </p:par>
+                      </p:childTnLst>
+                    </p:cTn>
+                  </p:par>
+                </p:childTnLst>
+              </p:cTn>
+              <p:prevCondLst>
+                <p:cond evt="onPrev" delay="0">
+                  <p:tgtEl>
+                    <p:sldTgt/>
+                  </p:tgtEl>
+                </p:cond>
+              </p:prevCondLst>
+              <p:nextCondLst>
+                <p:cond evt="onNext" delay="0">
+                  <p:tgtEl>
+                    <p:sldTgt/>
+                  </p:tgtEl>
+                </p:cond>
+              </p:nextCondLst>
+            </p:seq>
+          </p:childTnLst>
+        </p:cTn>
+      </p:par>
+    </p:tnLst>
+  </p:timing>
 </p:sld>
 </file>
 

</xml_diff>

<commit_message>
Vortrag - Ich habe die zwei Folien Technische Aufbau und Hauptkomponenten zusammengelegt.
</commit_message>
<xml_diff>
--- a/Präsentation/Vortrag - Pflichtenheft.pptx
+++ b/Präsentation/Vortrag - Pflichtenheft.pptx
@@ -6,10 +6,9 @@
   </p:sldMasterIdLst>
   <p:sldIdLst>
     <p:sldId id="256" r:id="rId2"/>
-    <p:sldId id="257" r:id="rId3"/>
-    <p:sldId id="258" r:id="rId4"/>
-    <p:sldId id="260" r:id="rId5"/>
-    <p:sldId id="259" r:id="rId6"/>
+    <p:sldId id="258" r:id="rId3"/>
+    <p:sldId id="260" r:id="rId4"/>
+    <p:sldId id="259" r:id="rId5"/>
   </p:sldIdLst>
   <p:sldSz cx="12192000" cy="6858000"/>
   <p:notesSz cx="6858000" cy="9144000"/>
@@ -3647,7 +3646,7 @@
           <p:cNvPr id="3" name="Grafik 2">
             <a:extLst>
               <a:ext uri="{FF2B5EF4-FFF2-40B4-BE49-F238E27FC236}">
-                <a16:creationId xmlns:a16="http://schemas.microsoft.com/office/drawing/2014/main" id="{A8EA60E4-7B28-4D1F-B8F8-4686362229C9}"/>
+                <a16:creationId xmlns:a16="http://schemas.microsoft.com/office/drawing/2014/main" id="{67A1B990-5EBC-4BA2-8E67-01626C050428}"/>
               </a:ext>
             </a:extLst>
           </p:cNvPr>
@@ -3678,36 +3677,6 @@
           </a:prstGeom>
         </p:spPr>
       </p:pic>
-    </p:spTree>
-    <p:extLst>
-      <p:ext uri="{BB962C8B-B14F-4D97-AF65-F5344CB8AC3E}">
-        <p14:creationId xmlns:p14="http://schemas.microsoft.com/office/powerpoint/2010/main" val="382033256"/>
-      </p:ext>
-    </p:extLst>
-  </p:cSld>
-  <p:clrMapOvr>
-    <a:masterClrMapping/>
-  </p:clrMapOvr>
-</p:sld>
-</file>
-
-<file path=ppt/slides/slide3.xml><?xml version="1.0" encoding="utf-8"?>
-<p:sld xmlns:a="http://schemas.openxmlformats.org/drawingml/2006/main" xmlns:r="http://schemas.openxmlformats.org/officeDocument/2006/relationships" xmlns:p="http://schemas.openxmlformats.org/presentationml/2006/main">
-  <p:cSld>
-    <p:spTree>
-      <p:nvGrpSpPr>
-        <p:cNvPr id="1" name=""/>
-        <p:cNvGrpSpPr/>
-        <p:nvPr/>
-      </p:nvGrpSpPr>
-      <p:grpSpPr>
-        <a:xfrm>
-          <a:off x="0" y="0"/>
-          <a:ext cx="0" cy="0"/>
-          <a:chOff x="0" y="0"/>
-          <a:chExt cx="0" cy="0"/>
-        </a:xfrm>
-      </p:grpSpPr>
       <p:pic>
         <p:nvPicPr>
           <p:cNvPr id="11" name="Grafik 10">
@@ -3723,7 +3692,7 @@
           <p:nvPr/>
         </p:nvPicPr>
         <p:blipFill>
-          <a:blip r:embed="rId2">
+          <a:blip r:embed="rId3">
             <a:extLst>
               <a:ext uri="{28A0092B-C50C-407E-A947-70E740481C1C}">
                 <a14:useLocalDpi xmlns:a14="http://schemas.microsoft.com/office/drawing/2010/main" val="0"/>
@@ -3754,10 +3723,131 @@
   <p:clrMapOvr>
     <a:masterClrMapping/>
   </p:clrMapOvr>
+  <p:timing>
+    <p:tnLst>
+      <p:par>
+        <p:cTn id="1" dur="indefinite" restart="never" nodeType="tmRoot">
+          <p:childTnLst>
+            <p:seq concurrent="1" nextAc="seek">
+              <p:cTn id="2" dur="indefinite" nodeType="mainSeq">
+                <p:childTnLst>
+                  <p:par>
+                    <p:cTn id="3" fill="hold">
+                      <p:stCondLst>
+                        <p:cond delay="indefinite"/>
+                      </p:stCondLst>
+                      <p:childTnLst>
+                        <p:par>
+                          <p:cTn id="4" fill="hold">
+                            <p:stCondLst>
+                              <p:cond delay="0"/>
+                            </p:stCondLst>
+                            <p:childTnLst>
+                              <p:par>
+                                <p:cTn id="5" presetID="2" presetClass="exit" presetSubtype="1" fill="hold" nodeType="clickEffect">
+                                  <p:stCondLst>
+                                    <p:cond delay="0"/>
+                                  </p:stCondLst>
+                                  <p:childTnLst>
+                                    <p:anim calcmode="lin" valueType="num">
+                                      <p:cBhvr additive="base">
+                                        <p:cTn id="6" dur="500"/>
+                                        <p:tgtEl>
+                                          <p:spTgt spid="11"/>
+                                        </p:tgtEl>
+                                        <p:attrNameLst>
+                                          <p:attrName>ppt_x</p:attrName>
+                                        </p:attrNameLst>
+                                      </p:cBhvr>
+                                      <p:tavLst>
+                                        <p:tav tm="0">
+                                          <p:val>
+                                            <p:strVal val="ppt_x"/>
+                                          </p:val>
+                                        </p:tav>
+                                        <p:tav tm="100000">
+                                          <p:val>
+                                            <p:strVal val="ppt_x"/>
+                                          </p:val>
+                                        </p:tav>
+                                      </p:tavLst>
+                                    </p:anim>
+                                    <p:anim calcmode="lin" valueType="num">
+                                      <p:cBhvr additive="base">
+                                        <p:cTn id="7" dur="500"/>
+                                        <p:tgtEl>
+                                          <p:spTgt spid="11"/>
+                                        </p:tgtEl>
+                                        <p:attrNameLst>
+                                          <p:attrName>ppt_y</p:attrName>
+                                        </p:attrNameLst>
+                                      </p:cBhvr>
+                                      <p:tavLst>
+                                        <p:tav tm="0">
+                                          <p:val>
+                                            <p:strVal val="ppt_y"/>
+                                          </p:val>
+                                        </p:tav>
+                                        <p:tav tm="100000">
+                                          <p:val>
+                                            <p:strVal val="0-ppt_h/2"/>
+                                          </p:val>
+                                        </p:tav>
+                                      </p:tavLst>
+                                    </p:anim>
+                                    <p:set>
+                                      <p:cBhvr>
+                                        <p:cTn id="8" dur="1" fill="hold">
+                                          <p:stCondLst>
+                                            <p:cond delay="499"/>
+                                          </p:stCondLst>
+                                        </p:cTn>
+                                        <p:tgtEl>
+                                          <p:spTgt spid="11"/>
+                                        </p:tgtEl>
+                                        <p:attrNameLst>
+                                          <p:attrName>style.visibility</p:attrName>
+                                        </p:attrNameLst>
+                                      </p:cBhvr>
+                                      <p:to>
+                                        <p:strVal val="hidden"/>
+                                      </p:to>
+                                    </p:set>
+                                  </p:childTnLst>
+                                </p:cTn>
+                              </p:par>
+                            </p:childTnLst>
+                          </p:cTn>
+                        </p:par>
+                      </p:childTnLst>
+                    </p:cTn>
+                  </p:par>
+                </p:childTnLst>
+              </p:cTn>
+              <p:prevCondLst>
+                <p:cond evt="onPrev" delay="0">
+                  <p:tgtEl>
+                    <p:sldTgt/>
+                  </p:tgtEl>
+                </p:cond>
+              </p:prevCondLst>
+              <p:nextCondLst>
+                <p:cond evt="onNext" delay="0">
+                  <p:tgtEl>
+                    <p:sldTgt/>
+                  </p:tgtEl>
+                </p:cond>
+              </p:nextCondLst>
+            </p:seq>
+          </p:childTnLst>
+        </p:cTn>
+      </p:par>
+    </p:tnLst>
+  </p:timing>
 </p:sld>
 </file>
 
-<file path=ppt/slides/slide4.xml><?xml version="1.0" encoding="utf-8"?>
+<file path=ppt/slides/slide3.xml><?xml version="1.0" encoding="utf-8"?>
 <p:sld xmlns:a="http://schemas.openxmlformats.org/drawingml/2006/main" xmlns:r="http://schemas.openxmlformats.org/officeDocument/2006/relationships" xmlns:p="http://schemas.openxmlformats.org/presentationml/2006/main">
   <p:cSld>
     <p:spTree>
@@ -4463,7 +4553,7 @@
 </p:sld>
 </file>
 
-<file path=ppt/slides/slide5.xml><?xml version="1.0" encoding="utf-8"?>
+<file path=ppt/slides/slide4.xml><?xml version="1.0" encoding="utf-8"?>
 <p:sld xmlns:a="http://schemas.openxmlformats.org/drawingml/2006/main" xmlns:r="http://schemas.openxmlformats.org/officeDocument/2006/relationships" xmlns:p="http://schemas.openxmlformats.org/presentationml/2006/main">
   <p:cSld>
     <p:spTree>

</xml_diff>

<commit_message>
Vortrag - Ich habe die Folien weiter detailliert.
</commit_message>
<xml_diff>
--- a/Präsentation/Vortrag - Pflichtenheft.pptx
+++ b/Präsentation/Vortrag - Pflichtenheft.pptx
@@ -3679,10 +3679,10 @@
       </p:pic>
       <p:pic>
         <p:nvPicPr>
-          <p:cNvPr id="11" name="Grafik 10">
-            <a:extLst>
-              <a:ext uri="{FF2B5EF4-FFF2-40B4-BE49-F238E27FC236}">
-                <a16:creationId xmlns:a16="http://schemas.microsoft.com/office/drawing/2014/main" id="{4B374485-A546-4868-A561-A69F83178BD4}"/>
+          <p:cNvPr id="8" name="Grafik 7">
+            <a:extLst>
+              <a:ext uri="{FF2B5EF4-FFF2-40B4-BE49-F238E27FC236}">
+                <a16:creationId xmlns:a16="http://schemas.microsoft.com/office/drawing/2014/main" id="{2A481766-6BBF-499E-B510-BC55402486DB}"/>
               </a:ext>
             </a:extLst>
           </p:cNvPr>
@@ -3693,6 +3693,114 @@
         </p:nvPicPr>
         <p:blipFill>
           <a:blip r:embed="rId3">
+            <a:extLst>
+              <a:ext uri="{28A0092B-C50C-407E-A947-70E740481C1C}">
+                <a14:useLocalDpi xmlns:a14="http://schemas.microsoft.com/office/drawing/2010/main" val="0"/>
+              </a:ext>
+            </a:extLst>
+          </a:blip>
+          <a:stretch>
+            <a:fillRect/>
+          </a:stretch>
+        </p:blipFill>
+        <p:spPr>
+          <a:xfrm>
+            <a:off x="8712200" y="0"/>
+            <a:ext cx="3479799" cy="6858000"/>
+          </a:xfrm>
+          <a:prstGeom prst="rect">
+            <a:avLst/>
+          </a:prstGeom>
+        </p:spPr>
+      </p:pic>
+      <p:pic>
+        <p:nvPicPr>
+          <p:cNvPr id="6" name="Grafik 5">
+            <a:extLst>
+              <a:ext uri="{FF2B5EF4-FFF2-40B4-BE49-F238E27FC236}">
+                <a16:creationId xmlns:a16="http://schemas.microsoft.com/office/drawing/2014/main" id="{C3ABE3FD-9BBA-4FFD-A17A-E648B0CA7484}"/>
+              </a:ext>
+            </a:extLst>
+          </p:cNvPr>
+          <p:cNvPicPr>
+            <a:picLocks noChangeAspect="1"/>
+          </p:cNvPicPr>
+          <p:nvPr/>
+        </p:nvPicPr>
+        <p:blipFill>
+          <a:blip r:embed="rId4">
+            <a:extLst>
+              <a:ext uri="{28A0092B-C50C-407E-A947-70E740481C1C}">
+                <a14:useLocalDpi xmlns:a14="http://schemas.microsoft.com/office/drawing/2010/main" val="0"/>
+              </a:ext>
+            </a:extLst>
+          </a:blip>
+          <a:stretch>
+            <a:fillRect/>
+          </a:stretch>
+        </p:blipFill>
+        <p:spPr>
+          <a:xfrm>
+            <a:off x="3873500" y="0"/>
+            <a:ext cx="4838698" cy="6858000"/>
+          </a:xfrm>
+          <a:prstGeom prst="rect">
+            <a:avLst/>
+          </a:prstGeom>
+        </p:spPr>
+      </p:pic>
+      <p:pic>
+        <p:nvPicPr>
+          <p:cNvPr id="4" name="Grafik 3">
+            <a:extLst>
+              <a:ext uri="{FF2B5EF4-FFF2-40B4-BE49-F238E27FC236}">
+                <a16:creationId xmlns:a16="http://schemas.microsoft.com/office/drawing/2014/main" id="{C77D36BF-122B-4A1A-A8DC-64543FC271AA}"/>
+              </a:ext>
+            </a:extLst>
+          </p:cNvPr>
+          <p:cNvPicPr>
+            <a:picLocks noChangeAspect="1"/>
+          </p:cNvPicPr>
+          <p:nvPr/>
+        </p:nvPicPr>
+        <p:blipFill>
+          <a:blip r:embed="rId5">
+            <a:extLst>
+              <a:ext uri="{28A0092B-C50C-407E-A947-70E740481C1C}">
+                <a14:useLocalDpi xmlns:a14="http://schemas.microsoft.com/office/drawing/2010/main" val="0"/>
+              </a:ext>
+            </a:extLst>
+          </a:blip>
+          <a:stretch>
+            <a:fillRect/>
+          </a:stretch>
+        </p:blipFill>
+        <p:spPr>
+          <a:xfrm>
+            <a:off x="0" y="0"/>
+            <a:ext cx="3873498" cy="6858000"/>
+          </a:xfrm>
+          <a:prstGeom prst="rect">
+            <a:avLst/>
+          </a:prstGeom>
+        </p:spPr>
+      </p:pic>
+      <p:pic>
+        <p:nvPicPr>
+          <p:cNvPr id="11" name="Frage">
+            <a:extLst>
+              <a:ext uri="{FF2B5EF4-FFF2-40B4-BE49-F238E27FC236}">
+                <a16:creationId xmlns:a16="http://schemas.microsoft.com/office/drawing/2014/main" id="{4B374485-A546-4868-A561-A69F83178BD4}"/>
+              </a:ext>
+            </a:extLst>
+          </p:cNvPr>
+          <p:cNvPicPr>
+            <a:picLocks noChangeAspect="1"/>
+          </p:cNvPicPr>
+          <p:nvPr/>
+        </p:nvPicPr>
+        <p:blipFill>
+          <a:blip r:embed="rId6">
             <a:extLst>
               <a:ext uri="{28A0092B-C50C-407E-A947-70E740481C1C}">
                 <a14:useLocalDpi xmlns:a14="http://schemas.microsoft.com/office/drawing/2010/main" val="0"/>
@@ -3804,6 +3912,165 @@
                                         </p:cTn>
                                         <p:tgtEl>
                                           <p:spTgt spid="11"/>
+                                        </p:tgtEl>
+                                        <p:attrNameLst>
+                                          <p:attrName>style.visibility</p:attrName>
+                                        </p:attrNameLst>
+                                      </p:cBhvr>
+                                      <p:to>
+                                        <p:strVal val="hidden"/>
+                                      </p:to>
+                                    </p:set>
+                                  </p:childTnLst>
+                                </p:cTn>
+                              </p:par>
+                            </p:childTnLst>
+                          </p:cTn>
+                        </p:par>
+                      </p:childTnLst>
+                    </p:cTn>
+                  </p:par>
+                  <p:par>
+                    <p:cTn id="9" fill="hold">
+                      <p:stCondLst>
+                        <p:cond delay="indefinite"/>
+                      </p:stCondLst>
+                      <p:childTnLst>
+                        <p:par>
+                          <p:cTn id="10" fill="hold">
+                            <p:stCondLst>
+                              <p:cond delay="0"/>
+                            </p:stCondLst>
+                            <p:childTnLst>
+                              <p:par>
+                                <p:cTn id="11" presetID="10" presetClass="exit" presetSubtype="0" fill="hold" nodeType="clickEffect">
+                                  <p:stCondLst>
+                                    <p:cond delay="0"/>
+                                  </p:stCondLst>
+                                  <p:childTnLst>
+                                    <p:animEffect transition="out" filter="fade">
+                                      <p:cBhvr>
+                                        <p:cTn id="12" dur="500"/>
+                                        <p:tgtEl>
+                                          <p:spTgt spid="4"/>
+                                        </p:tgtEl>
+                                      </p:cBhvr>
+                                    </p:animEffect>
+                                    <p:set>
+                                      <p:cBhvr>
+                                        <p:cTn id="13" dur="1" fill="hold">
+                                          <p:stCondLst>
+                                            <p:cond delay="499"/>
+                                          </p:stCondLst>
+                                        </p:cTn>
+                                        <p:tgtEl>
+                                          <p:spTgt spid="4"/>
+                                        </p:tgtEl>
+                                        <p:attrNameLst>
+                                          <p:attrName>style.visibility</p:attrName>
+                                        </p:attrNameLst>
+                                      </p:cBhvr>
+                                      <p:to>
+                                        <p:strVal val="hidden"/>
+                                      </p:to>
+                                    </p:set>
+                                  </p:childTnLst>
+                                </p:cTn>
+                              </p:par>
+                            </p:childTnLst>
+                          </p:cTn>
+                        </p:par>
+                      </p:childTnLst>
+                    </p:cTn>
+                  </p:par>
+                  <p:par>
+                    <p:cTn id="14" fill="hold">
+                      <p:stCondLst>
+                        <p:cond delay="indefinite"/>
+                      </p:stCondLst>
+                      <p:childTnLst>
+                        <p:par>
+                          <p:cTn id="15" fill="hold">
+                            <p:stCondLst>
+                              <p:cond delay="0"/>
+                            </p:stCondLst>
+                            <p:childTnLst>
+                              <p:par>
+                                <p:cTn id="16" presetID="10" presetClass="exit" presetSubtype="0" fill="hold" nodeType="clickEffect">
+                                  <p:stCondLst>
+                                    <p:cond delay="0"/>
+                                  </p:stCondLst>
+                                  <p:childTnLst>
+                                    <p:animEffect transition="out" filter="fade">
+                                      <p:cBhvr>
+                                        <p:cTn id="17" dur="500"/>
+                                        <p:tgtEl>
+                                          <p:spTgt spid="6"/>
+                                        </p:tgtEl>
+                                      </p:cBhvr>
+                                    </p:animEffect>
+                                    <p:set>
+                                      <p:cBhvr>
+                                        <p:cTn id="18" dur="1" fill="hold">
+                                          <p:stCondLst>
+                                            <p:cond delay="499"/>
+                                          </p:stCondLst>
+                                        </p:cTn>
+                                        <p:tgtEl>
+                                          <p:spTgt spid="6"/>
+                                        </p:tgtEl>
+                                        <p:attrNameLst>
+                                          <p:attrName>style.visibility</p:attrName>
+                                        </p:attrNameLst>
+                                      </p:cBhvr>
+                                      <p:to>
+                                        <p:strVal val="hidden"/>
+                                      </p:to>
+                                    </p:set>
+                                  </p:childTnLst>
+                                </p:cTn>
+                              </p:par>
+                            </p:childTnLst>
+                          </p:cTn>
+                        </p:par>
+                      </p:childTnLst>
+                    </p:cTn>
+                  </p:par>
+                  <p:par>
+                    <p:cTn id="19" fill="hold">
+                      <p:stCondLst>
+                        <p:cond delay="indefinite"/>
+                      </p:stCondLst>
+                      <p:childTnLst>
+                        <p:par>
+                          <p:cTn id="20" fill="hold">
+                            <p:stCondLst>
+                              <p:cond delay="0"/>
+                            </p:stCondLst>
+                            <p:childTnLst>
+                              <p:par>
+                                <p:cTn id="21" presetID="10" presetClass="exit" presetSubtype="0" fill="hold" nodeType="clickEffect">
+                                  <p:stCondLst>
+                                    <p:cond delay="0"/>
+                                  </p:stCondLst>
+                                  <p:childTnLst>
+                                    <p:animEffect transition="out" filter="fade">
+                                      <p:cBhvr>
+                                        <p:cTn id="22" dur="500"/>
+                                        <p:tgtEl>
+                                          <p:spTgt spid="8"/>
+                                        </p:tgtEl>
+                                      </p:cBhvr>
+                                    </p:animEffect>
+                                    <p:set>
+                                      <p:cBhvr>
+                                        <p:cTn id="23" dur="1" fill="hold">
+                                          <p:stCondLst>
+                                            <p:cond delay="499"/>
+                                          </p:stCondLst>
+                                        </p:cTn>
+                                        <p:tgtEl>
+                                          <p:spTgt spid="8"/>
                                         </p:tgtEl>
                                         <p:attrNameLst>
                                           <p:attrName>style.visibility</p:attrName>
@@ -4608,10 +4875,10 @@
       </p:pic>
       <p:pic>
         <p:nvPicPr>
-          <p:cNvPr id="3" name="Grafik 2">
-            <a:extLst>
-              <a:ext uri="{FF2B5EF4-FFF2-40B4-BE49-F238E27FC236}">
-                <a16:creationId xmlns:a16="http://schemas.microsoft.com/office/drawing/2014/main" id="{B289DC74-FBA4-446F-BC6D-8601A089CB1D}"/>
+          <p:cNvPr id="11" name="Grafik 10">
+            <a:extLst>
+              <a:ext uri="{FF2B5EF4-FFF2-40B4-BE49-F238E27FC236}">
+                <a16:creationId xmlns:a16="http://schemas.microsoft.com/office/drawing/2014/main" id="{0EC89705-C167-4AD4-B75B-DB913BE3BD9D}"/>
               </a:ext>
             </a:extLst>
           </p:cNvPr>
@@ -4622,6 +4889,114 @@
         </p:nvPicPr>
         <p:blipFill>
           <a:blip r:embed="rId3">
+            <a:extLst>
+              <a:ext uri="{28A0092B-C50C-407E-A947-70E740481C1C}">
+                <a14:useLocalDpi xmlns:a14="http://schemas.microsoft.com/office/drawing/2010/main" val="0"/>
+              </a:ext>
+            </a:extLst>
+          </a:blip>
+          <a:stretch>
+            <a:fillRect/>
+          </a:stretch>
+        </p:blipFill>
+        <p:spPr>
+          <a:xfrm>
+            <a:off x="0" y="107950"/>
+            <a:ext cx="12192000" cy="6750050"/>
+          </a:xfrm>
+          <a:prstGeom prst="rect">
+            <a:avLst/>
+          </a:prstGeom>
+        </p:spPr>
+      </p:pic>
+      <p:pic>
+        <p:nvPicPr>
+          <p:cNvPr id="13" name="Grafik 12">
+            <a:extLst>
+              <a:ext uri="{FF2B5EF4-FFF2-40B4-BE49-F238E27FC236}">
+                <a16:creationId xmlns:a16="http://schemas.microsoft.com/office/drawing/2014/main" id="{455E0521-A0B3-444E-9987-EAD300927AA4}"/>
+              </a:ext>
+            </a:extLst>
+          </p:cNvPr>
+          <p:cNvPicPr>
+            <a:picLocks noChangeAspect="1"/>
+          </p:cNvPicPr>
+          <p:nvPr/>
+        </p:nvPicPr>
+        <p:blipFill>
+          <a:blip r:embed="rId4">
+            <a:extLst>
+              <a:ext uri="{28A0092B-C50C-407E-A947-70E740481C1C}">
+                <a14:useLocalDpi xmlns:a14="http://schemas.microsoft.com/office/drawing/2010/main" val="0"/>
+              </a:ext>
+            </a:extLst>
+          </a:blip>
+          <a:stretch>
+            <a:fillRect/>
+          </a:stretch>
+        </p:blipFill>
+        <p:spPr>
+          <a:xfrm>
+            <a:off x="3530873" y="376891"/>
+            <a:ext cx="8661127" cy="6104218"/>
+          </a:xfrm>
+          <a:prstGeom prst="rect">
+            <a:avLst/>
+          </a:prstGeom>
+        </p:spPr>
+      </p:pic>
+      <p:pic>
+        <p:nvPicPr>
+          <p:cNvPr id="15" name="Grafik 14">
+            <a:extLst>
+              <a:ext uri="{FF2B5EF4-FFF2-40B4-BE49-F238E27FC236}">
+                <a16:creationId xmlns:a16="http://schemas.microsoft.com/office/drawing/2014/main" id="{4856FFE2-337A-4573-910E-0E9BFDD70929}"/>
+              </a:ext>
+            </a:extLst>
+          </p:cNvPr>
+          <p:cNvPicPr>
+            <a:picLocks noChangeAspect="1"/>
+          </p:cNvPicPr>
+          <p:nvPr/>
+        </p:nvPicPr>
+        <p:blipFill>
+          <a:blip r:embed="rId5">
+            <a:extLst>
+              <a:ext uri="{28A0092B-C50C-407E-A947-70E740481C1C}">
+                <a14:useLocalDpi xmlns:a14="http://schemas.microsoft.com/office/drawing/2010/main" val="0"/>
+              </a:ext>
+            </a:extLst>
+          </a:blip>
+          <a:stretch>
+            <a:fillRect/>
+          </a:stretch>
+        </p:blipFill>
+        <p:spPr>
+          <a:xfrm>
+            <a:off x="7347480" y="1146873"/>
+            <a:ext cx="5066663" cy="4797008"/>
+          </a:xfrm>
+          <a:prstGeom prst="rect">
+            <a:avLst/>
+          </a:prstGeom>
+        </p:spPr>
+      </p:pic>
+      <p:pic>
+        <p:nvPicPr>
+          <p:cNvPr id="3" name="Grafik 2">
+            <a:extLst>
+              <a:ext uri="{FF2B5EF4-FFF2-40B4-BE49-F238E27FC236}">
+                <a16:creationId xmlns:a16="http://schemas.microsoft.com/office/drawing/2014/main" id="{B289DC74-FBA4-446F-BC6D-8601A089CB1D}"/>
+              </a:ext>
+            </a:extLst>
+          </p:cNvPr>
+          <p:cNvPicPr>
+            <a:picLocks noChangeAspect="1"/>
+          </p:cNvPicPr>
+          <p:nvPr/>
+        </p:nvPicPr>
+        <p:blipFill>
+          <a:blip r:embed="rId6">
             <a:extLst>
               <a:ext uri="{28A0092B-C50C-407E-A947-70E740481C1C}">
                 <a14:useLocalDpi xmlns:a14="http://schemas.microsoft.com/office/drawing/2010/main" val="0"/>
@@ -4733,6 +5108,165 @@
                                         </p:cTn>
                                         <p:tgtEl>
                                           <p:spTgt spid="3"/>
+                                        </p:tgtEl>
+                                        <p:attrNameLst>
+                                          <p:attrName>style.visibility</p:attrName>
+                                        </p:attrNameLst>
+                                      </p:cBhvr>
+                                      <p:to>
+                                        <p:strVal val="hidden"/>
+                                      </p:to>
+                                    </p:set>
+                                  </p:childTnLst>
+                                </p:cTn>
+                              </p:par>
+                            </p:childTnLst>
+                          </p:cTn>
+                        </p:par>
+                      </p:childTnLst>
+                    </p:cTn>
+                  </p:par>
+                  <p:par>
+                    <p:cTn id="9" fill="hold">
+                      <p:stCondLst>
+                        <p:cond delay="indefinite"/>
+                      </p:stCondLst>
+                      <p:childTnLst>
+                        <p:par>
+                          <p:cTn id="10" fill="hold">
+                            <p:stCondLst>
+                              <p:cond delay="0"/>
+                            </p:stCondLst>
+                            <p:childTnLst>
+                              <p:par>
+                                <p:cTn id="11" presetID="10" presetClass="exit" presetSubtype="0" fill="hold" nodeType="clickEffect">
+                                  <p:stCondLst>
+                                    <p:cond delay="0"/>
+                                  </p:stCondLst>
+                                  <p:childTnLst>
+                                    <p:animEffect transition="out" filter="fade">
+                                      <p:cBhvr>
+                                        <p:cTn id="12" dur="500"/>
+                                        <p:tgtEl>
+                                          <p:spTgt spid="15"/>
+                                        </p:tgtEl>
+                                      </p:cBhvr>
+                                    </p:animEffect>
+                                    <p:set>
+                                      <p:cBhvr>
+                                        <p:cTn id="13" dur="1" fill="hold">
+                                          <p:stCondLst>
+                                            <p:cond delay="499"/>
+                                          </p:stCondLst>
+                                        </p:cTn>
+                                        <p:tgtEl>
+                                          <p:spTgt spid="15"/>
+                                        </p:tgtEl>
+                                        <p:attrNameLst>
+                                          <p:attrName>style.visibility</p:attrName>
+                                        </p:attrNameLst>
+                                      </p:cBhvr>
+                                      <p:to>
+                                        <p:strVal val="hidden"/>
+                                      </p:to>
+                                    </p:set>
+                                  </p:childTnLst>
+                                </p:cTn>
+                              </p:par>
+                            </p:childTnLst>
+                          </p:cTn>
+                        </p:par>
+                      </p:childTnLst>
+                    </p:cTn>
+                  </p:par>
+                  <p:par>
+                    <p:cTn id="14" fill="hold">
+                      <p:stCondLst>
+                        <p:cond delay="indefinite"/>
+                      </p:stCondLst>
+                      <p:childTnLst>
+                        <p:par>
+                          <p:cTn id="15" fill="hold">
+                            <p:stCondLst>
+                              <p:cond delay="0"/>
+                            </p:stCondLst>
+                            <p:childTnLst>
+                              <p:par>
+                                <p:cTn id="16" presetID="10" presetClass="exit" presetSubtype="0" fill="hold" nodeType="clickEffect">
+                                  <p:stCondLst>
+                                    <p:cond delay="0"/>
+                                  </p:stCondLst>
+                                  <p:childTnLst>
+                                    <p:animEffect transition="out" filter="fade">
+                                      <p:cBhvr>
+                                        <p:cTn id="17" dur="500"/>
+                                        <p:tgtEl>
+                                          <p:spTgt spid="13"/>
+                                        </p:tgtEl>
+                                      </p:cBhvr>
+                                    </p:animEffect>
+                                    <p:set>
+                                      <p:cBhvr>
+                                        <p:cTn id="18" dur="1" fill="hold">
+                                          <p:stCondLst>
+                                            <p:cond delay="499"/>
+                                          </p:stCondLst>
+                                        </p:cTn>
+                                        <p:tgtEl>
+                                          <p:spTgt spid="13"/>
+                                        </p:tgtEl>
+                                        <p:attrNameLst>
+                                          <p:attrName>style.visibility</p:attrName>
+                                        </p:attrNameLst>
+                                      </p:cBhvr>
+                                      <p:to>
+                                        <p:strVal val="hidden"/>
+                                      </p:to>
+                                    </p:set>
+                                  </p:childTnLst>
+                                </p:cTn>
+                              </p:par>
+                            </p:childTnLst>
+                          </p:cTn>
+                        </p:par>
+                      </p:childTnLst>
+                    </p:cTn>
+                  </p:par>
+                  <p:par>
+                    <p:cTn id="19" fill="hold">
+                      <p:stCondLst>
+                        <p:cond delay="indefinite"/>
+                      </p:stCondLst>
+                      <p:childTnLst>
+                        <p:par>
+                          <p:cTn id="20" fill="hold">
+                            <p:stCondLst>
+                              <p:cond delay="0"/>
+                            </p:stCondLst>
+                            <p:childTnLst>
+                              <p:par>
+                                <p:cTn id="21" presetID="10" presetClass="exit" presetSubtype="0" fill="hold" nodeType="clickEffect">
+                                  <p:stCondLst>
+                                    <p:cond delay="0"/>
+                                  </p:stCondLst>
+                                  <p:childTnLst>
+                                    <p:animEffect transition="out" filter="fade">
+                                      <p:cBhvr>
+                                        <p:cTn id="22" dur="500"/>
+                                        <p:tgtEl>
+                                          <p:spTgt spid="11"/>
+                                        </p:tgtEl>
+                                      </p:cBhvr>
+                                    </p:animEffect>
+                                    <p:set>
+                                      <p:cBhvr>
+                                        <p:cTn id="23" dur="1" fill="hold">
+                                          <p:stCondLst>
+                                            <p:cond delay="499"/>
+                                          </p:stCondLst>
+                                        </p:cTn>
+                                        <p:tgtEl>
+                                          <p:spTgt spid="11"/>
                                         </p:tgtEl>
                                         <p:attrNameLst>
                                           <p:attrName>style.visibility</p:attrName>

</xml_diff>

<commit_message>
Vortrag - Ich habe das Datenflussdiagramm in den Vortrag eingebaut. Ich habe die Reihenfolge der Folien angepasst. Ich habe einige Grafike zu den Wünschen an Herrn Quast erstellt.
</commit_message>
<xml_diff>
--- a/Präsentation/Vortrag - Pflichtenheft.pptx
+++ b/Präsentation/Vortrag - Pflichtenheft.pptx
@@ -6,9 +6,11 @@
   </p:sldMasterIdLst>
   <p:sldIdLst>
     <p:sldId id="256" r:id="rId2"/>
-    <p:sldId id="258" r:id="rId3"/>
-    <p:sldId id="260" r:id="rId4"/>
-    <p:sldId id="259" r:id="rId5"/>
+    <p:sldId id="260" r:id="rId3"/>
+    <p:sldId id="258" r:id="rId4"/>
+    <p:sldId id="262" r:id="rId5"/>
+    <p:sldId id="259" r:id="rId6"/>
+    <p:sldId id="261" r:id="rId7"/>
   </p:sldIdLst>
   <p:sldSz cx="12192000" cy="6858000"/>
   <p:notesSz cx="6858000" cy="9144000"/>
@@ -115,6 +117,32 @@
 </p:presentation>
 </file>
 
+<file path=ppt/commentAuthors.xml><?xml version="1.0" encoding="utf-8"?>
+<p:cmAuthorLst xmlns:a="http://schemas.openxmlformats.org/drawingml/2006/main" xmlns:r="http://schemas.openxmlformats.org/officeDocument/2006/relationships" xmlns:p="http://schemas.openxmlformats.org/presentationml/2006/main">
+  <p:cmAuthor id="1" name="Erika Toll" initials="ET" lastIdx="1" clrIdx="0">
+    <p:extLst>
+      <p:ext uri="{19B8F6BF-5375-455C-9EA6-DF929625EA0E}">
+        <p15:presenceInfo xmlns:p15="http://schemas.microsoft.com/office/powerpoint/2012/main" userId="Erika Toll" providerId="None"/>
+      </p:ext>
+    </p:extLst>
+  </p:cmAuthor>
+</p:cmAuthorLst>
+</file>
+
+<file path=ppt/comments/comment1.xml><?xml version="1.0" encoding="utf-8"?>
+<p:cmLst xmlns:a="http://schemas.openxmlformats.org/drawingml/2006/main" xmlns:r="http://schemas.openxmlformats.org/officeDocument/2006/relationships" xmlns:p="http://schemas.openxmlformats.org/presentationml/2006/main">
+  <p:cm authorId="1" dt="2019-06-12T06:15:48.419" idx="1">
+    <p:pos x="1632" y="0"/>
+    <p:text/>
+    <p:extLst>
+      <p:ext uri="{C676402C-5697-4E1C-873F-D02D1690AC5C}">
+        <p15:threadingInfo xmlns:p15="http://schemas.microsoft.com/office/powerpoint/2012/main" timeZoneBias="-120"/>
+      </p:ext>
+    </p:extLst>
+  </p:cm>
+</p:cmLst>
+</file>
+
 <file path=ppt/slideLayouts/slideLayout1.xml><?xml version="1.0" encoding="utf-8"?>
 <p:sldLayout xmlns:a="http://schemas.openxmlformats.org/drawingml/2006/main" xmlns:r="http://schemas.openxmlformats.org/officeDocument/2006/relationships" xmlns:p="http://schemas.openxmlformats.org/presentationml/2006/main" type="title" preserve="1">
   <p:cSld name="Titelfolie">
@@ -262,7 +290,7 @@
           <a:p>
             <a:fld id="{83E01541-7F0C-40FA-847C-30086A64F924}" type="datetimeFigureOut">
               <a:rPr lang="de-DE" smtClean="0"/>
-              <a:t>10.06.2019</a:t>
+              <a:t>12.06.2019</a:t>
             </a:fld>
             <a:endParaRPr lang="de-DE"/>
           </a:p>
@@ -460,7 +488,7 @@
           <a:p>
             <a:fld id="{83E01541-7F0C-40FA-847C-30086A64F924}" type="datetimeFigureOut">
               <a:rPr lang="de-DE" smtClean="0"/>
-              <a:t>10.06.2019</a:t>
+              <a:t>12.06.2019</a:t>
             </a:fld>
             <a:endParaRPr lang="de-DE"/>
           </a:p>
@@ -668,7 +696,7 @@
           <a:p>
             <a:fld id="{83E01541-7F0C-40FA-847C-30086A64F924}" type="datetimeFigureOut">
               <a:rPr lang="de-DE" smtClean="0"/>
-              <a:t>10.06.2019</a:t>
+              <a:t>12.06.2019</a:t>
             </a:fld>
             <a:endParaRPr lang="de-DE"/>
           </a:p>
@@ -866,7 +894,7 @@
           <a:p>
             <a:fld id="{83E01541-7F0C-40FA-847C-30086A64F924}" type="datetimeFigureOut">
               <a:rPr lang="de-DE" smtClean="0"/>
-              <a:t>10.06.2019</a:t>
+              <a:t>12.06.2019</a:t>
             </a:fld>
             <a:endParaRPr lang="de-DE"/>
           </a:p>
@@ -1141,7 +1169,7 @@
           <a:p>
             <a:fld id="{83E01541-7F0C-40FA-847C-30086A64F924}" type="datetimeFigureOut">
               <a:rPr lang="de-DE" smtClean="0"/>
-              <a:t>10.06.2019</a:t>
+              <a:t>12.06.2019</a:t>
             </a:fld>
             <a:endParaRPr lang="de-DE"/>
           </a:p>
@@ -1406,7 +1434,7 @@
           <a:p>
             <a:fld id="{83E01541-7F0C-40FA-847C-30086A64F924}" type="datetimeFigureOut">
               <a:rPr lang="de-DE" smtClean="0"/>
-              <a:t>10.06.2019</a:t>
+              <a:t>12.06.2019</a:t>
             </a:fld>
             <a:endParaRPr lang="de-DE"/>
           </a:p>
@@ -1818,7 +1846,7 @@
           <a:p>
             <a:fld id="{83E01541-7F0C-40FA-847C-30086A64F924}" type="datetimeFigureOut">
               <a:rPr lang="de-DE" smtClean="0"/>
-              <a:t>10.06.2019</a:t>
+              <a:t>12.06.2019</a:t>
             </a:fld>
             <a:endParaRPr lang="de-DE"/>
           </a:p>
@@ -1959,7 +1987,7 @@
           <a:p>
             <a:fld id="{83E01541-7F0C-40FA-847C-30086A64F924}" type="datetimeFigureOut">
               <a:rPr lang="de-DE" smtClean="0"/>
-              <a:t>10.06.2019</a:t>
+              <a:t>12.06.2019</a:t>
             </a:fld>
             <a:endParaRPr lang="de-DE"/>
           </a:p>
@@ -2072,7 +2100,7 @@
           <a:p>
             <a:fld id="{83E01541-7F0C-40FA-847C-30086A64F924}" type="datetimeFigureOut">
               <a:rPr lang="de-DE" smtClean="0"/>
-              <a:t>10.06.2019</a:t>
+              <a:t>12.06.2019</a:t>
             </a:fld>
             <a:endParaRPr lang="de-DE"/>
           </a:p>
@@ -2383,7 +2411,7 @@
           <a:p>
             <a:fld id="{83E01541-7F0C-40FA-847C-30086A64F924}" type="datetimeFigureOut">
               <a:rPr lang="de-DE" smtClean="0"/>
-              <a:t>10.06.2019</a:t>
+              <a:t>12.06.2019</a:t>
             </a:fld>
             <a:endParaRPr lang="de-DE"/>
           </a:p>
@@ -2671,7 +2699,7 @@
           <a:p>
             <a:fld id="{83E01541-7F0C-40FA-847C-30086A64F924}" type="datetimeFigureOut">
               <a:rPr lang="de-DE" smtClean="0"/>
-              <a:t>10.06.2019</a:t>
+              <a:t>12.06.2019</a:t>
             </a:fld>
             <a:endParaRPr lang="de-DE"/>
           </a:p>
@@ -2912,7 +2940,7 @@
           <a:p>
             <a:fld id="{83E01541-7F0C-40FA-847C-30086A64F924}" type="datetimeFigureOut">
               <a:rPr lang="de-DE" smtClean="0"/>
-              <a:t>10.06.2019</a:t>
+              <a:t>12.06.2019</a:t>
             </a:fld>
             <a:endParaRPr lang="de-DE"/>
           </a:p>
@@ -3625,496 +3653,6 @@
 </file>
 
 <file path=ppt/slides/slide2.xml><?xml version="1.0" encoding="utf-8"?>
-<p:sld xmlns:a="http://schemas.openxmlformats.org/drawingml/2006/main" xmlns:r="http://schemas.openxmlformats.org/officeDocument/2006/relationships" xmlns:p="http://schemas.openxmlformats.org/presentationml/2006/main">
-  <p:cSld>
-    <p:spTree>
-      <p:nvGrpSpPr>
-        <p:cNvPr id="1" name=""/>
-        <p:cNvGrpSpPr/>
-        <p:nvPr/>
-      </p:nvGrpSpPr>
-      <p:grpSpPr>
-        <a:xfrm>
-          <a:off x="0" y="0"/>
-          <a:ext cx="0" cy="0"/>
-          <a:chOff x="0" y="0"/>
-          <a:chExt cx="0" cy="0"/>
-        </a:xfrm>
-      </p:grpSpPr>
-      <p:pic>
-        <p:nvPicPr>
-          <p:cNvPr id="3" name="Grafik 2">
-            <a:extLst>
-              <a:ext uri="{FF2B5EF4-FFF2-40B4-BE49-F238E27FC236}">
-                <a16:creationId xmlns:a16="http://schemas.microsoft.com/office/drawing/2014/main" id="{67A1B990-5EBC-4BA2-8E67-01626C050428}"/>
-              </a:ext>
-            </a:extLst>
-          </p:cNvPr>
-          <p:cNvPicPr>
-            <a:picLocks noChangeAspect="1"/>
-          </p:cNvPicPr>
-          <p:nvPr/>
-        </p:nvPicPr>
-        <p:blipFill>
-          <a:blip r:embed="rId2">
-            <a:extLst>
-              <a:ext uri="{28A0092B-C50C-407E-A947-70E740481C1C}">
-                <a14:useLocalDpi xmlns:a14="http://schemas.microsoft.com/office/drawing/2010/main" val="0"/>
-              </a:ext>
-            </a:extLst>
-          </a:blip>
-          <a:stretch>
-            <a:fillRect/>
-          </a:stretch>
-        </p:blipFill>
-        <p:spPr>
-          <a:xfrm>
-            <a:off x="0" y="0"/>
-            <a:ext cx="12192000" cy="6858000"/>
-          </a:xfrm>
-          <a:prstGeom prst="rect">
-            <a:avLst/>
-          </a:prstGeom>
-        </p:spPr>
-      </p:pic>
-      <p:pic>
-        <p:nvPicPr>
-          <p:cNvPr id="8" name="Grafik 7">
-            <a:extLst>
-              <a:ext uri="{FF2B5EF4-FFF2-40B4-BE49-F238E27FC236}">
-                <a16:creationId xmlns:a16="http://schemas.microsoft.com/office/drawing/2014/main" id="{2A481766-6BBF-499E-B510-BC55402486DB}"/>
-              </a:ext>
-            </a:extLst>
-          </p:cNvPr>
-          <p:cNvPicPr>
-            <a:picLocks noChangeAspect="1"/>
-          </p:cNvPicPr>
-          <p:nvPr/>
-        </p:nvPicPr>
-        <p:blipFill>
-          <a:blip r:embed="rId3">
-            <a:extLst>
-              <a:ext uri="{28A0092B-C50C-407E-A947-70E740481C1C}">
-                <a14:useLocalDpi xmlns:a14="http://schemas.microsoft.com/office/drawing/2010/main" val="0"/>
-              </a:ext>
-            </a:extLst>
-          </a:blip>
-          <a:stretch>
-            <a:fillRect/>
-          </a:stretch>
-        </p:blipFill>
-        <p:spPr>
-          <a:xfrm>
-            <a:off x="8712200" y="0"/>
-            <a:ext cx="3479799" cy="6858000"/>
-          </a:xfrm>
-          <a:prstGeom prst="rect">
-            <a:avLst/>
-          </a:prstGeom>
-        </p:spPr>
-      </p:pic>
-      <p:pic>
-        <p:nvPicPr>
-          <p:cNvPr id="6" name="Grafik 5">
-            <a:extLst>
-              <a:ext uri="{FF2B5EF4-FFF2-40B4-BE49-F238E27FC236}">
-                <a16:creationId xmlns:a16="http://schemas.microsoft.com/office/drawing/2014/main" id="{C3ABE3FD-9BBA-4FFD-A17A-E648B0CA7484}"/>
-              </a:ext>
-            </a:extLst>
-          </p:cNvPr>
-          <p:cNvPicPr>
-            <a:picLocks noChangeAspect="1"/>
-          </p:cNvPicPr>
-          <p:nvPr/>
-        </p:nvPicPr>
-        <p:blipFill>
-          <a:blip r:embed="rId4">
-            <a:extLst>
-              <a:ext uri="{28A0092B-C50C-407E-A947-70E740481C1C}">
-                <a14:useLocalDpi xmlns:a14="http://schemas.microsoft.com/office/drawing/2010/main" val="0"/>
-              </a:ext>
-            </a:extLst>
-          </a:blip>
-          <a:stretch>
-            <a:fillRect/>
-          </a:stretch>
-        </p:blipFill>
-        <p:spPr>
-          <a:xfrm>
-            <a:off x="3873500" y="0"/>
-            <a:ext cx="4838698" cy="6858000"/>
-          </a:xfrm>
-          <a:prstGeom prst="rect">
-            <a:avLst/>
-          </a:prstGeom>
-        </p:spPr>
-      </p:pic>
-      <p:pic>
-        <p:nvPicPr>
-          <p:cNvPr id="4" name="Grafik 3">
-            <a:extLst>
-              <a:ext uri="{FF2B5EF4-FFF2-40B4-BE49-F238E27FC236}">
-                <a16:creationId xmlns:a16="http://schemas.microsoft.com/office/drawing/2014/main" id="{C77D36BF-122B-4A1A-A8DC-64543FC271AA}"/>
-              </a:ext>
-            </a:extLst>
-          </p:cNvPr>
-          <p:cNvPicPr>
-            <a:picLocks noChangeAspect="1"/>
-          </p:cNvPicPr>
-          <p:nvPr/>
-        </p:nvPicPr>
-        <p:blipFill>
-          <a:blip r:embed="rId5">
-            <a:extLst>
-              <a:ext uri="{28A0092B-C50C-407E-A947-70E740481C1C}">
-                <a14:useLocalDpi xmlns:a14="http://schemas.microsoft.com/office/drawing/2010/main" val="0"/>
-              </a:ext>
-            </a:extLst>
-          </a:blip>
-          <a:stretch>
-            <a:fillRect/>
-          </a:stretch>
-        </p:blipFill>
-        <p:spPr>
-          <a:xfrm>
-            <a:off x="0" y="0"/>
-            <a:ext cx="3873498" cy="6858000"/>
-          </a:xfrm>
-          <a:prstGeom prst="rect">
-            <a:avLst/>
-          </a:prstGeom>
-        </p:spPr>
-      </p:pic>
-      <p:pic>
-        <p:nvPicPr>
-          <p:cNvPr id="11" name="Frage">
-            <a:extLst>
-              <a:ext uri="{FF2B5EF4-FFF2-40B4-BE49-F238E27FC236}">
-                <a16:creationId xmlns:a16="http://schemas.microsoft.com/office/drawing/2014/main" id="{4B374485-A546-4868-A561-A69F83178BD4}"/>
-              </a:ext>
-            </a:extLst>
-          </p:cNvPr>
-          <p:cNvPicPr>
-            <a:picLocks noChangeAspect="1"/>
-          </p:cNvPicPr>
-          <p:nvPr/>
-        </p:nvPicPr>
-        <p:blipFill>
-          <a:blip r:embed="rId6">
-            <a:extLst>
-              <a:ext uri="{28A0092B-C50C-407E-A947-70E740481C1C}">
-                <a14:useLocalDpi xmlns:a14="http://schemas.microsoft.com/office/drawing/2010/main" val="0"/>
-              </a:ext>
-            </a:extLst>
-          </a:blip>
-          <a:stretch>
-            <a:fillRect/>
-          </a:stretch>
-        </p:blipFill>
-        <p:spPr>
-          <a:xfrm>
-            <a:off x="0" y="0"/>
-            <a:ext cx="12192000" cy="6858000"/>
-          </a:xfrm>
-          <a:prstGeom prst="rect">
-            <a:avLst/>
-          </a:prstGeom>
-        </p:spPr>
-      </p:pic>
-    </p:spTree>
-    <p:extLst>
-      <p:ext uri="{BB962C8B-B14F-4D97-AF65-F5344CB8AC3E}">
-        <p14:creationId xmlns:p14="http://schemas.microsoft.com/office/powerpoint/2010/main" val="3309358318"/>
-      </p:ext>
-    </p:extLst>
-  </p:cSld>
-  <p:clrMapOvr>
-    <a:masterClrMapping/>
-  </p:clrMapOvr>
-  <p:timing>
-    <p:tnLst>
-      <p:par>
-        <p:cTn id="1" dur="indefinite" restart="never" nodeType="tmRoot">
-          <p:childTnLst>
-            <p:seq concurrent="1" nextAc="seek">
-              <p:cTn id="2" dur="indefinite" nodeType="mainSeq">
-                <p:childTnLst>
-                  <p:par>
-                    <p:cTn id="3" fill="hold">
-                      <p:stCondLst>
-                        <p:cond delay="indefinite"/>
-                      </p:stCondLst>
-                      <p:childTnLst>
-                        <p:par>
-                          <p:cTn id="4" fill="hold">
-                            <p:stCondLst>
-                              <p:cond delay="0"/>
-                            </p:stCondLst>
-                            <p:childTnLst>
-                              <p:par>
-                                <p:cTn id="5" presetID="2" presetClass="exit" presetSubtype="1" fill="hold" nodeType="clickEffect">
-                                  <p:stCondLst>
-                                    <p:cond delay="0"/>
-                                  </p:stCondLst>
-                                  <p:childTnLst>
-                                    <p:anim calcmode="lin" valueType="num">
-                                      <p:cBhvr additive="base">
-                                        <p:cTn id="6" dur="500"/>
-                                        <p:tgtEl>
-                                          <p:spTgt spid="11"/>
-                                        </p:tgtEl>
-                                        <p:attrNameLst>
-                                          <p:attrName>ppt_x</p:attrName>
-                                        </p:attrNameLst>
-                                      </p:cBhvr>
-                                      <p:tavLst>
-                                        <p:tav tm="0">
-                                          <p:val>
-                                            <p:strVal val="ppt_x"/>
-                                          </p:val>
-                                        </p:tav>
-                                        <p:tav tm="100000">
-                                          <p:val>
-                                            <p:strVal val="ppt_x"/>
-                                          </p:val>
-                                        </p:tav>
-                                      </p:tavLst>
-                                    </p:anim>
-                                    <p:anim calcmode="lin" valueType="num">
-                                      <p:cBhvr additive="base">
-                                        <p:cTn id="7" dur="500"/>
-                                        <p:tgtEl>
-                                          <p:spTgt spid="11"/>
-                                        </p:tgtEl>
-                                        <p:attrNameLst>
-                                          <p:attrName>ppt_y</p:attrName>
-                                        </p:attrNameLst>
-                                      </p:cBhvr>
-                                      <p:tavLst>
-                                        <p:tav tm="0">
-                                          <p:val>
-                                            <p:strVal val="ppt_y"/>
-                                          </p:val>
-                                        </p:tav>
-                                        <p:tav tm="100000">
-                                          <p:val>
-                                            <p:strVal val="0-ppt_h/2"/>
-                                          </p:val>
-                                        </p:tav>
-                                      </p:tavLst>
-                                    </p:anim>
-                                    <p:set>
-                                      <p:cBhvr>
-                                        <p:cTn id="8" dur="1" fill="hold">
-                                          <p:stCondLst>
-                                            <p:cond delay="499"/>
-                                          </p:stCondLst>
-                                        </p:cTn>
-                                        <p:tgtEl>
-                                          <p:spTgt spid="11"/>
-                                        </p:tgtEl>
-                                        <p:attrNameLst>
-                                          <p:attrName>style.visibility</p:attrName>
-                                        </p:attrNameLst>
-                                      </p:cBhvr>
-                                      <p:to>
-                                        <p:strVal val="hidden"/>
-                                      </p:to>
-                                    </p:set>
-                                  </p:childTnLst>
-                                </p:cTn>
-                              </p:par>
-                            </p:childTnLst>
-                          </p:cTn>
-                        </p:par>
-                      </p:childTnLst>
-                    </p:cTn>
-                  </p:par>
-                  <p:par>
-                    <p:cTn id="9" fill="hold">
-                      <p:stCondLst>
-                        <p:cond delay="indefinite"/>
-                      </p:stCondLst>
-                      <p:childTnLst>
-                        <p:par>
-                          <p:cTn id="10" fill="hold">
-                            <p:stCondLst>
-                              <p:cond delay="0"/>
-                            </p:stCondLst>
-                            <p:childTnLst>
-                              <p:par>
-                                <p:cTn id="11" presetID="10" presetClass="exit" presetSubtype="0" fill="hold" nodeType="clickEffect">
-                                  <p:stCondLst>
-                                    <p:cond delay="0"/>
-                                  </p:stCondLst>
-                                  <p:childTnLst>
-                                    <p:animEffect transition="out" filter="fade">
-                                      <p:cBhvr>
-                                        <p:cTn id="12" dur="500"/>
-                                        <p:tgtEl>
-                                          <p:spTgt spid="4"/>
-                                        </p:tgtEl>
-                                      </p:cBhvr>
-                                    </p:animEffect>
-                                    <p:set>
-                                      <p:cBhvr>
-                                        <p:cTn id="13" dur="1" fill="hold">
-                                          <p:stCondLst>
-                                            <p:cond delay="499"/>
-                                          </p:stCondLst>
-                                        </p:cTn>
-                                        <p:tgtEl>
-                                          <p:spTgt spid="4"/>
-                                        </p:tgtEl>
-                                        <p:attrNameLst>
-                                          <p:attrName>style.visibility</p:attrName>
-                                        </p:attrNameLst>
-                                      </p:cBhvr>
-                                      <p:to>
-                                        <p:strVal val="hidden"/>
-                                      </p:to>
-                                    </p:set>
-                                  </p:childTnLst>
-                                </p:cTn>
-                              </p:par>
-                            </p:childTnLst>
-                          </p:cTn>
-                        </p:par>
-                      </p:childTnLst>
-                    </p:cTn>
-                  </p:par>
-                  <p:par>
-                    <p:cTn id="14" fill="hold">
-                      <p:stCondLst>
-                        <p:cond delay="indefinite"/>
-                      </p:stCondLst>
-                      <p:childTnLst>
-                        <p:par>
-                          <p:cTn id="15" fill="hold">
-                            <p:stCondLst>
-                              <p:cond delay="0"/>
-                            </p:stCondLst>
-                            <p:childTnLst>
-                              <p:par>
-                                <p:cTn id="16" presetID="10" presetClass="exit" presetSubtype="0" fill="hold" nodeType="clickEffect">
-                                  <p:stCondLst>
-                                    <p:cond delay="0"/>
-                                  </p:stCondLst>
-                                  <p:childTnLst>
-                                    <p:animEffect transition="out" filter="fade">
-                                      <p:cBhvr>
-                                        <p:cTn id="17" dur="500"/>
-                                        <p:tgtEl>
-                                          <p:spTgt spid="6"/>
-                                        </p:tgtEl>
-                                      </p:cBhvr>
-                                    </p:animEffect>
-                                    <p:set>
-                                      <p:cBhvr>
-                                        <p:cTn id="18" dur="1" fill="hold">
-                                          <p:stCondLst>
-                                            <p:cond delay="499"/>
-                                          </p:stCondLst>
-                                        </p:cTn>
-                                        <p:tgtEl>
-                                          <p:spTgt spid="6"/>
-                                        </p:tgtEl>
-                                        <p:attrNameLst>
-                                          <p:attrName>style.visibility</p:attrName>
-                                        </p:attrNameLst>
-                                      </p:cBhvr>
-                                      <p:to>
-                                        <p:strVal val="hidden"/>
-                                      </p:to>
-                                    </p:set>
-                                  </p:childTnLst>
-                                </p:cTn>
-                              </p:par>
-                            </p:childTnLst>
-                          </p:cTn>
-                        </p:par>
-                      </p:childTnLst>
-                    </p:cTn>
-                  </p:par>
-                  <p:par>
-                    <p:cTn id="19" fill="hold">
-                      <p:stCondLst>
-                        <p:cond delay="indefinite"/>
-                      </p:stCondLst>
-                      <p:childTnLst>
-                        <p:par>
-                          <p:cTn id="20" fill="hold">
-                            <p:stCondLst>
-                              <p:cond delay="0"/>
-                            </p:stCondLst>
-                            <p:childTnLst>
-                              <p:par>
-                                <p:cTn id="21" presetID="10" presetClass="exit" presetSubtype="0" fill="hold" nodeType="clickEffect">
-                                  <p:stCondLst>
-                                    <p:cond delay="0"/>
-                                  </p:stCondLst>
-                                  <p:childTnLst>
-                                    <p:animEffect transition="out" filter="fade">
-                                      <p:cBhvr>
-                                        <p:cTn id="22" dur="500"/>
-                                        <p:tgtEl>
-                                          <p:spTgt spid="8"/>
-                                        </p:tgtEl>
-                                      </p:cBhvr>
-                                    </p:animEffect>
-                                    <p:set>
-                                      <p:cBhvr>
-                                        <p:cTn id="23" dur="1" fill="hold">
-                                          <p:stCondLst>
-                                            <p:cond delay="499"/>
-                                          </p:stCondLst>
-                                        </p:cTn>
-                                        <p:tgtEl>
-                                          <p:spTgt spid="8"/>
-                                        </p:tgtEl>
-                                        <p:attrNameLst>
-                                          <p:attrName>style.visibility</p:attrName>
-                                        </p:attrNameLst>
-                                      </p:cBhvr>
-                                      <p:to>
-                                        <p:strVal val="hidden"/>
-                                      </p:to>
-                                    </p:set>
-                                  </p:childTnLst>
-                                </p:cTn>
-                              </p:par>
-                            </p:childTnLst>
-                          </p:cTn>
-                        </p:par>
-                      </p:childTnLst>
-                    </p:cTn>
-                  </p:par>
-                </p:childTnLst>
-              </p:cTn>
-              <p:prevCondLst>
-                <p:cond evt="onPrev" delay="0">
-                  <p:tgtEl>
-                    <p:sldTgt/>
-                  </p:tgtEl>
-                </p:cond>
-              </p:prevCondLst>
-              <p:nextCondLst>
-                <p:cond evt="onNext" delay="0">
-                  <p:tgtEl>
-                    <p:sldTgt/>
-                  </p:tgtEl>
-                </p:cond>
-              </p:nextCondLst>
-            </p:seq>
-          </p:childTnLst>
-        </p:cTn>
-      </p:par>
-    </p:tnLst>
-  </p:timing>
-</p:sld>
-</file>
-
-<file path=ppt/slides/slide3.xml><?xml version="1.0" encoding="utf-8"?>
 <p:sld xmlns:a="http://schemas.openxmlformats.org/drawingml/2006/main" xmlns:r="http://schemas.openxmlformats.org/officeDocument/2006/relationships" xmlns:p="http://schemas.openxmlformats.org/presentationml/2006/main">
   <p:cSld>
     <p:spTree>
@@ -4820,7 +4358,1052 @@
 </p:sld>
 </file>
 
+<file path=ppt/slides/slide3.xml><?xml version="1.0" encoding="utf-8"?>
+<p:sld xmlns:a="http://schemas.openxmlformats.org/drawingml/2006/main" xmlns:r="http://schemas.openxmlformats.org/officeDocument/2006/relationships" xmlns:p="http://schemas.openxmlformats.org/presentationml/2006/main">
+  <p:cSld>
+    <p:spTree>
+      <p:nvGrpSpPr>
+        <p:cNvPr id="1" name=""/>
+        <p:cNvGrpSpPr/>
+        <p:nvPr/>
+      </p:nvGrpSpPr>
+      <p:grpSpPr>
+        <a:xfrm>
+          <a:off x="0" y="0"/>
+          <a:ext cx="0" cy="0"/>
+          <a:chOff x="0" y="0"/>
+          <a:chExt cx="0" cy="0"/>
+        </a:xfrm>
+      </p:grpSpPr>
+      <p:pic>
+        <p:nvPicPr>
+          <p:cNvPr id="3" name="Grafik 2">
+            <a:extLst>
+              <a:ext uri="{FF2B5EF4-FFF2-40B4-BE49-F238E27FC236}">
+                <a16:creationId xmlns:a16="http://schemas.microsoft.com/office/drawing/2014/main" id="{67A1B990-5EBC-4BA2-8E67-01626C050428}"/>
+              </a:ext>
+            </a:extLst>
+          </p:cNvPr>
+          <p:cNvPicPr>
+            <a:picLocks noChangeAspect="1"/>
+          </p:cNvPicPr>
+          <p:nvPr/>
+        </p:nvPicPr>
+        <p:blipFill>
+          <a:blip r:embed="rId2">
+            <a:extLst>
+              <a:ext uri="{28A0092B-C50C-407E-A947-70E740481C1C}">
+                <a14:useLocalDpi xmlns:a14="http://schemas.microsoft.com/office/drawing/2010/main" val="0"/>
+              </a:ext>
+            </a:extLst>
+          </a:blip>
+          <a:stretch>
+            <a:fillRect/>
+          </a:stretch>
+        </p:blipFill>
+        <p:spPr>
+          <a:xfrm>
+            <a:off x="0" y="0"/>
+            <a:ext cx="12192000" cy="6858000"/>
+          </a:xfrm>
+          <a:prstGeom prst="rect">
+            <a:avLst/>
+          </a:prstGeom>
+        </p:spPr>
+      </p:pic>
+      <p:pic>
+        <p:nvPicPr>
+          <p:cNvPr id="8" name="Grafik 7">
+            <a:extLst>
+              <a:ext uri="{FF2B5EF4-FFF2-40B4-BE49-F238E27FC236}">
+                <a16:creationId xmlns:a16="http://schemas.microsoft.com/office/drawing/2014/main" id="{2A481766-6BBF-499E-B510-BC55402486DB}"/>
+              </a:ext>
+            </a:extLst>
+          </p:cNvPr>
+          <p:cNvPicPr>
+            <a:picLocks noChangeAspect="1"/>
+          </p:cNvPicPr>
+          <p:nvPr/>
+        </p:nvPicPr>
+        <p:blipFill>
+          <a:blip r:embed="rId3">
+            <a:extLst>
+              <a:ext uri="{28A0092B-C50C-407E-A947-70E740481C1C}">
+                <a14:useLocalDpi xmlns:a14="http://schemas.microsoft.com/office/drawing/2010/main" val="0"/>
+              </a:ext>
+            </a:extLst>
+          </a:blip>
+          <a:stretch>
+            <a:fillRect/>
+          </a:stretch>
+        </p:blipFill>
+        <p:spPr>
+          <a:xfrm>
+            <a:off x="8712200" y="0"/>
+            <a:ext cx="3479799" cy="6858000"/>
+          </a:xfrm>
+          <a:prstGeom prst="rect">
+            <a:avLst/>
+          </a:prstGeom>
+        </p:spPr>
+      </p:pic>
+      <p:pic>
+        <p:nvPicPr>
+          <p:cNvPr id="6" name="Grafik 5">
+            <a:extLst>
+              <a:ext uri="{FF2B5EF4-FFF2-40B4-BE49-F238E27FC236}">
+                <a16:creationId xmlns:a16="http://schemas.microsoft.com/office/drawing/2014/main" id="{C3ABE3FD-9BBA-4FFD-A17A-E648B0CA7484}"/>
+              </a:ext>
+            </a:extLst>
+          </p:cNvPr>
+          <p:cNvPicPr>
+            <a:picLocks noChangeAspect="1"/>
+          </p:cNvPicPr>
+          <p:nvPr/>
+        </p:nvPicPr>
+        <p:blipFill>
+          <a:blip r:embed="rId4">
+            <a:extLst>
+              <a:ext uri="{28A0092B-C50C-407E-A947-70E740481C1C}">
+                <a14:useLocalDpi xmlns:a14="http://schemas.microsoft.com/office/drawing/2010/main" val="0"/>
+              </a:ext>
+            </a:extLst>
+          </a:blip>
+          <a:stretch>
+            <a:fillRect/>
+          </a:stretch>
+        </p:blipFill>
+        <p:spPr>
+          <a:xfrm>
+            <a:off x="3873500" y="0"/>
+            <a:ext cx="4838698" cy="6858000"/>
+          </a:xfrm>
+          <a:prstGeom prst="rect">
+            <a:avLst/>
+          </a:prstGeom>
+        </p:spPr>
+      </p:pic>
+      <p:pic>
+        <p:nvPicPr>
+          <p:cNvPr id="4" name="Grafik 3">
+            <a:extLst>
+              <a:ext uri="{FF2B5EF4-FFF2-40B4-BE49-F238E27FC236}">
+                <a16:creationId xmlns:a16="http://schemas.microsoft.com/office/drawing/2014/main" id="{C77D36BF-122B-4A1A-A8DC-64543FC271AA}"/>
+              </a:ext>
+            </a:extLst>
+          </p:cNvPr>
+          <p:cNvPicPr>
+            <a:picLocks noChangeAspect="1"/>
+          </p:cNvPicPr>
+          <p:nvPr/>
+        </p:nvPicPr>
+        <p:blipFill>
+          <a:blip r:embed="rId5">
+            <a:extLst>
+              <a:ext uri="{28A0092B-C50C-407E-A947-70E740481C1C}">
+                <a14:useLocalDpi xmlns:a14="http://schemas.microsoft.com/office/drawing/2010/main" val="0"/>
+              </a:ext>
+            </a:extLst>
+          </a:blip>
+          <a:stretch>
+            <a:fillRect/>
+          </a:stretch>
+        </p:blipFill>
+        <p:spPr>
+          <a:xfrm>
+            <a:off x="0" y="0"/>
+            <a:ext cx="3873498" cy="6858000"/>
+          </a:xfrm>
+          <a:prstGeom prst="rect">
+            <a:avLst/>
+          </a:prstGeom>
+        </p:spPr>
+      </p:pic>
+      <p:pic>
+        <p:nvPicPr>
+          <p:cNvPr id="11" name="Frage">
+            <a:extLst>
+              <a:ext uri="{FF2B5EF4-FFF2-40B4-BE49-F238E27FC236}">
+                <a16:creationId xmlns:a16="http://schemas.microsoft.com/office/drawing/2014/main" id="{4B374485-A546-4868-A561-A69F83178BD4}"/>
+              </a:ext>
+            </a:extLst>
+          </p:cNvPr>
+          <p:cNvPicPr>
+            <a:picLocks noChangeAspect="1"/>
+          </p:cNvPicPr>
+          <p:nvPr/>
+        </p:nvPicPr>
+        <p:blipFill>
+          <a:blip r:embed="rId6">
+            <a:extLst>
+              <a:ext uri="{28A0092B-C50C-407E-A947-70E740481C1C}">
+                <a14:useLocalDpi xmlns:a14="http://schemas.microsoft.com/office/drawing/2010/main" val="0"/>
+              </a:ext>
+            </a:extLst>
+          </a:blip>
+          <a:stretch>
+            <a:fillRect/>
+          </a:stretch>
+        </p:blipFill>
+        <p:spPr>
+          <a:xfrm>
+            <a:off x="0" y="0"/>
+            <a:ext cx="12192000" cy="6858000"/>
+          </a:xfrm>
+          <a:prstGeom prst="rect">
+            <a:avLst/>
+          </a:prstGeom>
+        </p:spPr>
+      </p:pic>
+    </p:spTree>
+    <p:extLst>
+      <p:ext uri="{BB962C8B-B14F-4D97-AF65-F5344CB8AC3E}">
+        <p14:creationId xmlns:p14="http://schemas.microsoft.com/office/powerpoint/2010/main" val="3309358318"/>
+      </p:ext>
+    </p:extLst>
+  </p:cSld>
+  <p:clrMapOvr>
+    <a:masterClrMapping/>
+  </p:clrMapOvr>
+  <p:timing>
+    <p:tnLst>
+      <p:par>
+        <p:cTn id="1" dur="indefinite" restart="never" nodeType="tmRoot">
+          <p:childTnLst>
+            <p:seq concurrent="1" nextAc="seek">
+              <p:cTn id="2" dur="indefinite" nodeType="mainSeq">
+                <p:childTnLst>
+                  <p:par>
+                    <p:cTn id="3" fill="hold">
+                      <p:stCondLst>
+                        <p:cond delay="indefinite"/>
+                      </p:stCondLst>
+                      <p:childTnLst>
+                        <p:par>
+                          <p:cTn id="4" fill="hold">
+                            <p:stCondLst>
+                              <p:cond delay="0"/>
+                            </p:stCondLst>
+                            <p:childTnLst>
+                              <p:par>
+                                <p:cTn id="5" presetID="2" presetClass="exit" presetSubtype="1" fill="hold" nodeType="clickEffect">
+                                  <p:stCondLst>
+                                    <p:cond delay="0"/>
+                                  </p:stCondLst>
+                                  <p:childTnLst>
+                                    <p:anim calcmode="lin" valueType="num">
+                                      <p:cBhvr additive="base">
+                                        <p:cTn id="6" dur="500"/>
+                                        <p:tgtEl>
+                                          <p:spTgt spid="11"/>
+                                        </p:tgtEl>
+                                        <p:attrNameLst>
+                                          <p:attrName>ppt_x</p:attrName>
+                                        </p:attrNameLst>
+                                      </p:cBhvr>
+                                      <p:tavLst>
+                                        <p:tav tm="0">
+                                          <p:val>
+                                            <p:strVal val="ppt_x"/>
+                                          </p:val>
+                                        </p:tav>
+                                        <p:tav tm="100000">
+                                          <p:val>
+                                            <p:strVal val="ppt_x"/>
+                                          </p:val>
+                                        </p:tav>
+                                      </p:tavLst>
+                                    </p:anim>
+                                    <p:anim calcmode="lin" valueType="num">
+                                      <p:cBhvr additive="base">
+                                        <p:cTn id="7" dur="500"/>
+                                        <p:tgtEl>
+                                          <p:spTgt spid="11"/>
+                                        </p:tgtEl>
+                                        <p:attrNameLst>
+                                          <p:attrName>ppt_y</p:attrName>
+                                        </p:attrNameLst>
+                                      </p:cBhvr>
+                                      <p:tavLst>
+                                        <p:tav tm="0">
+                                          <p:val>
+                                            <p:strVal val="ppt_y"/>
+                                          </p:val>
+                                        </p:tav>
+                                        <p:tav tm="100000">
+                                          <p:val>
+                                            <p:strVal val="0-ppt_h/2"/>
+                                          </p:val>
+                                        </p:tav>
+                                      </p:tavLst>
+                                    </p:anim>
+                                    <p:set>
+                                      <p:cBhvr>
+                                        <p:cTn id="8" dur="1" fill="hold">
+                                          <p:stCondLst>
+                                            <p:cond delay="499"/>
+                                          </p:stCondLst>
+                                        </p:cTn>
+                                        <p:tgtEl>
+                                          <p:spTgt spid="11"/>
+                                        </p:tgtEl>
+                                        <p:attrNameLst>
+                                          <p:attrName>style.visibility</p:attrName>
+                                        </p:attrNameLst>
+                                      </p:cBhvr>
+                                      <p:to>
+                                        <p:strVal val="hidden"/>
+                                      </p:to>
+                                    </p:set>
+                                  </p:childTnLst>
+                                </p:cTn>
+                              </p:par>
+                            </p:childTnLst>
+                          </p:cTn>
+                        </p:par>
+                      </p:childTnLst>
+                    </p:cTn>
+                  </p:par>
+                  <p:par>
+                    <p:cTn id="9" fill="hold">
+                      <p:stCondLst>
+                        <p:cond delay="indefinite"/>
+                      </p:stCondLst>
+                      <p:childTnLst>
+                        <p:par>
+                          <p:cTn id="10" fill="hold">
+                            <p:stCondLst>
+                              <p:cond delay="0"/>
+                            </p:stCondLst>
+                            <p:childTnLst>
+                              <p:par>
+                                <p:cTn id="11" presetID="10" presetClass="exit" presetSubtype="0" fill="hold" nodeType="clickEffect">
+                                  <p:stCondLst>
+                                    <p:cond delay="0"/>
+                                  </p:stCondLst>
+                                  <p:childTnLst>
+                                    <p:animEffect transition="out" filter="fade">
+                                      <p:cBhvr>
+                                        <p:cTn id="12" dur="500"/>
+                                        <p:tgtEl>
+                                          <p:spTgt spid="4"/>
+                                        </p:tgtEl>
+                                      </p:cBhvr>
+                                    </p:animEffect>
+                                    <p:set>
+                                      <p:cBhvr>
+                                        <p:cTn id="13" dur="1" fill="hold">
+                                          <p:stCondLst>
+                                            <p:cond delay="499"/>
+                                          </p:stCondLst>
+                                        </p:cTn>
+                                        <p:tgtEl>
+                                          <p:spTgt spid="4"/>
+                                        </p:tgtEl>
+                                        <p:attrNameLst>
+                                          <p:attrName>style.visibility</p:attrName>
+                                        </p:attrNameLst>
+                                      </p:cBhvr>
+                                      <p:to>
+                                        <p:strVal val="hidden"/>
+                                      </p:to>
+                                    </p:set>
+                                  </p:childTnLst>
+                                </p:cTn>
+                              </p:par>
+                            </p:childTnLst>
+                          </p:cTn>
+                        </p:par>
+                      </p:childTnLst>
+                    </p:cTn>
+                  </p:par>
+                  <p:par>
+                    <p:cTn id="14" fill="hold">
+                      <p:stCondLst>
+                        <p:cond delay="indefinite"/>
+                      </p:stCondLst>
+                      <p:childTnLst>
+                        <p:par>
+                          <p:cTn id="15" fill="hold">
+                            <p:stCondLst>
+                              <p:cond delay="0"/>
+                            </p:stCondLst>
+                            <p:childTnLst>
+                              <p:par>
+                                <p:cTn id="16" presetID="10" presetClass="exit" presetSubtype="0" fill="hold" nodeType="clickEffect">
+                                  <p:stCondLst>
+                                    <p:cond delay="0"/>
+                                  </p:stCondLst>
+                                  <p:childTnLst>
+                                    <p:animEffect transition="out" filter="fade">
+                                      <p:cBhvr>
+                                        <p:cTn id="17" dur="500"/>
+                                        <p:tgtEl>
+                                          <p:spTgt spid="6"/>
+                                        </p:tgtEl>
+                                      </p:cBhvr>
+                                    </p:animEffect>
+                                    <p:set>
+                                      <p:cBhvr>
+                                        <p:cTn id="18" dur="1" fill="hold">
+                                          <p:stCondLst>
+                                            <p:cond delay="499"/>
+                                          </p:stCondLst>
+                                        </p:cTn>
+                                        <p:tgtEl>
+                                          <p:spTgt spid="6"/>
+                                        </p:tgtEl>
+                                        <p:attrNameLst>
+                                          <p:attrName>style.visibility</p:attrName>
+                                        </p:attrNameLst>
+                                      </p:cBhvr>
+                                      <p:to>
+                                        <p:strVal val="hidden"/>
+                                      </p:to>
+                                    </p:set>
+                                  </p:childTnLst>
+                                </p:cTn>
+                              </p:par>
+                            </p:childTnLst>
+                          </p:cTn>
+                        </p:par>
+                      </p:childTnLst>
+                    </p:cTn>
+                  </p:par>
+                  <p:par>
+                    <p:cTn id="19" fill="hold">
+                      <p:stCondLst>
+                        <p:cond delay="indefinite"/>
+                      </p:stCondLst>
+                      <p:childTnLst>
+                        <p:par>
+                          <p:cTn id="20" fill="hold">
+                            <p:stCondLst>
+                              <p:cond delay="0"/>
+                            </p:stCondLst>
+                            <p:childTnLst>
+                              <p:par>
+                                <p:cTn id="21" presetID="10" presetClass="exit" presetSubtype="0" fill="hold" nodeType="clickEffect">
+                                  <p:stCondLst>
+                                    <p:cond delay="0"/>
+                                  </p:stCondLst>
+                                  <p:childTnLst>
+                                    <p:animEffect transition="out" filter="fade">
+                                      <p:cBhvr>
+                                        <p:cTn id="22" dur="500"/>
+                                        <p:tgtEl>
+                                          <p:spTgt spid="8"/>
+                                        </p:tgtEl>
+                                      </p:cBhvr>
+                                    </p:animEffect>
+                                    <p:set>
+                                      <p:cBhvr>
+                                        <p:cTn id="23" dur="1" fill="hold">
+                                          <p:stCondLst>
+                                            <p:cond delay="499"/>
+                                          </p:stCondLst>
+                                        </p:cTn>
+                                        <p:tgtEl>
+                                          <p:spTgt spid="8"/>
+                                        </p:tgtEl>
+                                        <p:attrNameLst>
+                                          <p:attrName>style.visibility</p:attrName>
+                                        </p:attrNameLst>
+                                      </p:cBhvr>
+                                      <p:to>
+                                        <p:strVal val="hidden"/>
+                                      </p:to>
+                                    </p:set>
+                                  </p:childTnLst>
+                                </p:cTn>
+                              </p:par>
+                            </p:childTnLst>
+                          </p:cTn>
+                        </p:par>
+                      </p:childTnLst>
+                    </p:cTn>
+                  </p:par>
+                </p:childTnLst>
+              </p:cTn>
+              <p:prevCondLst>
+                <p:cond evt="onPrev" delay="0">
+                  <p:tgtEl>
+                    <p:sldTgt/>
+                  </p:tgtEl>
+                </p:cond>
+              </p:prevCondLst>
+              <p:nextCondLst>
+                <p:cond evt="onNext" delay="0">
+                  <p:tgtEl>
+                    <p:sldTgt/>
+                  </p:tgtEl>
+                </p:cond>
+              </p:nextCondLst>
+            </p:seq>
+          </p:childTnLst>
+        </p:cTn>
+      </p:par>
+    </p:tnLst>
+  </p:timing>
+</p:sld>
+</file>
+
 <file path=ppt/slides/slide4.xml><?xml version="1.0" encoding="utf-8"?>
+<p:sld xmlns:a="http://schemas.openxmlformats.org/drawingml/2006/main" xmlns:r="http://schemas.openxmlformats.org/officeDocument/2006/relationships" xmlns:p="http://schemas.openxmlformats.org/presentationml/2006/main">
+  <p:cSld>
+    <p:spTree>
+      <p:nvGrpSpPr>
+        <p:cNvPr id="1" name=""/>
+        <p:cNvGrpSpPr/>
+        <p:nvPr/>
+      </p:nvGrpSpPr>
+      <p:grpSpPr>
+        <a:xfrm>
+          <a:off x="0" y="0"/>
+          <a:ext cx="0" cy="0"/>
+          <a:chOff x="0" y="0"/>
+          <a:chExt cx="0" cy="0"/>
+        </a:xfrm>
+      </p:grpSpPr>
+      <p:pic>
+        <p:nvPicPr>
+          <p:cNvPr id="5" name="Grafik 4">
+            <a:extLst>
+              <a:ext uri="{FF2B5EF4-FFF2-40B4-BE49-F238E27FC236}">
+                <a16:creationId xmlns:a16="http://schemas.microsoft.com/office/drawing/2014/main" id="{00FEE856-FEDD-4266-980F-F249827D5AB9}"/>
+              </a:ext>
+            </a:extLst>
+          </p:cNvPr>
+          <p:cNvPicPr>
+            <a:picLocks noChangeAspect="1"/>
+          </p:cNvPicPr>
+          <p:nvPr/>
+        </p:nvPicPr>
+        <p:blipFill>
+          <a:blip r:embed="rId2">
+            <a:extLst>
+              <a:ext uri="{28A0092B-C50C-407E-A947-70E740481C1C}">
+                <a14:useLocalDpi xmlns:a14="http://schemas.microsoft.com/office/drawing/2010/main" val="0"/>
+              </a:ext>
+            </a:extLst>
+          </a:blip>
+          <a:stretch>
+            <a:fillRect/>
+          </a:stretch>
+        </p:blipFill>
+        <p:spPr>
+          <a:xfrm>
+            <a:off x="0" y="880305"/>
+            <a:ext cx="12192000" cy="5097389"/>
+          </a:xfrm>
+          <a:prstGeom prst="rect">
+            <a:avLst/>
+          </a:prstGeom>
+        </p:spPr>
+      </p:pic>
+      <p:sp>
+        <p:nvSpPr>
+          <p:cNvPr id="8" name="Rechteck 7">
+            <a:extLst>
+              <a:ext uri="{FF2B5EF4-FFF2-40B4-BE49-F238E27FC236}">
+                <a16:creationId xmlns:a16="http://schemas.microsoft.com/office/drawing/2014/main" id="{0AE12F0C-8940-4447-9593-09625E21D499}"/>
+              </a:ext>
+            </a:extLst>
+          </p:cNvPr>
+          <p:cNvSpPr/>
+          <p:nvPr/>
+        </p:nvSpPr>
+        <p:spPr>
+          <a:xfrm>
+            <a:off x="0" y="0"/>
+            <a:ext cx="2616200" cy="6858000"/>
+          </a:xfrm>
+          <a:prstGeom prst="rect">
+            <a:avLst/>
+          </a:prstGeom>
+          <a:solidFill>
+            <a:schemeClr val="bg1"/>
+          </a:solidFill>
+          <a:ln>
+            <a:noFill/>
+          </a:ln>
+        </p:spPr>
+        <p:style>
+          <a:lnRef idx="2">
+            <a:schemeClr val="accent1">
+              <a:shade val="50000"/>
+            </a:schemeClr>
+          </a:lnRef>
+          <a:fillRef idx="1">
+            <a:schemeClr val="accent1"/>
+          </a:fillRef>
+          <a:effectRef idx="0">
+            <a:schemeClr val="accent1"/>
+          </a:effectRef>
+          <a:fontRef idx="minor">
+            <a:schemeClr val="lt1"/>
+          </a:fontRef>
+        </p:style>
+        <p:txBody>
+          <a:bodyPr rtlCol="0" anchor="ctr"/>
+          <a:lstStyle/>
+          <a:p>
+            <a:pPr algn="ctr"/>
+            <a:r>
+              <a:rPr lang="en-US" dirty="0"/>
+              <a:t> </a:t>
+            </a:r>
+            <a:endParaRPr lang="de-DE" dirty="0"/>
+          </a:p>
+        </p:txBody>
+      </p:sp>
+      <p:sp>
+        <p:nvSpPr>
+          <p:cNvPr id="9" name="Rechteck 8">
+            <a:extLst>
+              <a:ext uri="{FF2B5EF4-FFF2-40B4-BE49-F238E27FC236}">
+                <a16:creationId xmlns:a16="http://schemas.microsoft.com/office/drawing/2014/main" id="{68A3FF32-3646-46B5-9483-B7420C675640}"/>
+              </a:ext>
+            </a:extLst>
+          </p:cNvPr>
+          <p:cNvSpPr/>
+          <p:nvPr/>
+        </p:nvSpPr>
+        <p:spPr>
+          <a:xfrm>
+            <a:off x="2616200" y="-1"/>
+            <a:ext cx="4686300" cy="6858000"/>
+          </a:xfrm>
+          <a:prstGeom prst="rect">
+            <a:avLst/>
+          </a:prstGeom>
+          <a:solidFill>
+            <a:schemeClr val="bg1"/>
+          </a:solidFill>
+          <a:ln>
+            <a:noFill/>
+          </a:ln>
+        </p:spPr>
+        <p:style>
+          <a:lnRef idx="2">
+            <a:schemeClr val="accent1">
+              <a:shade val="50000"/>
+            </a:schemeClr>
+          </a:lnRef>
+          <a:fillRef idx="1">
+            <a:schemeClr val="accent1"/>
+          </a:fillRef>
+          <a:effectRef idx="0">
+            <a:schemeClr val="accent1"/>
+          </a:effectRef>
+          <a:fontRef idx="minor">
+            <a:schemeClr val="lt1"/>
+          </a:fontRef>
+        </p:style>
+        <p:txBody>
+          <a:bodyPr rtlCol="0" anchor="ctr"/>
+          <a:lstStyle/>
+          <a:p>
+            <a:pPr algn="ctr"/>
+            <a:r>
+              <a:rPr lang="en-US" dirty="0"/>
+              <a:t> </a:t>
+            </a:r>
+            <a:endParaRPr lang="de-DE" dirty="0"/>
+          </a:p>
+        </p:txBody>
+      </p:sp>
+      <p:sp>
+        <p:nvSpPr>
+          <p:cNvPr id="10" name="Rechteck 9">
+            <a:extLst>
+              <a:ext uri="{FF2B5EF4-FFF2-40B4-BE49-F238E27FC236}">
+                <a16:creationId xmlns:a16="http://schemas.microsoft.com/office/drawing/2014/main" id="{6AFF3DCC-85F0-4118-8B6B-D0AF07AB792B}"/>
+              </a:ext>
+            </a:extLst>
+          </p:cNvPr>
+          <p:cNvSpPr/>
+          <p:nvPr/>
+        </p:nvSpPr>
+        <p:spPr>
+          <a:xfrm>
+            <a:off x="7302500" y="0"/>
+            <a:ext cx="4889500" cy="6858000"/>
+          </a:xfrm>
+          <a:prstGeom prst="rect">
+            <a:avLst/>
+          </a:prstGeom>
+          <a:solidFill>
+            <a:schemeClr val="bg1"/>
+          </a:solidFill>
+          <a:ln>
+            <a:noFill/>
+          </a:ln>
+        </p:spPr>
+        <p:style>
+          <a:lnRef idx="2">
+            <a:schemeClr val="accent1">
+              <a:shade val="50000"/>
+            </a:schemeClr>
+          </a:lnRef>
+          <a:fillRef idx="1">
+            <a:schemeClr val="accent1"/>
+          </a:fillRef>
+          <a:effectRef idx="0">
+            <a:schemeClr val="accent1"/>
+          </a:effectRef>
+          <a:fontRef idx="minor">
+            <a:schemeClr val="lt1"/>
+          </a:fontRef>
+        </p:style>
+        <p:txBody>
+          <a:bodyPr rtlCol="0" anchor="ctr"/>
+          <a:lstStyle/>
+          <a:p>
+            <a:pPr algn="ctr"/>
+            <a:r>
+              <a:rPr lang="en-US" dirty="0"/>
+              <a:t> </a:t>
+            </a:r>
+            <a:endParaRPr lang="de-DE" dirty="0"/>
+          </a:p>
+        </p:txBody>
+      </p:sp>
+      <p:pic>
+        <p:nvPicPr>
+          <p:cNvPr id="7" name="Grafik 6">
+            <a:extLst>
+              <a:ext uri="{FF2B5EF4-FFF2-40B4-BE49-F238E27FC236}">
+                <a16:creationId xmlns:a16="http://schemas.microsoft.com/office/drawing/2014/main" id="{31814C0F-F601-4BCF-81CA-E7C556A9A2AB}"/>
+              </a:ext>
+            </a:extLst>
+          </p:cNvPr>
+          <p:cNvPicPr>
+            <a:picLocks noChangeAspect="1"/>
+          </p:cNvPicPr>
+          <p:nvPr/>
+        </p:nvPicPr>
+        <p:blipFill>
+          <a:blip r:embed="rId3">
+            <a:extLst>
+              <a:ext uri="{28A0092B-C50C-407E-A947-70E740481C1C}">
+                <a14:useLocalDpi xmlns:a14="http://schemas.microsoft.com/office/drawing/2010/main" val="0"/>
+              </a:ext>
+            </a:extLst>
+          </a:blip>
+          <a:stretch>
+            <a:fillRect/>
+          </a:stretch>
+        </p:blipFill>
+        <p:spPr>
+          <a:xfrm>
+            <a:off x="0" y="0"/>
+            <a:ext cx="12192000" cy="6858000"/>
+          </a:xfrm>
+          <a:prstGeom prst="rect">
+            <a:avLst/>
+          </a:prstGeom>
+        </p:spPr>
+      </p:pic>
+    </p:spTree>
+    <p:extLst>
+      <p:ext uri="{BB962C8B-B14F-4D97-AF65-F5344CB8AC3E}">
+        <p14:creationId xmlns:p14="http://schemas.microsoft.com/office/powerpoint/2010/main" val="157679249"/>
+      </p:ext>
+    </p:extLst>
+  </p:cSld>
+  <p:clrMapOvr>
+    <a:masterClrMapping/>
+  </p:clrMapOvr>
+  <p:timing>
+    <p:tnLst>
+      <p:par>
+        <p:cTn id="1" dur="indefinite" restart="never" nodeType="tmRoot">
+          <p:childTnLst>
+            <p:seq concurrent="1" nextAc="seek">
+              <p:cTn id="2" dur="indefinite" nodeType="mainSeq">
+                <p:childTnLst>
+                  <p:par>
+                    <p:cTn id="3" fill="hold">
+                      <p:stCondLst>
+                        <p:cond delay="indefinite"/>
+                      </p:stCondLst>
+                      <p:childTnLst>
+                        <p:par>
+                          <p:cTn id="4" fill="hold">
+                            <p:stCondLst>
+                              <p:cond delay="0"/>
+                            </p:stCondLst>
+                            <p:childTnLst>
+                              <p:par>
+                                <p:cTn id="5" presetID="2" presetClass="exit" presetSubtype="1" fill="hold" nodeType="clickEffect">
+                                  <p:stCondLst>
+                                    <p:cond delay="0"/>
+                                  </p:stCondLst>
+                                  <p:childTnLst>
+                                    <p:anim calcmode="lin" valueType="num">
+                                      <p:cBhvr additive="base">
+                                        <p:cTn id="6" dur="500"/>
+                                        <p:tgtEl>
+                                          <p:spTgt spid="7"/>
+                                        </p:tgtEl>
+                                        <p:attrNameLst>
+                                          <p:attrName>ppt_x</p:attrName>
+                                        </p:attrNameLst>
+                                      </p:cBhvr>
+                                      <p:tavLst>
+                                        <p:tav tm="0">
+                                          <p:val>
+                                            <p:strVal val="ppt_x"/>
+                                          </p:val>
+                                        </p:tav>
+                                        <p:tav tm="100000">
+                                          <p:val>
+                                            <p:strVal val="ppt_x"/>
+                                          </p:val>
+                                        </p:tav>
+                                      </p:tavLst>
+                                    </p:anim>
+                                    <p:anim calcmode="lin" valueType="num">
+                                      <p:cBhvr additive="base">
+                                        <p:cTn id="7" dur="500"/>
+                                        <p:tgtEl>
+                                          <p:spTgt spid="7"/>
+                                        </p:tgtEl>
+                                        <p:attrNameLst>
+                                          <p:attrName>ppt_y</p:attrName>
+                                        </p:attrNameLst>
+                                      </p:cBhvr>
+                                      <p:tavLst>
+                                        <p:tav tm="0">
+                                          <p:val>
+                                            <p:strVal val="ppt_y"/>
+                                          </p:val>
+                                        </p:tav>
+                                        <p:tav tm="100000">
+                                          <p:val>
+                                            <p:strVal val="0-ppt_h/2"/>
+                                          </p:val>
+                                        </p:tav>
+                                      </p:tavLst>
+                                    </p:anim>
+                                    <p:set>
+                                      <p:cBhvr>
+                                        <p:cTn id="8" dur="1" fill="hold">
+                                          <p:stCondLst>
+                                            <p:cond delay="499"/>
+                                          </p:stCondLst>
+                                        </p:cTn>
+                                        <p:tgtEl>
+                                          <p:spTgt spid="7"/>
+                                        </p:tgtEl>
+                                        <p:attrNameLst>
+                                          <p:attrName>style.visibility</p:attrName>
+                                        </p:attrNameLst>
+                                      </p:cBhvr>
+                                      <p:to>
+                                        <p:strVal val="hidden"/>
+                                      </p:to>
+                                    </p:set>
+                                  </p:childTnLst>
+                                </p:cTn>
+                              </p:par>
+                            </p:childTnLst>
+                          </p:cTn>
+                        </p:par>
+                      </p:childTnLst>
+                    </p:cTn>
+                  </p:par>
+                  <p:par>
+                    <p:cTn id="9" fill="hold">
+                      <p:stCondLst>
+                        <p:cond delay="indefinite"/>
+                      </p:stCondLst>
+                      <p:childTnLst>
+                        <p:par>
+                          <p:cTn id="10" fill="hold">
+                            <p:stCondLst>
+                              <p:cond delay="0"/>
+                            </p:stCondLst>
+                            <p:childTnLst>
+                              <p:par>
+                                <p:cTn id="11" presetID="10" presetClass="exit" presetSubtype="0" fill="hold" grpId="0" nodeType="clickEffect">
+                                  <p:stCondLst>
+                                    <p:cond delay="0"/>
+                                  </p:stCondLst>
+                                  <p:childTnLst>
+                                    <p:animEffect transition="out" filter="fade">
+                                      <p:cBhvr>
+                                        <p:cTn id="12" dur="500"/>
+                                        <p:tgtEl>
+                                          <p:spTgt spid="8"/>
+                                        </p:tgtEl>
+                                      </p:cBhvr>
+                                    </p:animEffect>
+                                    <p:set>
+                                      <p:cBhvr>
+                                        <p:cTn id="13" dur="1" fill="hold">
+                                          <p:stCondLst>
+                                            <p:cond delay="499"/>
+                                          </p:stCondLst>
+                                        </p:cTn>
+                                        <p:tgtEl>
+                                          <p:spTgt spid="8"/>
+                                        </p:tgtEl>
+                                        <p:attrNameLst>
+                                          <p:attrName>style.visibility</p:attrName>
+                                        </p:attrNameLst>
+                                      </p:cBhvr>
+                                      <p:to>
+                                        <p:strVal val="hidden"/>
+                                      </p:to>
+                                    </p:set>
+                                  </p:childTnLst>
+                                </p:cTn>
+                              </p:par>
+                            </p:childTnLst>
+                          </p:cTn>
+                        </p:par>
+                      </p:childTnLst>
+                    </p:cTn>
+                  </p:par>
+                  <p:par>
+                    <p:cTn id="14" fill="hold">
+                      <p:stCondLst>
+                        <p:cond delay="indefinite"/>
+                      </p:stCondLst>
+                      <p:childTnLst>
+                        <p:par>
+                          <p:cTn id="15" fill="hold">
+                            <p:stCondLst>
+                              <p:cond delay="0"/>
+                            </p:stCondLst>
+                            <p:childTnLst>
+                              <p:par>
+                                <p:cTn id="16" presetID="10" presetClass="exit" presetSubtype="0" fill="hold" grpId="0" nodeType="clickEffect">
+                                  <p:stCondLst>
+                                    <p:cond delay="0"/>
+                                  </p:stCondLst>
+                                  <p:childTnLst>
+                                    <p:animEffect transition="out" filter="fade">
+                                      <p:cBhvr>
+                                        <p:cTn id="17" dur="500"/>
+                                        <p:tgtEl>
+                                          <p:spTgt spid="9"/>
+                                        </p:tgtEl>
+                                      </p:cBhvr>
+                                    </p:animEffect>
+                                    <p:set>
+                                      <p:cBhvr>
+                                        <p:cTn id="18" dur="1" fill="hold">
+                                          <p:stCondLst>
+                                            <p:cond delay="499"/>
+                                          </p:stCondLst>
+                                        </p:cTn>
+                                        <p:tgtEl>
+                                          <p:spTgt spid="9"/>
+                                        </p:tgtEl>
+                                        <p:attrNameLst>
+                                          <p:attrName>style.visibility</p:attrName>
+                                        </p:attrNameLst>
+                                      </p:cBhvr>
+                                      <p:to>
+                                        <p:strVal val="hidden"/>
+                                      </p:to>
+                                    </p:set>
+                                  </p:childTnLst>
+                                </p:cTn>
+                              </p:par>
+                            </p:childTnLst>
+                          </p:cTn>
+                        </p:par>
+                      </p:childTnLst>
+                    </p:cTn>
+                  </p:par>
+                  <p:par>
+                    <p:cTn id="19" fill="hold">
+                      <p:stCondLst>
+                        <p:cond delay="indefinite"/>
+                      </p:stCondLst>
+                      <p:childTnLst>
+                        <p:par>
+                          <p:cTn id="20" fill="hold">
+                            <p:stCondLst>
+                              <p:cond delay="0"/>
+                            </p:stCondLst>
+                            <p:childTnLst>
+                              <p:par>
+                                <p:cTn id="21" presetID="10" presetClass="exit" presetSubtype="0" fill="hold" grpId="0" nodeType="clickEffect">
+                                  <p:stCondLst>
+                                    <p:cond delay="0"/>
+                                  </p:stCondLst>
+                                  <p:childTnLst>
+                                    <p:animEffect transition="out" filter="fade">
+                                      <p:cBhvr>
+                                        <p:cTn id="22" dur="500"/>
+                                        <p:tgtEl>
+                                          <p:spTgt spid="10"/>
+                                        </p:tgtEl>
+                                      </p:cBhvr>
+                                    </p:animEffect>
+                                    <p:set>
+                                      <p:cBhvr>
+                                        <p:cTn id="23" dur="1" fill="hold">
+                                          <p:stCondLst>
+                                            <p:cond delay="499"/>
+                                          </p:stCondLst>
+                                        </p:cTn>
+                                        <p:tgtEl>
+                                          <p:spTgt spid="10"/>
+                                        </p:tgtEl>
+                                        <p:attrNameLst>
+                                          <p:attrName>style.visibility</p:attrName>
+                                        </p:attrNameLst>
+                                      </p:cBhvr>
+                                      <p:to>
+                                        <p:strVal val="hidden"/>
+                                      </p:to>
+                                    </p:set>
+                                  </p:childTnLst>
+                                </p:cTn>
+                              </p:par>
+                            </p:childTnLst>
+                          </p:cTn>
+                        </p:par>
+                      </p:childTnLst>
+                    </p:cTn>
+                  </p:par>
+                </p:childTnLst>
+              </p:cTn>
+              <p:prevCondLst>
+                <p:cond evt="onPrev" delay="0">
+                  <p:tgtEl>
+                    <p:sldTgt/>
+                  </p:tgtEl>
+                </p:cond>
+              </p:prevCondLst>
+              <p:nextCondLst>
+                <p:cond evt="onNext" delay="0">
+                  <p:tgtEl>
+                    <p:sldTgt/>
+                  </p:tgtEl>
+                </p:cond>
+              </p:nextCondLst>
+            </p:seq>
+          </p:childTnLst>
+        </p:cTn>
+      </p:par>
+    </p:tnLst>
+    <p:bldLst>
+      <p:bldP spid="8" grpId="0" animBg="1"/>
+      <p:bldP spid="9" grpId="0" animBg="1"/>
+      <p:bldP spid="10" grpId="0" animBg="1"/>
+    </p:bldLst>
+  </p:timing>
+</p:sld>
+</file>
+
+<file path=ppt/slides/slide5.xml><?xml version="1.0" encoding="utf-8"?>
 <p:sld xmlns:a="http://schemas.openxmlformats.org/drawingml/2006/main" xmlns:r="http://schemas.openxmlformats.org/officeDocument/2006/relationships" xmlns:p="http://schemas.openxmlformats.org/presentationml/2006/main">
   <p:cSld>
     <p:spTree>
@@ -5310,6 +5893,36 @@
 </p:sld>
 </file>
 
+<file path=ppt/slides/slide6.xml><?xml version="1.0" encoding="utf-8"?>
+<p:sld xmlns:a="http://schemas.openxmlformats.org/drawingml/2006/main" xmlns:r="http://schemas.openxmlformats.org/officeDocument/2006/relationships" xmlns:p="http://schemas.openxmlformats.org/presentationml/2006/main">
+  <p:cSld>
+    <p:spTree>
+      <p:nvGrpSpPr>
+        <p:cNvPr id="1" name=""/>
+        <p:cNvGrpSpPr/>
+        <p:nvPr/>
+      </p:nvGrpSpPr>
+      <p:grpSpPr>
+        <a:xfrm>
+          <a:off x="0" y="0"/>
+          <a:ext cx="0" cy="0"/>
+          <a:chOff x="0" y="0"/>
+          <a:chExt cx="0" cy="0"/>
+        </a:xfrm>
+      </p:grpSpPr>
+    </p:spTree>
+    <p:extLst>
+      <p:ext uri="{BB962C8B-B14F-4D97-AF65-F5344CB8AC3E}">
+        <p14:creationId xmlns:p14="http://schemas.microsoft.com/office/powerpoint/2010/main" val="2801846792"/>
+      </p:ext>
+    </p:extLst>
+  </p:cSld>
+  <p:clrMapOvr>
+    <a:masterClrMapping/>
+  </p:clrMapOvr>
+</p:sld>
+</file>
+
 <file path=ppt/theme/theme1.xml><?xml version="1.0" encoding="utf-8"?>
 <a:theme xmlns:a="http://schemas.openxmlformats.org/drawingml/2006/main" name="Office">
   <a:themeElements>

</xml_diff>

<commit_message>
Vortrag - Ich habe die Folie Anforderungen and PhyPiDAQ hinzugefügt. Außerdem habe ich die Animationen überarbeitet.
</commit_message>
<xml_diff>
--- a/Präsentation/Vortrag - Pflichtenheft.pptx
+++ b/Präsentation/Vortrag - Pflichtenheft.pptx
@@ -5910,6 +5910,190 @@
           <a:chExt cx="0" cy="0"/>
         </a:xfrm>
       </p:grpSpPr>
+      <p:pic>
+        <p:nvPicPr>
+          <p:cNvPr id="5" name="Grafik 4">
+            <a:extLst>
+              <a:ext uri="{FF2B5EF4-FFF2-40B4-BE49-F238E27FC236}">
+                <a16:creationId xmlns:a16="http://schemas.microsoft.com/office/drawing/2014/main" id="{75ED2821-6EBB-4720-AD1A-D45AC8F5516D}"/>
+              </a:ext>
+            </a:extLst>
+          </p:cNvPr>
+          <p:cNvPicPr>
+            <a:picLocks noChangeAspect="1"/>
+          </p:cNvPicPr>
+          <p:nvPr/>
+        </p:nvPicPr>
+        <p:blipFill>
+          <a:blip r:embed="rId2">
+            <a:extLst>
+              <a:ext uri="{28A0092B-C50C-407E-A947-70E740481C1C}">
+                <a14:useLocalDpi xmlns:a14="http://schemas.microsoft.com/office/drawing/2010/main" val="0"/>
+              </a:ext>
+            </a:extLst>
+          </a:blip>
+          <a:stretch>
+            <a:fillRect/>
+          </a:stretch>
+        </p:blipFill>
+        <p:spPr>
+          <a:xfrm>
+            <a:off x="0" y="0"/>
+            <a:ext cx="12192000" cy="6858000"/>
+          </a:xfrm>
+          <a:prstGeom prst="rect">
+            <a:avLst/>
+          </a:prstGeom>
+        </p:spPr>
+      </p:pic>
+      <p:sp>
+        <p:nvSpPr>
+          <p:cNvPr id="6" name="Rechteck 5">
+            <a:extLst>
+              <a:ext uri="{FF2B5EF4-FFF2-40B4-BE49-F238E27FC236}">
+                <a16:creationId xmlns:a16="http://schemas.microsoft.com/office/drawing/2014/main" id="{0D269F6C-5B00-4C0D-8265-263C958C2C22}"/>
+              </a:ext>
+            </a:extLst>
+          </p:cNvPr>
+          <p:cNvSpPr/>
+          <p:nvPr/>
+        </p:nvSpPr>
+        <p:spPr>
+          <a:xfrm>
+            <a:off x="0" y="0"/>
+            <a:ext cx="6096000" cy="6858000"/>
+          </a:xfrm>
+          <a:prstGeom prst="rect">
+            <a:avLst/>
+          </a:prstGeom>
+          <a:solidFill>
+            <a:schemeClr val="bg1"/>
+          </a:solidFill>
+          <a:ln>
+            <a:noFill/>
+          </a:ln>
+        </p:spPr>
+        <p:style>
+          <a:lnRef idx="2">
+            <a:schemeClr val="accent1">
+              <a:shade val="50000"/>
+            </a:schemeClr>
+          </a:lnRef>
+          <a:fillRef idx="1">
+            <a:schemeClr val="accent1"/>
+          </a:fillRef>
+          <a:effectRef idx="0">
+            <a:schemeClr val="accent1"/>
+          </a:effectRef>
+          <a:fontRef idx="minor">
+            <a:schemeClr val="lt1"/>
+          </a:fontRef>
+        </p:style>
+        <p:txBody>
+          <a:bodyPr rtlCol="0" anchor="ctr"/>
+          <a:lstStyle/>
+          <a:p>
+            <a:pPr algn="ctr"/>
+            <a:r>
+              <a:rPr lang="en-US" dirty="0"/>
+              <a:t> </a:t>
+            </a:r>
+            <a:endParaRPr lang="de-DE" dirty="0"/>
+          </a:p>
+        </p:txBody>
+      </p:sp>
+      <p:sp>
+        <p:nvSpPr>
+          <p:cNvPr id="7" name="Rechteck 6">
+            <a:extLst>
+              <a:ext uri="{FF2B5EF4-FFF2-40B4-BE49-F238E27FC236}">
+                <a16:creationId xmlns:a16="http://schemas.microsoft.com/office/drawing/2014/main" id="{109A0CF3-2AA8-489F-AA69-8236826A949F}"/>
+              </a:ext>
+            </a:extLst>
+          </p:cNvPr>
+          <p:cNvSpPr/>
+          <p:nvPr/>
+        </p:nvSpPr>
+        <p:spPr>
+          <a:xfrm>
+            <a:off x="6096000" y="0"/>
+            <a:ext cx="6096000" cy="6858000"/>
+          </a:xfrm>
+          <a:prstGeom prst="rect">
+            <a:avLst/>
+          </a:prstGeom>
+          <a:solidFill>
+            <a:schemeClr val="bg1"/>
+          </a:solidFill>
+          <a:ln>
+            <a:noFill/>
+          </a:ln>
+        </p:spPr>
+        <p:style>
+          <a:lnRef idx="2">
+            <a:schemeClr val="accent1">
+              <a:shade val="50000"/>
+            </a:schemeClr>
+          </a:lnRef>
+          <a:fillRef idx="1">
+            <a:schemeClr val="accent1"/>
+          </a:fillRef>
+          <a:effectRef idx="0">
+            <a:schemeClr val="accent1"/>
+          </a:effectRef>
+          <a:fontRef idx="minor">
+            <a:schemeClr val="lt1"/>
+          </a:fontRef>
+        </p:style>
+        <p:txBody>
+          <a:bodyPr rtlCol="0" anchor="ctr"/>
+          <a:lstStyle/>
+          <a:p>
+            <a:pPr algn="ctr"/>
+            <a:r>
+              <a:rPr lang="en-US" dirty="0"/>
+              <a:t> </a:t>
+            </a:r>
+            <a:endParaRPr lang="de-DE" dirty="0"/>
+          </a:p>
+        </p:txBody>
+      </p:sp>
+      <p:pic>
+        <p:nvPicPr>
+          <p:cNvPr id="3" name="Grafik 2">
+            <a:extLst>
+              <a:ext uri="{FF2B5EF4-FFF2-40B4-BE49-F238E27FC236}">
+                <a16:creationId xmlns:a16="http://schemas.microsoft.com/office/drawing/2014/main" id="{5DA27827-8B4A-4B57-A05F-BA435AB962D4}"/>
+              </a:ext>
+            </a:extLst>
+          </p:cNvPr>
+          <p:cNvPicPr>
+            <a:picLocks noChangeAspect="1"/>
+          </p:cNvPicPr>
+          <p:nvPr/>
+        </p:nvPicPr>
+        <p:blipFill>
+          <a:blip r:embed="rId3">
+            <a:extLst>
+              <a:ext uri="{28A0092B-C50C-407E-A947-70E740481C1C}">
+                <a14:useLocalDpi xmlns:a14="http://schemas.microsoft.com/office/drawing/2010/main" val="0"/>
+              </a:ext>
+            </a:extLst>
+          </a:blip>
+          <a:stretch>
+            <a:fillRect/>
+          </a:stretch>
+        </p:blipFill>
+        <p:spPr>
+          <a:xfrm>
+            <a:off x="0" y="0"/>
+            <a:ext cx="12192000" cy="6858000"/>
+          </a:xfrm>
+          <a:prstGeom prst="rect">
+            <a:avLst/>
+          </a:prstGeom>
+        </p:spPr>
+      </p:pic>
     </p:spTree>
     <p:extLst>
       <p:ext uri="{BB962C8B-B14F-4D97-AF65-F5344CB8AC3E}">
@@ -5920,6 +6104,237 @@
   <p:clrMapOvr>
     <a:masterClrMapping/>
   </p:clrMapOvr>
+  <p:timing>
+    <p:tnLst>
+      <p:par>
+        <p:cTn id="1" dur="indefinite" restart="never" nodeType="tmRoot">
+          <p:childTnLst>
+            <p:seq concurrent="1" nextAc="seek">
+              <p:cTn id="2" dur="indefinite" nodeType="mainSeq">
+                <p:childTnLst>
+                  <p:par>
+                    <p:cTn id="3" fill="hold">
+                      <p:stCondLst>
+                        <p:cond delay="indefinite"/>
+                      </p:stCondLst>
+                      <p:childTnLst>
+                        <p:par>
+                          <p:cTn id="4" fill="hold">
+                            <p:stCondLst>
+                              <p:cond delay="0"/>
+                            </p:stCondLst>
+                            <p:childTnLst>
+                              <p:par>
+                                <p:cTn id="5" presetID="2" presetClass="exit" presetSubtype="1" fill="hold" nodeType="clickEffect">
+                                  <p:stCondLst>
+                                    <p:cond delay="0"/>
+                                  </p:stCondLst>
+                                  <p:childTnLst>
+                                    <p:anim calcmode="lin" valueType="num">
+                                      <p:cBhvr additive="base">
+                                        <p:cTn id="6" dur="500"/>
+                                        <p:tgtEl>
+                                          <p:spTgt spid="3"/>
+                                        </p:tgtEl>
+                                        <p:attrNameLst>
+                                          <p:attrName>ppt_x</p:attrName>
+                                        </p:attrNameLst>
+                                      </p:cBhvr>
+                                      <p:tavLst>
+                                        <p:tav tm="0">
+                                          <p:val>
+                                            <p:strVal val="ppt_x"/>
+                                          </p:val>
+                                        </p:tav>
+                                        <p:tav tm="100000">
+                                          <p:val>
+                                            <p:strVal val="ppt_x"/>
+                                          </p:val>
+                                        </p:tav>
+                                      </p:tavLst>
+                                    </p:anim>
+                                    <p:anim calcmode="lin" valueType="num">
+                                      <p:cBhvr additive="base">
+                                        <p:cTn id="7" dur="500"/>
+                                        <p:tgtEl>
+                                          <p:spTgt spid="3"/>
+                                        </p:tgtEl>
+                                        <p:attrNameLst>
+                                          <p:attrName>ppt_y</p:attrName>
+                                        </p:attrNameLst>
+                                      </p:cBhvr>
+                                      <p:tavLst>
+                                        <p:tav tm="0">
+                                          <p:val>
+                                            <p:strVal val="ppt_y"/>
+                                          </p:val>
+                                        </p:tav>
+                                        <p:tav tm="100000">
+                                          <p:val>
+                                            <p:strVal val="0-ppt_h/2"/>
+                                          </p:val>
+                                        </p:tav>
+                                      </p:tavLst>
+                                    </p:anim>
+                                    <p:set>
+                                      <p:cBhvr>
+                                        <p:cTn id="8" dur="1" fill="hold">
+                                          <p:stCondLst>
+                                            <p:cond delay="499"/>
+                                          </p:stCondLst>
+                                        </p:cTn>
+                                        <p:tgtEl>
+                                          <p:spTgt spid="3"/>
+                                        </p:tgtEl>
+                                        <p:attrNameLst>
+                                          <p:attrName>style.visibility</p:attrName>
+                                        </p:attrNameLst>
+                                      </p:cBhvr>
+                                      <p:to>
+                                        <p:strVal val="hidden"/>
+                                      </p:to>
+                                    </p:set>
+                                  </p:childTnLst>
+                                </p:cTn>
+                              </p:par>
+                            </p:childTnLst>
+                          </p:cTn>
+                        </p:par>
+                      </p:childTnLst>
+                    </p:cTn>
+                  </p:par>
+                  <p:par>
+                    <p:cTn id="9" fill="hold">
+                      <p:stCondLst>
+                        <p:cond delay="indefinite"/>
+                      </p:stCondLst>
+                      <p:childTnLst>
+                        <p:par>
+                          <p:cTn id="10" fill="hold">
+                            <p:stCondLst>
+                              <p:cond delay="0"/>
+                            </p:stCondLst>
+                            <p:childTnLst>
+                              <p:par>
+                                <p:cTn id="11" presetID="10" presetClass="exit" presetSubtype="0" fill="hold" grpId="0" nodeType="clickEffect">
+                                  <p:stCondLst>
+                                    <p:cond delay="0"/>
+                                  </p:stCondLst>
+                                  <p:childTnLst>
+                                    <p:animEffect transition="out" filter="fade">
+                                      <p:cBhvr>
+                                        <p:cTn id="12" dur="500"/>
+                                        <p:tgtEl>
+                                          <p:spTgt spid="6"/>
+                                        </p:tgtEl>
+                                      </p:cBhvr>
+                                    </p:animEffect>
+                                    <p:set>
+                                      <p:cBhvr>
+                                        <p:cTn id="13" dur="1" fill="hold">
+                                          <p:stCondLst>
+                                            <p:cond delay="499"/>
+                                          </p:stCondLst>
+                                        </p:cTn>
+                                        <p:tgtEl>
+                                          <p:spTgt spid="6"/>
+                                        </p:tgtEl>
+                                        <p:attrNameLst>
+                                          <p:attrName>style.visibility</p:attrName>
+                                        </p:attrNameLst>
+                                      </p:cBhvr>
+                                      <p:to>
+                                        <p:strVal val="hidden"/>
+                                      </p:to>
+                                    </p:set>
+                                  </p:childTnLst>
+                                </p:cTn>
+                              </p:par>
+                            </p:childTnLst>
+                          </p:cTn>
+                        </p:par>
+                      </p:childTnLst>
+                    </p:cTn>
+                  </p:par>
+                  <p:par>
+                    <p:cTn id="14" fill="hold">
+                      <p:stCondLst>
+                        <p:cond delay="indefinite"/>
+                      </p:stCondLst>
+                      <p:childTnLst>
+                        <p:par>
+                          <p:cTn id="15" fill="hold">
+                            <p:stCondLst>
+                              <p:cond delay="0"/>
+                            </p:stCondLst>
+                            <p:childTnLst>
+                              <p:par>
+                                <p:cTn id="16" presetID="10" presetClass="exit" presetSubtype="0" fill="hold" grpId="0" nodeType="clickEffect">
+                                  <p:stCondLst>
+                                    <p:cond delay="0"/>
+                                  </p:stCondLst>
+                                  <p:childTnLst>
+                                    <p:animEffect transition="out" filter="fade">
+                                      <p:cBhvr>
+                                        <p:cTn id="17" dur="500"/>
+                                        <p:tgtEl>
+                                          <p:spTgt spid="7"/>
+                                        </p:tgtEl>
+                                      </p:cBhvr>
+                                    </p:animEffect>
+                                    <p:set>
+                                      <p:cBhvr>
+                                        <p:cTn id="18" dur="1" fill="hold">
+                                          <p:stCondLst>
+                                            <p:cond delay="499"/>
+                                          </p:stCondLst>
+                                        </p:cTn>
+                                        <p:tgtEl>
+                                          <p:spTgt spid="7"/>
+                                        </p:tgtEl>
+                                        <p:attrNameLst>
+                                          <p:attrName>style.visibility</p:attrName>
+                                        </p:attrNameLst>
+                                      </p:cBhvr>
+                                      <p:to>
+                                        <p:strVal val="hidden"/>
+                                      </p:to>
+                                    </p:set>
+                                  </p:childTnLst>
+                                </p:cTn>
+                              </p:par>
+                            </p:childTnLst>
+                          </p:cTn>
+                        </p:par>
+                      </p:childTnLst>
+                    </p:cTn>
+                  </p:par>
+                </p:childTnLst>
+              </p:cTn>
+              <p:prevCondLst>
+                <p:cond evt="onPrev" delay="0">
+                  <p:tgtEl>
+                    <p:sldTgt/>
+                  </p:tgtEl>
+                </p:cond>
+              </p:prevCondLst>
+              <p:nextCondLst>
+                <p:cond evt="onNext" delay="0">
+                  <p:tgtEl>
+                    <p:sldTgt/>
+                  </p:tgtEl>
+                </p:cond>
+              </p:nextCondLst>
+            </p:seq>
+          </p:childTnLst>
+        </p:cTn>
+      </p:par>
+    </p:tnLst>
+    <p:bldLst>
+      <p:bldP spid="6" grpId="0" animBg="1"/>
+      <p:bldP spid="7" grpId="0" animBg="1"/>
+    </p:bldLst>
+  </p:timing>
 </p:sld>
 </file>
 

</xml_diff>

<commit_message>
Vortrag - Ich habe das Deployment-Diagramm unter den Technischen Aufbau eingefügt.
</commit_message>
<xml_diff>
--- a/Präsentation/Vortrag - Pflichtenheft.pptx
+++ b/Präsentation/Vortrag - Pflichtenheft.pptx
@@ -4377,10 +4377,10 @@
       </p:grpSpPr>
       <p:pic>
         <p:nvPicPr>
-          <p:cNvPr id="3" name="Grafik 2">
-            <a:extLst>
-              <a:ext uri="{FF2B5EF4-FFF2-40B4-BE49-F238E27FC236}">
-                <a16:creationId xmlns:a16="http://schemas.microsoft.com/office/drawing/2014/main" id="{67A1B990-5EBC-4BA2-8E67-01626C050428}"/>
+          <p:cNvPr id="5" name="Grafik 4">
+            <a:extLst>
+              <a:ext uri="{FF2B5EF4-FFF2-40B4-BE49-F238E27FC236}">
+                <a16:creationId xmlns:a16="http://schemas.microsoft.com/office/drawing/2014/main" id="{7224DCC8-F3A7-49E8-A0E1-D202E367B42C}"/>
               </a:ext>
             </a:extLst>
           </p:cNvPr>
@@ -4391,6 +4391,94 @@
         </p:nvPicPr>
         <p:blipFill>
           <a:blip r:embed="rId2">
+            <a:extLst>
+              <a:ext uri="{28A0092B-C50C-407E-A947-70E740481C1C}">
+                <a14:useLocalDpi xmlns:a14="http://schemas.microsoft.com/office/drawing/2010/main" val="0"/>
+              </a:ext>
+            </a:extLst>
+          </a:blip>
+          <a:stretch>
+            <a:fillRect/>
+          </a:stretch>
+        </p:blipFill>
+        <p:spPr>
+          <a:xfrm>
+            <a:off x="2759053" y="0"/>
+            <a:ext cx="6673893" cy="6858000"/>
+          </a:xfrm>
+          <a:prstGeom prst="rect">
+            <a:avLst/>
+          </a:prstGeom>
+        </p:spPr>
+      </p:pic>
+      <p:sp>
+        <p:nvSpPr>
+          <p:cNvPr id="7" name="Rechteck 6">
+            <a:extLst>
+              <a:ext uri="{FF2B5EF4-FFF2-40B4-BE49-F238E27FC236}">
+                <a16:creationId xmlns:a16="http://schemas.microsoft.com/office/drawing/2014/main" id="{C8E953B1-3EC4-4989-AC8A-8C0F75FA39CD}"/>
+              </a:ext>
+            </a:extLst>
+          </p:cNvPr>
+          <p:cNvSpPr/>
+          <p:nvPr/>
+        </p:nvSpPr>
+        <p:spPr>
+          <a:xfrm>
+            <a:off x="7005234" y="154983"/>
+            <a:ext cx="2278251" cy="1503336"/>
+          </a:xfrm>
+          <a:prstGeom prst="rect">
+            <a:avLst/>
+          </a:prstGeom>
+          <a:solidFill>
+            <a:schemeClr val="bg1"/>
+          </a:solidFill>
+          <a:ln>
+            <a:noFill/>
+          </a:ln>
+        </p:spPr>
+        <p:style>
+          <a:lnRef idx="2">
+            <a:schemeClr val="accent1">
+              <a:shade val="50000"/>
+            </a:schemeClr>
+          </a:lnRef>
+          <a:fillRef idx="1">
+            <a:schemeClr val="accent1"/>
+          </a:fillRef>
+          <a:effectRef idx="0">
+            <a:schemeClr val="accent1"/>
+          </a:effectRef>
+          <a:fontRef idx="minor">
+            <a:schemeClr val="lt1"/>
+          </a:fontRef>
+        </p:style>
+        <p:txBody>
+          <a:bodyPr rtlCol="0" anchor="ctr"/>
+          <a:lstStyle/>
+          <a:p>
+            <a:pPr algn="ctr"/>
+            <a:endParaRPr lang="de-DE"/>
+          </a:p>
+        </p:txBody>
+      </p:sp>
+      <p:pic>
+        <p:nvPicPr>
+          <p:cNvPr id="3" name="Grafik 2">
+            <a:extLst>
+              <a:ext uri="{FF2B5EF4-FFF2-40B4-BE49-F238E27FC236}">
+                <a16:creationId xmlns:a16="http://schemas.microsoft.com/office/drawing/2014/main" id="{67A1B990-5EBC-4BA2-8E67-01626C050428}"/>
+              </a:ext>
+            </a:extLst>
+          </p:cNvPr>
+          <p:cNvPicPr>
+            <a:picLocks noChangeAspect="1"/>
+          </p:cNvPicPr>
+          <p:nvPr/>
+        </p:nvPicPr>
+        <p:blipFill>
+          <a:blip r:embed="rId3">
             <a:extLst>
               <a:ext uri="{28A0092B-C50C-407E-A947-70E740481C1C}">
                 <a14:useLocalDpi xmlns:a14="http://schemas.microsoft.com/office/drawing/2010/main" val="0"/>
@@ -4426,7 +4514,7 @@
           <p:nvPr/>
         </p:nvPicPr>
         <p:blipFill>
-          <a:blip r:embed="rId3">
+          <a:blip r:embed="rId4">
             <a:extLst>
               <a:ext uri="{28A0092B-C50C-407E-A947-70E740481C1C}">
                 <a14:useLocalDpi xmlns:a14="http://schemas.microsoft.com/office/drawing/2010/main" val="0"/>
@@ -4462,7 +4550,7 @@
           <p:nvPr/>
         </p:nvPicPr>
         <p:blipFill>
-          <a:blip r:embed="rId4">
+          <a:blip r:embed="rId5">
             <a:extLst>
               <a:ext uri="{28A0092B-C50C-407E-A947-70E740481C1C}">
                 <a14:useLocalDpi xmlns:a14="http://schemas.microsoft.com/office/drawing/2010/main" val="0"/>
@@ -4498,7 +4586,7 @@
           <p:nvPr/>
         </p:nvPicPr>
         <p:blipFill>
-          <a:blip r:embed="rId5">
+          <a:blip r:embed="rId6">
             <a:extLst>
               <a:ext uri="{28A0092B-C50C-407E-A947-70E740481C1C}">
                 <a14:useLocalDpi xmlns:a14="http://schemas.microsoft.com/office/drawing/2010/main" val="0"/>
@@ -4534,7 +4622,7 @@
           <p:nvPr/>
         </p:nvPicPr>
         <p:blipFill>
-          <a:blip r:embed="rId6">
+          <a:blip r:embed="rId7">
             <a:extLst>
               <a:ext uri="{28A0092B-C50C-407E-A947-70E740481C1C}">
                 <a14:useLocalDpi xmlns:a14="http://schemas.microsoft.com/office/drawing/2010/main" val="0"/>
@@ -4805,6 +4893,59 @@
                                         </p:cTn>
                                         <p:tgtEl>
                                           <p:spTgt spid="8"/>
+                                        </p:tgtEl>
+                                        <p:attrNameLst>
+                                          <p:attrName>style.visibility</p:attrName>
+                                        </p:attrNameLst>
+                                      </p:cBhvr>
+                                      <p:to>
+                                        <p:strVal val="hidden"/>
+                                      </p:to>
+                                    </p:set>
+                                  </p:childTnLst>
+                                </p:cTn>
+                              </p:par>
+                            </p:childTnLst>
+                          </p:cTn>
+                        </p:par>
+                      </p:childTnLst>
+                    </p:cTn>
+                  </p:par>
+                  <p:par>
+                    <p:cTn id="24" fill="hold">
+                      <p:stCondLst>
+                        <p:cond delay="indefinite"/>
+                      </p:stCondLst>
+                      <p:childTnLst>
+                        <p:par>
+                          <p:cTn id="25" fill="hold">
+                            <p:stCondLst>
+                              <p:cond delay="0"/>
+                            </p:stCondLst>
+                            <p:childTnLst>
+                              <p:par>
+                                <p:cTn id="26" presetID="10" presetClass="exit" presetSubtype="0" fill="hold" nodeType="clickEffect">
+                                  <p:stCondLst>
+                                    <p:cond delay="0"/>
+                                  </p:stCondLst>
+                                  <p:childTnLst>
+                                    <p:animEffect transition="out" filter="fade">
+                                      <p:cBhvr>
+                                        <p:cTn id="27" dur="500"/>
+                                        <p:tgtEl>
+                                          <p:spTgt spid="3"/>
+                                        </p:tgtEl>
+                                      </p:cBhvr>
+                                    </p:animEffect>
+                                    <p:set>
+                                      <p:cBhvr>
+                                        <p:cTn id="28" dur="1" fill="hold">
+                                          <p:stCondLst>
+                                            <p:cond delay="499"/>
+                                          </p:stCondLst>
+                                        </p:cTn>
+                                        <p:tgtEl>
+                                          <p:spTgt spid="3"/>
                                         </p:tgtEl>
                                         <p:attrNameLst>
                                           <p:attrName>style.visibility</p:attrName>

</xml_diff>

<commit_message>
Vortrag - Fehler behoben.
</commit_message>
<xml_diff>
--- a/Präsentation/Vortrag - Pflichtenheft.pptx
+++ b/Präsentation/Vortrag - Pflichtenheft.pptx
@@ -6089,7 +6089,7 @@
       </p:pic>
       <p:sp>
         <p:nvSpPr>
-          <p:cNvPr id="6" name="Rechteck 5">
+          <p:cNvPr id="6" name="Rechteck 5" hidden="1">
             <a:extLst>
               <a:ext uri="{FF2B5EF4-FFF2-40B4-BE49-F238E27FC236}">
                 <a16:creationId xmlns:a16="http://schemas.microsoft.com/office/drawing/2014/main" id="{0D269F6C-5B00-4C0D-8265-263C958C2C22}"/>
@@ -6145,7 +6145,7 @@
       </p:sp>
       <p:sp>
         <p:nvSpPr>
-          <p:cNvPr id="7" name="Rechteck 6">
+          <p:cNvPr id="7" name="Rechteck 6" hidden="1">
             <a:extLst>
               <a:ext uri="{FF2B5EF4-FFF2-40B4-BE49-F238E27FC236}">
                 <a16:creationId xmlns:a16="http://schemas.microsoft.com/office/drawing/2014/main" id="{109A0CF3-2AA8-489F-AA69-8236826A949F}"/>
@@ -6201,7 +6201,7 @@
       </p:sp>
       <p:pic>
         <p:nvPicPr>
-          <p:cNvPr id="3" name="Grafik 2">
+          <p:cNvPr id="3" name="Grafik 2" hidden="1">
             <a:extLst>
               <a:ext uri="{FF2B5EF4-FFF2-40B4-BE49-F238E27FC236}">
                 <a16:creationId xmlns:a16="http://schemas.microsoft.com/office/drawing/2014/main" id="{5DA27827-8B4A-4B57-A05F-BA435AB962D4}"/>

</xml_diff>

<commit_message>
Vortrag - Verschönerungen vorgenommen.
</commit_message>
<xml_diff>
--- a/Präsentation/Vortrag - Pflichtenheft.pptx
+++ b/Präsentation/Vortrag - Pflichtenheft.pptx
@@ -3705,78 +3705,321 @@
           </a:prstGeom>
         </p:spPr>
       </p:pic>
-      <p:pic>
-        <p:nvPicPr>
-          <p:cNvPr id="16" name="Darstellungsverdeckung">
-            <a:extLst>
-              <a:ext uri="{FF2B5EF4-FFF2-40B4-BE49-F238E27FC236}">
-                <a16:creationId xmlns:a16="http://schemas.microsoft.com/office/drawing/2014/main" id="{A35DC517-7F1B-4FDD-B0C4-135A50AF9DE1}"/>
-              </a:ext>
-            </a:extLst>
-          </p:cNvPr>
-          <p:cNvPicPr>
-            <a:picLocks noChangeAspect="1"/>
-          </p:cNvPicPr>
+      <p:grpSp>
+        <p:nvGrpSpPr>
+          <p:cNvPr id="7" name="Darstellungsverdeckung">
+            <a:extLst>
+              <a:ext uri="{FF2B5EF4-FFF2-40B4-BE49-F238E27FC236}">
+                <a16:creationId xmlns:a16="http://schemas.microsoft.com/office/drawing/2014/main" id="{9E4E8AD0-33E9-44EB-9618-5D12F13EF19A}"/>
+              </a:ext>
+            </a:extLst>
+          </p:cNvPr>
+          <p:cNvGrpSpPr/>
           <p:nvPr/>
-        </p:nvPicPr>
-        <p:blipFill>
-          <a:blip r:embed="rId3">
-            <a:extLst>
-              <a:ext uri="{28A0092B-C50C-407E-A947-70E740481C1C}">
-                <a14:useLocalDpi xmlns:a14="http://schemas.microsoft.com/office/drawing/2010/main" val="0"/>
-              </a:ext>
-            </a:extLst>
-          </a:blip>
-          <a:stretch>
-            <a:fillRect/>
-          </a:stretch>
-        </p:blipFill>
-        <p:spPr>
+        </p:nvGrpSpPr>
+        <p:grpSpPr>
           <a:xfrm>
-            <a:off x="7988300" y="1456839"/>
-            <a:ext cx="4203699" cy="5401160"/>
+            <a:off x="5121275" y="1456839"/>
+            <a:ext cx="7070724" cy="5401160"/>
+            <a:chOff x="5121275" y="1456839"/>
+            <a:chExt cx="7070724" cy="5401160"/>
           </a:xfrm>
-          <a:prstGeom prst="rect">
-            <a:avLst/>
-          </a:prstGeom>
-        </p:spPr>
-      </p:pic>
-      <p:pic>
-        <p:nvPicPr>
-          <p:cNvPr id="14" name="Transformationsverdeckung">
-            <a:extLst>
-              <a:ext uri="{FF2B5EF4-FFF2-40B4-BE49-F238E27FC236}">
-                <a16:creationId xmlns:a16="http://schemas.microsoft.com/office/drawing/2014/main" id="{6C7D77C6-5350-402F-9AF0-2F6B9F820BEF}"/>
-              </a:ext>
-            </a:extLst>
-          </p:cNvPr>
-          <p:cNvPicPr>
-            <a:picLocks noChangeAspect="1"/>
-          </p:cNvPicPr>
+        </p:grpSpPr>
+        <p:pic>
+          <p:nvPicPr>
+            <p:cNvPr id="16" name="Darstellungsverdeckung">
+              <a:extLst>
+                <a:ext uri="{FF2B5EF4-FFF2-40B4-BE49-F238E27FC236}">
+                  <a16:creationId xmlns:a16="http://schemas.microsoft.com/office/drawing/2014/main" id="{A35DC517-7F1B-4FDD-B0C4-135A50AF9DE1}"/>
+                </a:ext>
+              </a:extLst>
+            </p:cNvPr>
+            <p:cNvPicPr>
+              <a:picLocks noChangeAspect="1"/>
+            </p:cNvPicPr>
+            <p:nvPr/>
+          </p:nvPicPr>
+          <p:blipFill>
+            <a:blip r:embed="rId3">
+              <a:extLst>
+                <a:ext uri="{28A0092B-C50C-407E-A947-70E740481C1C}">
+                  <a14:useLocalDpi xmlns:a14="http://schemas.microsoft.com/office/drawing/2010/main" val="0"/>
+                </a:ext>
+              </a:extLst>
+            </a:blip>
+            <a:stretch>
+              <a:fillRect/>
+            </a:stretch>
+          </p:blipFill>
+          <p:spPr>
+            <a:xfrm>
+              <a:off x="7988300" y="1456839"/>
+              <a:ext cx="4203699" cy="5401160"/>
+            </a:xfrm>
+            <a:prstGeom prst="rect">
+              <a:avLst/>
+            </a:prstGeom>
+          </p:spPr>
+        </p:pic>
+        <p:pic>
+          <p:nvPicPr>
+            <p:cNvPr id="15" name="Darstellungsverdeckung">
+              <a:extLst>
+                <a:ext uri="{FF2B5EF4-FFF2-40B4-BE49-F238E27FC236}">
+                  <a16:creationId xmlns:a16="http://schemas.microsoft.com/office/drawing/2014/main" id="{C753DA24-4EB2-43D3-9B8F-AAA4B0476380}"/>
+                </a:ext>
+              </a:extLst>
+            </p:cNvPr>
+            <p:cNvPicPr>
+              <a:picLocks noChangeAspect="1"/>
+            </p:cNvPicPr>
+            <p:nvPr/>
+          </p:nvPicPr>
+          <p:blipFill>
+            <a:blip r:embed="rId3">
+              <a:extLst>
+                <a:ext uri="{28A0092B-C50C-407E-A947-70E740481C1C}">
+                  <a14:useLocalDpi xmlns:a14="http://schemas.microsoft.com/office/drawing/2010/main" val="0"/>
+                </a:ext>
+              </a:extLst>
+            </a:blip>
+            <a:stretch>
+              <a:fillRect/>
+            </a:stretch>
+          </p:blipFill>
+          <p:spPr>
+            <a:xfrm>
+              <a:off x="5121275" y="4867274"/>
+              <a:ext cx="4203699" cy="304801"/>
+            </a:xfrm>
+            <a:prstGeom prst="rect">
+              <a:avLst/>
+            </a:prstGeom>
+          </p:spPr>
+        </p:pic>
+        <p:pic>
+          <p:nvPicPr>
+            <p:cNvPr id="17" name="Darstellungsverdeckung">
+              <a:extLst>
+                <a:ext uri="{FF2B5EF4-FFF2-40B4-BE49-F238E27FC236}">
+                  <a16:creationId xmlns:a16="http://schemas.microsoft.com/office/drawing/2014/main" id="{68CF1C90-4E1F-4FD2-AFFF-10C0E22D59C9}"/>
+                </a:ext>
+              </a:extLst>
+            </p:cNvPr>
+            <p:cNvPicPr>
+              <a:picLocks noChangeAspect="1"/>
+            </p:cNvPicPr>
+            <p:nvPr/>
+          </p:nvPicPr>
+          <p:blipFill>
+            <a:blip r:embed="rId3">
+              <a:extLst>
+                <a:ext uri="{28A0092B-C50C-407E-A947-70E740481C1C}">
+                  <a14:useLocalDpi xmlns:a14="http://schemas.microsoft.com/office/drawing/2010/main" val="0"/>
+                </a:ext>
+              </a:extLst>
+            </a:blip>
+            <a:stretch>
+              <a:fillRect/>
+            </a:stretch>
+          </p:blipFill>
+          <p:spPr>
+            <a:xfrm>
+              <a:off x="7559676" y="2215080"/>
+              <a:ext cx="2717800" cy="304801"/>
+            </a:xfrm>
+            <a:prstGeom prst="rect">
+              <a:avLst/>
+            </a:prstGeom>
+          </p:spPr>
+        </p:pic>
+      </p:grpSp>
+      <p:grpSp>
+        <p:nvGrpSpPr>
+          <p:cNvPr id="4" name="Transformationsverdeckung">
+            <a:extLst>
+              <a:ext uri="{FF2B5EF4-FFF2-40B4-BE49-F238E27FC236}">
+                <a16:creationId xmlns:a16="http://schemas.microsoft.com/office/drawing/2014/main" id="{C9D7FBD6-FEC6-45FE-B202-20F82ADEFC92}"/>
+              </a:ext>
+            </a:extLst>
+          </p:cNvPr>
+          <p:cNvGrpSpPr/>
           <p:nvPr/>
-        </p:nvPicPr>
-        <p:blipFill>
-          <a:blip r:embed="rId4">
-            <a:extLst>
-              <a:ext uri="{28A0092B-C50C-407E-A947-70E740481C1C}">
-                <a14:useLocalDpi xmlns:a14="http://schemas.microsoft.com/office/drawing/2010/main" val="0"/>
-              </a:ext>
-            </a:extLst>
-          </a:blip>
-          <a:stretch>
-            <a:fillRect/>
-          </a:stretch>
-        </p:blipFill>
-        <p:spPr>
+        </p:nvGrpSpPr>
+        <p:grpSpPr>
           <a:xfrm>
-            <a:off x="3171825" y="1456840"/>
-            <a:ext cx="4816475" cy="5401159"/>
+            <a:off x="2223898" y="1456840"/>
+            <a:ext cx="5764402" cy="5401159"/>
+            <a:chOff x="2223898" y="1456840"/>
+            <a:chExt cx="5764402" cy="5401159"/>
           </a:xfrm>
-          <a:prstGeom prst="rect">
-            <a:avLst/>
-          </a:prstGeom>
-        </p:spPr>
-      </p:pic>
+        </p:grpSpPr>
+        <p:pic>
+          <p:nvPicPr>
+            <p:cNvPr id="14" name="Transformationsverdeckung">
+              <a:extLst>
+                <a:ext uri="{FF2B5EF4-FFF2-40B4-BE49-F238E27FC236}">
+                  <a16:creationId xmlns:a16="http://schemas.microsoft.com/office/drawing/2014/main" id="{6C7D77C6-5350-402F-9AF0-2F6B9F820BEF}"/>
+                </a:ext>
+              </a:extLst>
+            </p:cNvPr>
+            <p:cNvPicPr>
+              <a:picLocks noChangeAspect="1"/>
+            </p:cNvPicPr>
+            <p:nvPr/>
+          </p:nvPicPr>
+          <p:blipFill>
+            <a:blip r:embed="rId4">
+              <a:extLst>
+                <a:ext uri="{28A0092B-C50C-407E-A947-70E740481C1C}">
+                  <a14:useLocalDpi xmlns:a14="http://schemas.microsoft.com/office/drawing/2010/main" val="0"/>
+                </a:ext>
+              </a:extLst>
+            </a:blip>
+            <a:stretch>
+              <a:fillRect/>
+            </a:stretch>
+          </p:blipFill>
+          <p:spPr>
+            <a:xfrm>
+              <a:off x="3171825" y="1456840"/>
+              <a:ext cx="4816475" cy="5401159"/>
+            </a:xfrm>
+            <a:prstGeom prst="rect">
+              <a:avLst/>
+            </a:prstGeom>
+          </p:spPr>
+        </p:pic>
+        <p:grpSp>
+          <p:nvGrpSpPr>
+            <p:cNvPr id="2" name="Gruppieren 1">
+              <a:extLst>
+                <a:ext uri="{FF2B5EF4-FFF2-40B4-BE49-F238E27FC236}">
+                  <a16:creationId xmlns:a16="http://schemas.microsoft.com/office/drawing/2014/main" id="{787D579A-A914-4E67-8998-E6DA8A37465A}"/>
+                </a:ext>
+              </a:extLst>
+            </p:cNvPr>
+            <p:cNvGrpSpPr/>
+            <p:nvPr/>
+          </p:nvGrpSpPr>
+          <p:grpSpPr>
+            <a:xfrm>
+              <a:off x="2223898" y="1783080"/>
+              <a:ext cx="1538137" cy="3618080"/>
+              <a:chOff x="2223898" y="1783080"/>
+              <a:chExt cx="1538137" cy="3618080"/>
+            </a:xfrm>
+          </p:grpSpPr>
+          <p:pic>
+            <p:nvPicPr>
+              <p:cNvPr id="9" name="Transformationsverdeckung">
+                <a:extLst>
+                  <a:ext uri="{FF2B5EF4-FFF2-40B4-BE49-F238E27FC236}">
+                    <a16:creationId xmlns:a16="http://schemas.microsoft.com/office/drawing/2014/main" id="{1BD0CC5A-707C-40C6-B2C8-874D23F5F6DE}"/>
+                  </a:ext>
+                </a:extLst>
+              </p:cNvPr>
+              <p:cNvPicPr>
+                <a:picLocks noChangeAspect="1"/>
+              </p:cNvPicPr>
+              <p:nvPr/>
+            </p:nvPicPr>
+            <p:blipFill>
+              <a:blip r:embed="rId4">
+                <a:extLst>
+                  <a:ext uri="{28A0092B-C50C-407E-A947-70E740481C1C}">
+                    <a14:useLocalDpi xmlns:a14="http://schemas.microsoft.com/office/drawing/2010/main" val="0"/>
+                  </a:ext>
+                </a:extLst>
+              </a:blip>
+              <a:stretch>
+                <a:fillRect/>
+              </a:stretch>
+            </p:blipFill>
+            <p:spPr>
+              <a:xfrm>
+                <a:off x="2578799" y="4992624"/>
+                <a:ext cx="588264" cy="408536"/>
+              </a:xfrm>
+              <a:prstGeom prst="rect">
+                <a:avLst/>
+              </a:prstGeom>
+            </p:spPr>
+          </p:pic>
+          <p:pic>
+            <p:nvPicPr>
+              <p:cNvPr id="11" name="Transformationsverdeckung">
+                <a:extLst>
+                  <a:ext uri="{FF2B5EF4-FFF2-40B4-BE49-F238E27FC236}">
+                    <a16:creationId xmlns:a16="http://schemas.microsoft.com/office/drawing/2014/main" id="{6CEDBB91-3698-4A73-A80D-FE9EFC41BE82}"/>
+                  </a:ext>
+                </a:extLst>
+              </p:cNvPr>
+              <p:cNvPicPr>
+                <a:picLocks noChangeAspect="1"/>
+              </p:cNvPicPr>
+              <p:nvPr/>
+            </p:nvPicPr>
+            <p:blipFill>
+              <a:blip r:embed="rId4">
+                <a:extLst>
+                  <a:ext uri="{28A0092B-C50C-407E-A947-70E740481C1C}">
+                    <a14:useLocalDpi xmlns:a14="http://schemas.microsoft.com/office/drawing/2010/main" val="0"/>
+                  </a:ext>
+                </a:extLst>
+              </a:blip>
+              <a:stretch>
+                <a:fillRect/>
+              </a:stretch>
+            </p:blipFill>
+            <p:spPr>
+              <a:xfrm>
+                <a:off x="2223898" y="1783080"/>
+                <a:ext cx="1225969" cy="432000"/>
+              </a:xfrm>
+              <a:prstGeom prst="rect">
+                <a:avLst/>
+              </a:prstGeom>
+            </p:spPr>
+          </p:pic>
+          <p:pic>
+            <p:nvPicPr>
+              <p:cNvPr id="12" name="Transformationsverdeckung">
+                <a:extLst>
+                  <a:ext uri="{FF2B5EF4-FFF2-40B4-BE49-F238E27FC236}">
+                    <a16:creationId xmlns:a16="http://schemas.microsoft.com/office/drawing/2014/main" id="{2A42AA7A-1072-4ADC-8499-6EB8B6A506E8}"/>
+                  </a:ext>
+                </a:extLst>
+              </p:cNvPr>
+              <p:cNvPicPr>
+                <a:picLocks noChangeAspect="1"/>
+              </p:cNvPicPr>
+              <p:nvPr/>
+            </p:nvPicPr>
+            <p:blipFill>
+              <a:blip r:embed="rId4">
+                <a:extLst>
+                  <a:ext uri="{28A0092B-C50C-407E-A947-70E740481C1C}">
+                    <a14:useLocalDpi xmlns:a14="http://schemas.microsoft.com/office/drawing/2010/main" val="0"/>
+                  </a:ext>
+                </a:extLst>
+              </a:blip>
+              <a:stretch>
+                <a:fillRect/>
+              </a:stretch>
+            </p:blipFill>
+            <p:spPr>
+              <a:xfrm>
+                <a:off x="2574035" y="2715766"/>
+                <a:ext cx="1188000" cy="1998769"/>
+              </a:xfrm>
+              <a:prstGeom prst="rect">
+                <a:avLst/>
+              </a:prstGeom>
+            </p:spPr>
+          </p:pic>
+        </p:grpSp>
+      </p:grpSp>
       <p:pic>
         <p:nvPicPr>
           <p:cNvPr id="10" name="Sensorenverdeckung">
@@ -4249,7 +4492,7 @@
                                       <p:cBhvr>
                                         <p:cTn id="28" dur="500"/>
                                         <p:tgtEl>
-                                          <p:spTgt spid="14"/>
+                                          <p:spTgt spid="4"/>
                                         </p:tgtEl>
                                       </p:cBhvr>
                                     </p:animEffect>
@@ -4261,7 +4504,7 @@
                                           </p:stCondLst>
                                         </p:cTn>
                                         <p:tgtEl>
-                                          <p:spTgt spid="14"/>
+                                          <p:spTgt spid="4"/>
                                         </p:tgtEl>
                                         <p:attrNameLst>
                                           <p:attrName>style.visibility</p:attrName>
@@ -4302,7 +4545,7 @@
                                       <p:cBhvr>
                                         <p:cTn id="33" dur="500"/>
                                         <p:tgtEl>
-                                          <p:spTgt spid="16"/>
+                                          <p:spTgt spid="7"/>
                                         </p:tgtEl>
                                       </p:cBhvr>
                                     </p:animEffect>
@@ -4314,7 +4557,7 @@
                                           </p:stCondLst>
                                         </p:cTn>
                                         <p:tgtEl>
-                                          <p:spTgt spid="16"/>
+                                          <p:spTgt spid="7"/>
                                         </p:tgtEl>
                                         <p:attrNameLst>
                                           <p:attrName>style.visibility</p:attrName>
@@ -6089,7 +6332,7 @@
       </p:pic>
       <p:sp>
         <p:nvSpPr>
-          <p:cNvPr id="6" name="Rechteck 5" hidden="1">
+          <p:cNvPr id="6" name="Rechteck 5">
             <a:extLst>
               <a:ext uri="{FF2B5EF4-FFF2-40B4-BE49-F238E27FC236}">
                 <a16:creationId xmlns:a16="http://schemas.microsoft.com/office/drawing/2014/main" id="{0D269F6C-5B00-4C0D-8265-263C958C2C22}"/>
@@ -6145,7 +6388,7 @@
       </p:sp>
       <p:sp>
         <p:nvSpPr>
-          <p:cNvPr id="7" name="Rechteck 6" hidden="1">
+          <p:cNvPr id="7" name="Rechteck 6">
             <a:extLst>
               <a:ext uri="{FF2B5EF4-FFF2-40B4-BE49-F238E27FC236}">
                 <a16:creationId xmlns:a16="http://schemas.microsoft.com/office/drawing/2014/main" id="{109A0CF3-2AA8-489F-AA69-8236826A949F}"/>
@@ -6201,7 +6444,7 @@
       </p:sp>
       <p:pic>
         <p:nvPicPr>
-          <p:cNvPr id="3" name="Grafik 2" hidden="1">
+          <p:cNvPr id="3" name="Grafik 2">
             <a:extLst>
               <a:ext uri="{FF2B5EF4-FFF2-40B4-BE49-F238E27FC236}">
                 <a16:creationId xmlns:a16="http://schemas.microsoft.com/office/drawing/2014/main" id="{5DA27827-8B4A-4B57-A05F-BA435AB962D4}"/>

</xml_diff>

<commit_message>
Vortrag - Animationen hinzugefügt.
</commit_message>
<xml_diff>
--- a/Präsentation/Vortrag - Pflichtenheft.pptx
+++ b/Präsentation/Vortrag - Pflichtenheft.pptx
@@ -4058,6 +4058,42 @@
       </p:pic>
       <p:pic>
         <p:nvPicPr>
+          <p:cNvPr id="18" name="Verdeckung Hauptteil Sensoren">
+            <a:extLst>
+              <a:ext uri="{FF2B5EF4-FFF2-40B4-BE49-F238E27FC236}">
+                <a16:creationId xmlns:a16="http://schemas.microsoft.com/office/drawing/2014/main" id="{28023800-6FBE-41A3-9FDB-89AA4C0F6BA0}"/>
+              </a:ext>
+            </a:extLst>
+          </p:cNvPr>
+          <p:cNvPicPr>
+            <a:picLocks noChangeAspect="1"/>
+          </p:cNvPicPr>
+          <p:nvPr/>
+        </p:nvPicPr>
+        <p:blipFill>
+          <a:blip r:embed="rId6">
+            <a:extLst>
+              <a:ext uri="{28A0092B-C50C-407E-A947-70E740481C1C}">
+                <a14:useLocalDpi xmlns:a14="http://schemas.microsoft.com/office/drawing/2010/main" val="0"/>
+              </a:ext>
+            </a:extLst>
+          </a:blip>
+          <a:stretch>
+            <a:fillRect/>
+          </a:stretch>
+        </p:blipFill>
+        <p:spPr>
+          <a:xfrm>
+            <a:off x="0" y="547591"/>
+            <a:ext cx="12192000" cy="909247"/>
+          </a:xfrm>
+          <a:prstGeom prst="rect">
+            <a:avLst/>
+          </a:prstGeom>
+        </p:spPr>
+      </p:pic>
+      <p:pic>
+        <p:nvPicPr>
           <p:cNvPr id="8" name="Verdeckung Hauptteil">
             <a:extLst>
               <a:ext uri="{FF2B5EF4-FFF2-40B4-BE49-F238E27FC236}">
@@ -4439,7 +4475,7 @@
                                       <p:cBhvr>
                                         <p:cTn id="23" dur="500"/>
                                         <p:tgtEl>
-                                          <p:spTgt spid="10"/>
+                                          <p:spTgt spid="18"/>
                                         </p:tgtEl>
                                       </p:cBhvr>
                                     </p:animEffect>
@@ -4451,7 +4487,7 @@
                                           </p:stCondLst>
                                         </p:cTn>
                                         <p:tgtEl>
-                                          <p:spTgt spid="10"/>
+                                          <p:spTgt spid="18"/>
                                         </p:tgtEl>
                                         <p:attrNameLst>
                                           <p:attrName>style.visibility</p:attrName>
@@ -4492,7 +4528,7 @@
                                       <p:cBhvr>
                                         <p:cTn id="28" dur="500"/>
                                         <p:tgtEl>
-                                          <p:spTgt spid="4"/>
+                                          <p:spTgt spid="10"/>
                                         </p:tgtEl>
                                       </p:cBhvr>
                                     </p:animEffect>
@@ -4504,7 +4540,7 @@
                                           </p:stCondLst>
                                         </p:cTn>
                                         <p:tgtEl>
-                                          <p:spTgt spid="4"/>
+                                          <p:spTgt spid="10"/>
                                         </p:tgtEl>
                                         <p:attrNameLst>
                                           <p:attrName>style.visibility</p:attrName>
@@ -4545,13 +4581,66 @@
                                       <p:cBhvr>
                                         <p:cTn id="33" dur="500"/>
                                         <p:tgtEl>
+                                          <p:spTgt spid="4"/>
+                                        </p:tgtEl>
+                                      </p:cBhvr>
+                                    </p:animEffect>
+                                    <p:set>
+                                      <p:cBhvr>
+                                        <p:cTn id="34" dur="1" fill="hold">
+                                          <p:stCondLst>
+                                            <p:cond delay="499"/>
+                                          </p:stCondLst>
+                                        </p:cTn>
+                                        <p:tgtEl>
+                                          <p:spTgt spid="4"/>
+                                        </p:tgtEl>
+                                        <p:attrNameLst>
+                                          <p:attrName>style.visibility</p:attrName>
+                                        </p:attrNameLst>
+                                      </p:cBhvr>
+                                      <p:to>
+                                        <p:strVal val="hidden"/>
+                                      </p:to>
+                                    </p:set>
+                                  </p:childTnLst>
+                                </p:cTn>
+                              </p:par>
+                            </p:childTnLst>
+                          </p:cTn>
+                        </p:par>
+                      </p:childTnLst>
+                    </p:cTn>
+                  </p:par>
+                  <p:par>
+                    <p:cTn id="35" fill="hold">
+                      <p:stCondLst>
+                        <p:cond delay="indefinite"/>
+                      </p:stCondLst>
+                      <p:childTnLst>
+                        <p:par>
+                          <p:cTn id="36" fill="hold">
+                            <p:stCondLst>
+                              <p:cond delay="0"/>
+                            </p:stCondLst>
+                            <p:childTnLst>
+                              <p:par>
+                                <p:cTn id="37" presetID="10" presetClass="exit" presetSubtype="0" fill="hold" nodeType="clickEffect">
+                                  <p:stCondLst>
+                                    <p:cond delay="0"/>
+                                  </p:stCondLst>
+                                  <p:childTnLst>
+                                    <p:animEffect transition="out" filter="fade">
+                                      <p:cBhvr>
+                                        <p:cTn id="38" dur="500"/>
+                                        <p:tgtEl>
                                           <p:spTgt spid="7"/>
                                         </p:tgtEl>
                                       </p:cBhvr>
                                     </p:animEffect>
                                     <p:set>
                                       <p:cBhvr>
-                                        <p:cTn id="34" dur="1" fill="hold">
+                                        <p:cTn id="39" dur="1" fill="hold">
                                           <p:stCondLst>
                                             <p:cond delay="499"/>
                                           </p:stCondLst>

</xml_diff>

<commit_message>
Ich habe eine Übersicht über die Funktionen der Konfigdateien erstellt. Außerdem habe ich bei den Sensoren Konfigdateien technische Details der Sensoren recherchiert.
</commit_message>
<xml_diff>
--- a/Präsentation/Vortrag - Pflichtenheft.pptx
+++ b/Präsentation/Vortrag - Pflichtenheft.pptx
@@ -290,7 +290,7 @@
           <a:p>
             <a:fld id="{83E01541-7F0C-40FA-847C-30086A64F924}" type="datetimeFigureOut">
               <a:rPr lang="de-DE" smtClean="0"/>
-              <a:t>12.06.2019</a:t>
+              <a:t>15.06.2019</a:t>
             </a:fld>
             <a:endParaRPr lang="de-DE"/>
           </a:p>
@@ -488,7 +488,7 @@
           <a:p>
             <a:fld id="{83E01541-7F0C-40FA-847C-30086A64F924}" type="datetimeFigureOut">
               <a:rPr lang="de-DE" smtClean="0"/>
-              <a:t>12.06.2019</a:t>
+              <a:t>15.06.2019</a:t>
             </a:fld>
             <a:endParaRPr lang="de-DE"/>
           </a:p>
@@ -696,7 +696,7 @@
           <a:p>
             <a:fld id="{83E01541-7F0C-40FA-847C-30086A64F924}" type="datetimeFigureOut">
               <a:rPr lang="de-DE" smtClean="0"/>
-              <a:t>12.06.2019</a:t>
+              <a:t>15.06.2019</a:t>
             </a:fld>
             <a:endParaRPr lang="de-DE"/>
           </a:p>
@@ -894,7 +894,7 @@
           <a:p>
             <a:fld id="{83E01541-7F0C-40FA-847C-30086A64F924}" type="datetimeFigureOut">
               <a:rPr lang="de-DE" smtClean="0"/>
-              <a:t>12.06.2019</a:t>
+              <a:t>15.06.2019</a:t>
             </a:fld>
             <a:endParaRPr lang="de-DE"/>
           </a:p>
@@ -1169,7 +1169,7 @@
           <a:p>
             <a:fld id="{83E01541-7F0C-40FA-847C-30086A64F924}" type="datetimeFigureOut">
               <a:rPr lang="de-DE" smtClean="0"/>
-              <a:t>12.06.2019</a:t>
+              <a:t>15.06.2019</a:t>
             </a:fld>
             <a:endParaRPr lang="de-DE"/>
           </a:p>
@@ -1434,7 +1434,7 @@
           <a:p>
             <a:fld id="{83E01541-7F0C-40FA-847C-30086A64F924}" type="datetimeFigureOut">
               <a:rPr lang="de-DE" smtClean="0"/>
-              <a:t>12.06.2019</a:t>
+              <a:t>15.06.2019</a:t>
             </a:fld>
             <a:endParaRPr lang="de-DE"/>
           </a:p>
@@ -1846,7 +1846,7 @@
           <a:p>
             <a:fld id="{83E01541-7F0C-40FA-847C-30086A64F924}" type="datetimeFigureOut">
               <a:rPr lang="de-DE" smtClean="0"/>
-              <a:t>12.06.2019</a:t>
+              <a:t>15.06.2019</a:t>
             </a:fld>
             <a:endParaRPr lang="de-DE"/>
           </a:p>
@@ -1987,7 +1987,7 @@
           <a:p>
             <a:fld id="{83E01541-7F0C-40FA-847C-30086A64F924}" type="datetimeFigureOut">
               <a:rPr lang="de-DE" smtClean="0"/>
-              <a:t>12.06.2019</a:t>
+              <a:t>15.06.2019</a:t>
             </a:fld>
             <a:endParaRPr lang="de-DE"/>
           </a:p>
@@ -2100,7 +2100,7 @@
           <a:p>
             <a:fld id="{83E01541-7F0C-40FA-847C-30086A64F924}" type="datetimeFigureOut">
               <a:rPr lang="de-DE" smtClean="0"/>
-              <a:t>12.06.2019</a:t>
+              <a:t>15.06.2019</a:t>
             </a:fld>
             <a:endParaRPr lang="de-DE"/>
           </a:p>
@@ -2411,7 +2411,7 @@
           <a:p>
             <a:fld id="{83E01541-7F0C-40FA-847C-30086A64F924}" type="datetimeFigureOut">
               <a:rPr lang="de-DE" smtClean="0"/>
-              <a:t>12.06.2019</a:t>
+              <a:t>15.06.2019</a:t>
             </a:fld>
             <a:endParaRPr lang="de-DE"/>
           </a:p>
@@ -2699,7 +2699,7 @@
           <a:p>
             <a:fld id="{83E01541-7F0C-40FA-847C-30086A64F924}" type="datetimeFigureOut">
               <a:rPr lang="de-DE" smtClean="0"/>
-              <a:t>12.06.2019</a:t>
+              <a:t>15.06.2019</a:t>
             </a:fld>
             <a:endParaRPr lang="de-DE"/>
           </a:p>
@@ -2940,7 +2940,7 @@
           <a:p>
             <a:fld id="{83E01541-7F0C-40FA-847C-30086A64F924}" type="datetimeFigureOut">
               <a:rPr lang="de-DE" smtClean="0"/>
-              <a:t>12.06.2019</a:t>
+              <a:t>15.06.2019</a:t>
             </a:fld>
             <a:endParaRPr lang="de-DE"/>
           </a:p>

</xml_diff>